<commit_message>
FAT plus struktura fat
</commit_message>
<xml_diff>
--- a/ProgressReport1-Cederle-Marek.pptx
+++ b/ProgressReport1-Cederle-Marek.pptx
@@ -9,12 +9,14 @@
     <p:sldId id="257" r:id="rId3"/>
     <p:sldId id="259" r:id="rId4"/>
     <p:sldId id="261" r:id="rId5"/>
-    <p:sldId id="260" r:id="rId6"/>
-    <p:sldId id="258" r:id="rId7"/>
-    <p:sldId id="262" r:id="rId8"/>
-    <p:sldId id="263" r:id="rId9"/>
-    <p:sldId id="265" r:id="rId10"/>
-    <p:sldId id="264" r:id="rId11"/>
+    <p:sldId id="265" r:id="rId6"/>
+    <p:sldId id="260" r:id="rId7"/>
+    <p:sldId id="266" r:id="rId8"/>
+    <p:sldId id="258" r:id="rId9"/>
+    <p:sldId id="267" r:id="rId10"/>
+    <p:sldId id="262" r:id="rId11"/>
+    <p:sldId id="268" r:id="rId12"/>
+    <p:sldId id="264" r:id="rId13"/>
   </p:sldIdLst>
   <p:sldSz cx="12192000" cy="6858000"/>
   <p:notesSz cx="6858000" cy="9144000"/>
@@ -3483,6 +3485,223 @@
           <p:cNvPr id="2" name="Nadpis 1">
             <a:extLst>
               <a:ext uri="{FF2B5EF4-FFF2-40B4-BE49-F238E27FC236}">
+                <a16:creationId xmlns:a16="http://schemas.microsoft.com/office/drawing/2014/main" id="{3D7695E3-0189-6313-9200-9D4923195670}"/>
+              </a:ext>
+            </a:extLst>
+          </p:cNvPr>
+          <p:cNvSpPr>
+            <a:spLocks noGrp="1"/>
+          </p:cNvSpPr>
+          <p:nvPr>
+            <p:ph type="title"/>
+          </p:nvPr>
+        </p:nvSpPr>
+        <p:spPr/>
+        <p:txBody>
+          <a:bodyPr/>
+          <a:lstStyle/>
+          <a:p>
+            <a:r>
+              <a:rPr lang="sk-SK" dirty="0"/>
+              <a:t>ext4 – </a:t>
+            </a:r>
+            <a:r>
+              <a:rPr lang="sk-SK" dirty="0" err="1"/>
+              <a:t>Extended</a:t>
+            </a:r>
+            <a:r>
+              <a:rPr lang="sk-SK" dirty="0"/>
+              <a:t> </a:t>
+            </a:r>
+            <a:r>
+              <a:rPr lang="sk-SK" dirty="0" err="1"/>
+              <a:t>File</a:t>
+            </a:r>
+            <a:r>
+              <a:rPr lang="sk-SK" dirty="0"/>
+              <a:t> </a:t>
+            </a:r>
+            <a:r>
+              <a:rPr lang="sk-SK" dirty="0" err="1"/>
+              <a:t>System</a:t>
+            </a:r>
+            <a:endParaRPr lang="sk-SK" dirty="0"/>
+          </a:p>
+        </p:txBody>
+      </p:sp>
+      <p:sp>
+        <p:nvSpPr>
+          <p:cNvPr id="3" name="Zástupný objekt pre obsah 2">
+            <a:extLst>
+              <a:ext uri="{FF2B5EF4-FFF2-40B4-BE49-F238E27FC236}">
+                <a16:creationId xmlns:a16="http://schemas.microsoft.com/office/drawing/2014/main" id="{7A1C5B8D-7595-1C6B-38C4-806D67EB6A4B}"/>
+              </a:ext>
+            </a:extLst>
+          </p:cNvPr>
+          <p:cNvSpPr>
+            <a:spLocks noGrp="1"/>
+          </p:cNvSpPr>
+          <p:nvPr>
+            <p:ph idx="1"/>
+          </p:nvPr>
+        </p:nvSpPr>
+        <p:spPr/>
+        <p:txBody>
+          <a:bodyPr/>
+          <a:lstStyle/>
+          <a:p>
+            <a:r>
+              <a:rPr lang="sk-SK" dirty="0"/>
+              <a:t>Pre operačné systému založené na </a:t>
+            </a:r>
+            <a:r>
+              <a:rPr lang="sk-SK" dirty="0" err="1"/>
+              <a:t>GNU+Linux</a:t>
+            </a:r>
+            <a:endParaRPr lang="sk-SK" dirty="0"/>
+          </a:p>
+        </p:txBody>
+      </p:sp>
+    </p:spTree>
+    <p:extLst>
+      <p:ext uri="{BB962C8B-B14F-4D97-AF65-F5344CB8AC3E}">
+        <p14:creationId xmlns:p14="http://schemas.microsoft.com/office/powerpoint/2010/main" val="4092469905"/>
+      </p:ext>
+    </p:extLst>
+  </p:cSld>
+  <p:clrMapOvr>
+    <a:masterClrMapping/>
+  </p:clrMapOvr>
+</p:sld>
+</file>
+
+<file path=ppt/slides/slide11.xml><?xml version="1.0" encoding="utf-8"?>
+<p:sld xmlns:a="http://schemas.openxmlformats.org/drawingml/2006/main" xmlns:r="http://schemas.openxmlformats.org/officeDocument/2006/relationships" xmlns:p="http://schemas.openxmlformats.org/presentationml/2006/main">
+  <p:cSld>
+    <p:spTree>
+      <p:nvGrpSpPr>
+        <p:cNvPr id="1" name=""/>
+        <p:cNvGrpSpPr/>
+        <p:nvPr/>
+      </p:nvGrpSpPr>
+      <p:grpSpPr>
+        <a:xfrm>
+          <a:off x="0" y="0"/>
+          <a:ext cx="0" cy="0"/>
+          <a:chOff x="0" y="0"/>
+          <a:chExt cx="0" cy="0"/>
+        </a:xfrm>
+      </p:grpSpPr>
+      <p:sp>
+        <p:nvSpPr>
+          <p:cNvPr id="2" name="Nadpis 1">
+            <a:extLst>
+              <a:ext uri="{FF2B5EF4-FFF2-40B4-BE49-F238E27FC236}">
+                <a16:creationId xmlns:a16="http://schemas.microsoft.com/office/drawing/2014/main" id="{F7AF72E6-7DCD-74CC-B85B-7DA703C95E45}"/>
+              </a:ext>
+            </a:extLst>
+          </p:cNvPr>
+          <p:cNvSpPr>
+            <a:spLocks noGrp="1"/>
+          </p:cNvSpPr>
+          <p:nvPr>
+            <p:ph type="title"/>
+          </p:nvPr>
+        </p:nvSpPr>
+        <p:spPr/>
+        <p:txBody>
+          <a:bodyPr/>
+          <a:lstStyle/>
+          <a:p>
+            <a:r>
+              <a:rPr lang="sk-SK" dirty="0"/>
+              <a:t>Štruktúra ext4</a:t>
+            </a:r>
+          </a:p>
+        </p:txBody>
+      </p:sp>
+      <p:pic>
+        <p:nvPicPr>
+          <p:cNvPr id="4098" name="Picture 2" descr="ext file system structure">
+            <a:extLst>
+              <a:ext uri="{FF2B5EF4-FFF2-40B4-BE49-F238E27FC236}">
+                <a16:creationId xmlns:a16="http://schemas.microsoft.com/office/drawing/2014/main" id="{83831C78-BA8C-89F8-D9EA-D1C942BAE7FE}"/>
+              </a:ext>
+            </a:extLst>
+          </p:cNvPr>
+          <p:cNvPicPr>
+            <a:picLocks noChangeAspect="1" noChangeArrowheads="1"/>
+          </p:cNvPicPr>
+          <p:nvPr/>
+        </p:nvPicPr>
+        <p:blipFill>
+          <a:blip r:embed="rId2">
+            <a:extLst>
+              <a:ext uri="{28A0092B-C50C-407E-A947-70E740481C1C}">
+                <a14:useLocalDpi xmlns:a14="http://schemas.microsoft.com/office/drawing/2010/main" val="0"/>
+              </a:ext>
+            </a:extLst>
+          </a:blip>
+          <a:srcRect/>
+          <a:stretch>
+            <a:fillRect/>
+          </a:stretch>
+        </p:blipFill>
+        <p:spPr bwMode="auto">
+          <a:xfrm>
+            <a:off x="2762250" y="1225483"/>
+            <a:ext cx="6667500" cy="4705350"/>
+          </a:xfrm>
+          <a:prstGeom prst="rect">
+            <a:avLst/>
+          </a:prstGeom>
+          <a:noFill/>
+          <a:extLst>
+            <a:ext uri="{909E8E84-426E-40DD-AFC4-6F175D3DCCD1}">
+              <a14:hiddenFill xmlns:a14="http://schemas.microsoft.com/office/drawing/2010/main">
+                <a:solidFill>
+                  <a:srgbClr val="FFFFFF"/>
+                </a:solidFill>
+              </a14:hiddenFill>
+            </a:ext>
+          </a:extLst>
+        </p:spPr>
+      </p:pic>
+    </p:spTree>
+    <p:extLst>
+      <p:ext uri="{BB962C8B-B14F-4D97-AF65-F5344CB8AC3E}">
+        <p14:creationId xmlns:p14="http://schemas.microsoft.com/office/powerpoint/2010/main" val="3686483182"/>
+      </p:ext>
+    </p:extLst>
+  </p:cSld>
+  <p:clrMapOvr>
+    <a:masterClrMapping/>
+  </p:clrMapOvr>
+</p:sld>
+</file>
+
+<file path=ppt/slides/slide12.xml><?xml version="1.0" encoding="utf-8"?>
+<p:sld xmlns:a="http://schemas.openxmlformats.org/drawingml/2006/main" xmlns:r="http://schemas.openxmlformats.org/officeDocument/2006/relationships" xmlns:p="http://schemas.openxmlformats.org/presentationml/2006/main">
+  <p:cSld>
+    <p:spTree>
+      <p:nvGrpSpPr>
+        <p:cNvPr id="1" name=""/>
+        <p:cNvGrpSpPr/>
+        <p:nvPr/>
+      </p:nvGrpSpPr>
+      <p:grpSpPr>
+        <a:xfrm>
+          <a:off x="0" y="0"/>
+          <a:ext cx="0" cy="0"/>
+          <a:chOff x="0" y="0"/>
+          <a:chExt cx="0" cy="0"/>
+        </a:xfrm>
+      </p:grpSpPr>
+      <p:sp>
+        <p:nvSpPr>
+          <p:cNvPr id="2" name="Nadpis 1">
+            <a:extLst>
+              <a:ext uri="{FF2B5EF4-FFF2-40B4-BE49-F238E27FC236}">
                 <a16:creationId xmlns:a16="http://schemas.microsoft.com/office/drawing/2014/main" id="{0965500D-97DA-EB75-72A6-A40F11547EFC}"/>
               </a:ext>
             </a:extLst>
@@ -3915,7 +4134,7 @@
           <p:cNvPr id="2" name="Nadpis 1">
             <a:extLst>
               <a:ext uri="{FF2B5EF4-FFF2-40B4-BE49-F238E27FC236}">
-                <a16:creationId xmlns:a16="http://schemas.microsoft.com/office/drawing/2014/main" id="{2DD353EA-867B-EAD5-EE64-B8C457EF5D9E}"/>
+                <a16:creationId xmlns:a16="http://schemas.microsoft.com/office/drawing/2014/main" id="{79A487DC-260B-CC15-A174-5281F32DC450}"/>
               </a:ext>
             </a:extLst>
           </p:cNvPr>
@@ -3932,42 +4151,63 @@
           <a:lstStyle/>
           <a:p>
             <a:r>
-              <a:rPr lang="sk-SK" dirty="0" err="1"/>
-              <a:t>exFAT</a:t>
-            </a:r>
-            <a:endParaRPr lang="sk-SK" dirty="0"/>
-          </a:p>
-        </p:txBody>
-      </p:sp>
-      <p:sp>
-        <p:nvSpPr>
-          <p:cNvPr id="3" name="Zástupný objekt pre obsah 2">
-            <a:extLst>
-              <a:ext uri="{FF2B5EF4-FFF2-40B4-BE49-F238E27FC236}">
-                <a16:creationId xmlns:a16="http://schemas.microsoft.com/office/drawing/2014/main" id="{1140D524-240C-7A2E-FC98-1E233B7BBBC5}"/>
-              </a:ext>
-            </a:extLst>
-          </p:cNvPr>
-          <p:cNvSpPr>
-            <a:spLocks noGrp="1"/>
-          </p:cNvSpPr>
-          <p:nvPr>
-            <p:ph idx="1"/>
-          </p:nvPr>
-        </p:nvSpPr>
-        <p:spPr/>
-        <p:txBody>
-          <a:bodyPr/>
-          <a:lstStyle/>
-          <a:p>
-            <a:endParaRPr lang="sk-SK"/>
-          </a:p>
-        </p:txBody>
-      </p:sp>
+              <a:rPr lang="sk-SK" dirty="0"/>
+              <a:t>Štruktúra FAT a FAT32</a:t>
+            </a:r>
+          </a:p>
+        </p:txBody>
+      </p:sp>
+      <p:pic>
+        <p:nvPicPr>
+          <p:cNvPr id="2050" name="Picture 2" descr="FAT file system structure">
+            <a:extLst>
+              <a:ext uri="{FF2B5EF4-FFF2-40B4-BE49-F238E27FC236}">
+                <a16:creationId xmlns:a16="http://schemas.microsoft.com/office/drawing/2014/main" id="{827E4998-111A-6935-5E02-171BA70296E0}"/>
+              </a:ext>
+            </a:extLst>
+          </p:cNvPr>
+          <p:cNvPicPr>
+            <a:picLocks noChangeAspect="1" noChangeArrowheads="1"/>
+          </p:cNvPicPr>
+          <p:nvPr/>
+        </p:nvPicPr>
+        <p:blipFill>
+          <a:blip r:embed="rId2">
+            <a:extLst>
+              <a:ext uri="{28A0092B-C50C-407E-A947-70E740481C1C}">
+                <a14:useLocalDpi xmlns:a14="http://schemas.microsoft.com/office/drawing/2010/main" val="0"/>
+              </a:ext>
+            </a:extLst>
+          </a:blip>
+          <a:srcRect/>
+          <a:stretch>
+            <a:fillRect/>
+          </a:stretch>
+        </p:blipFill>
+        <p:spPr bwMode="auto">
+          <a:xfrm>
+            <a:off x="3076119" y="1245446"/>
+            <a:ext cx="6039762" cy="4726395"/>
+          </a:xfrm>
+          <a:prstGeom prst="rect">
+            <a:avLst/>
+          </a:prstGeom>
+          <a:noFill/>
+          <a:extLst>
+            <a:ext uri="{909E8E84-426E-40DD-AFC4-6F175D3DCCD1}">
+              <a14:hiddenFill xmlns:a14="http://schemas.microsoft.com/office/drawing/2010/main">
+                <a:solidFill>
+                  <a:srgbClr val="FFFFFF"/>
+                </a:solidFill>
+              </a14:hiddenFill>
+            </a:ext>
+          </a:extLst>
+        </p:spPr>
+      </p:pic>
     </p:spTree>
     <p:extLst>
       <p:ext uri="{BB962C8B-B14F-4D97-AF65-F5344CB8AC3E}">
-        <p14:creationId xmlns:p14="http://schemas.microsoft.com/office/powerpoint/2010/main" val="645440768"/>
+        <p14:creationId xmlns:p14="http://schemas.microsoft.com/office/powerpoint/2010/main" val="2566956878"/>
       </p:ext>
     </p:extLst>
   </p:cSld>
@@ -3999,7 +4239,7 @@
           <p:cNvPr id="2" name="Nadpis 1">
             <a:extLst>
               <a:ext uri="{FF2B5EF4-FFF2-40B4-BE49-F238E27FC236}">
-                <a16:creationId xmlns:a16="http://schemas.microsoft.com/office/drawing/2014/main" id="{D4F3A823-8725-10DE-EC45-7EE590866A5C}"/>
+                <a16:creationId xmlns:a16="http://schemas.microsoft.com/office/drawing/2014/main" id="{2DD353EA-867B-EAD5-EE64-B8C457EF5D9E}"/>
               </a:ext>
             </a:extLst>
           </p:cNvPr>
@@ -4016,28 +4256,8 @@
           <a:lstStyle/>
           <a:p>
             <a:r>
-              <a:rPr lang="sk-SK" dirty="0"/>
-              <a:t>NTFS – New </a:t>
-            </a:r>
-            <a:r>
               <a:rPr lang="sk-SK" dirty="0" err="1"/>
-              <a:t>Technology</a:t>
-            </a:r>
-            <a:r>
-              <a:rPr lang="sk-SK" dirty="0"/>
-              <a:t> </a:t>
-            </a:r>
-            <a:r>
-              <a:rPr lang="sk-SK" dirty="0" err="1"/>
-              <a:t>File</a:t>
-            </a:r>
-            <a:r>
-              <a:rPr lang="sk-SK" dirty="0"/>
-              <a:t> </a:t>
-            </a:r>
-            <a:r>
-              <a:rPr lang="sk-SK" dirty="0" err="1"/>
-              <a:t>System</a:t>
+              <a:t>exFAT</a:t>
             </a:r>
             <a:endParaRPr lang="sk-SK" dirty="0"/>
           </a:p>
@@ -4048,7 +4268,7 @@
           <p:cNvPr id="3" name="Zástupný objekt pre obsah 2">
             <a:extLst>
               <a:ext uri="{FF2B5EF4-FFF2-40B4-BE49-F238E27FC236}">
-                <a16:creationId xmlns:a16="http://schemas.microsoft.com/office/drawing/2014/main" id="{74203224-C5A5-CB0E-DF65-FCAF04E9E139}"/>
+                <a16:creationId xmlns:a16="http://schemas.microsoft.com/office/drawing/2014/main" id="{1140D524-240C-7A2E-FC98-1E233B7BBBC5}"/>
               </a:ext>
             </a:extLst>
           </p:cNvPr>
@@ -4064,25 +4284,14 @@
           <a:bodyPr/>
           <a:lstStyle/>
           <a:p>
-            <a:r>
-              <a:rPr lang="sk-SK" dirty="0"/>
-              <a:t>Pre operačný </a:t>
-            </a:r>
-            <a:r>
-              <a:rPr lang="sk-SK" dirty="0" err="1"/>
-              <a:t>sytém</a:t>
-            </a:r>
-            <a:r>
-              <a:rPr lang="sk-SK" dirty="0"/>
-              <a:t> Windows</a:t>
-            </a:r>
+            <a:endParaRPr lang="sk-SK"/>
           </a:p>
         </p:txBody>
       </p:sp>
     </p:spTree>
     <p:extLst>
       <p:ext uri="{BB962C8B-B14F-4D97-AF65-F5344CB8AC3E}">
-        <p14:creationId xmlns:p14="http://schemas.microsoft.com/office/powerpoint/2010/main" val="2831258130"/>
+        <p14:creationId xmlns:p14="http://schemas.microsoft.com/office/powerpoint/2010/main" val="645440768"/>
       </p:ext>
     </p:extLst>
   </p:cSld>
@@ -4114,7 +4323,7 @@
           <p:cNvPr id="2" name="Nadpis 1">
             <a:extLst>
               <a:ext uri="{FF2B5EF4-FFF2-40B4-BE49-F238E27FC236}">
-                <a16:creationId xmlns:a16="http://schemas.microsoft.com/office/drawing/2014/main" id="{3D7695E3-0189-6313-9200-9D4923195670}"/>
+                <a16:creationId xmlns:a16="http://schemas.microsoft.com/office/drawing/2014/main" id="{EC95B1EF-A03C-57D8-83A1-F58DA192925A}"/>
               </a:ext>
             </a:extLst>
           </p:cNvPr>
@@ -4132,69 +4341,67 @@
           <a:p>
             <a:r>
               <a:rPr lang="sk-SK" dirty="0"/>
-              <a:t>ext4 – </a:t>
+              <a:t>Štruktúra </a:t>
             </a:r>
             <a:r>
               <a:rPr lang="sk-SK" dirty="0" err="1"/>
-              <a:t>Extended</a:t>
-            </a:r>
-            <a:r>
-              <a:rPr lang="sk-SK" dirty="0"/>
-              <a:t> </a:t>
-            </a:r>
-            <a:r>
-              <a:rPr lang="sk-SK" dirty="0" err="1"/>
-              <a:t>File</a:t>
-            </a:r>
-            <a:r>
-              <a:rPr lang="sk-SK" dirty="0"/>
-              <a:t> </a:t>
-            </a:r>
-            <a:r>
-              <a:rPr lang="sk-SK" dirty="0" err="1"/>
-              <a:t>System</a:t>
+              <a:t>exFAT</a:t>
             </a:r>
             <a:endParaRPr lang="sk-SK" dirty="0"/>
           </a:p>
         </p:txBody>
       </p:sp>
-      <p:sp>
-        <p:nvSpPr>
-          <p:cNvPr id="3" name="Zástupný objekt pre obsah 2">
-            <a:extLst>
-              <a:ext uri="{FF2B5EF4-FFF2-40B4-BE49-F238E27FC236}">
-                <a16:creationId xmlns:a16="http://schemas.microsoft.com/office/drawing/2014/main" id="{7A1C5B8D-7595-1C6B-38C4-806D67EB6A4B}"/>
-              </a:ext>
-            </a:extLst>
-          </p:cNvPr>
-          <p:cNvSpPr>
-            <a:spLocks noGrp="1"/>
-          </p:cNvSpPr>
-          <p:nvPr>
-            <p:ph idx="1"/>
-          </p:nvPr>
-        </p:nvSpPr>
-        <p:spPr/>
-        <p:txBody>
-          <a:bodyPr/>
-          <a:lstStyle/>
-          <a:p>
-            <a:r>
-              <a:rPr lang="sk-SK" dirty="0"/>
-              <a:t>Pre operačné systému založené na </a:t>
-            </a:r>
-            <a:r>
-              <a:rPr lang="sk-SK" dirty="0" err="1"/>
-              <a:t>GNU+Linux</a:t>
-            </a:r>
-            <a:endParaRPr lang="sk-SK" dirty="0"/>
-          </a:p>
-        </p:txBody>
-      </p:sp>
+      <p:pic>
+        <p:nvPicPr>
+          <p:cNvPr id="3074" name="Picture 2" descr="exFAT file system Structure">
+            <a:extLst>
+              <a:ext uri="{FF2B5EF4-FFF2-40B4-BE49-F238E27FC236}">
+                <a16:creationId xmlns:a16="http://schemas.microsoft.com/office/drawing/2014/main" id="{580E65D7-0A6D-CE68-73FA-6B7E158A0AF8}"/>
+              </a:ext>
+            </a:extLst>
+          </p:cNvPr>
+          <p:cNvPicPr>
+            <a:picLocks noChangeAspect="1" noChangeArrowheads="1"/>
+          </p:cNvPicPr>
+          <p:nvPr/>
+        </p:nvPicPr>
+        <p:blipFill>
+          <a:blip r:embed="rId2">
+            <a:extLst>
+              <a:ext uri="{28A0092B-C50C-407E-A947-70E740481C1C}">
+                <a14:useLocalDpi xmlns:a14="http://schemas.microsoft.com/office/drawing/2010/main" val="0"/>
+              </a:ext>
+            </a:extLst>
+          </a:blip>
+          <a:srcRect/>
+          <a:stretch>
+            <a:fillRect/>
+          </a:stretch>
+        </p:blipFill>
+        <p:spPr bwMode="auto">
+          <a:xfrm>
+            <a:off x="2762250" y="1519237"/>
+            <a:ext cx="6667500" cy="3819525"/>
+          </a:xfrm>
+          <a:prstGeom prst="rect">
+            <a:avLst/>
+          </a:prstGeom>
+          <a:noFill/>
+          <a:extLst>
+            <a:ext uri="{909E8E84-426E-40DD-AFC4-6F175D3DCCD1}">
+              <a14:hiddenFill xmlns:a14="http://schemas.microsoft.com/office/drawing/2010/main">
+                <a:solidFill>
+                  <a:srgbClr val="FFFFFF"/>
+                </a:solidFill>
+              </a14:hiddenFill>
+            </a:ext>
+          </a:extLst>
+        </p:spPr>
+      </p:pic>
     </p:spTree>
     <p:extLst>
       <p:ext uri="{BB962C8B-B14F-4D97-AF65-F5344CB8AC3E}">
-        <p14:creationId xmlns:p14="http://schemas.microsoft.com/office/powerpoint/2010/main" val="4092469905"/>
+        <p14:creationId xmlns:p14="http://schemas.microsoft.com/office/powerpoint/2010/main" val="175943771"/>
       </p:ext>
     </p:extLst>
   </p:cSld>
@@ -4226,7 +4433,7 @@
           <p:cNvPr id="2" name="Nadpis 1">
             <a:extLst>
               <a:ext uri="{FF2B5EF4-FFF2-40B4-BE49-F238E27FC236}">
-                <a16:creationId xmlns:a16="http://schemas.microsoft.com/office/drawing/2014/main" id="{11BF8ABB-A214-7D90-4B77-9BAF3ADE995D}"/>
+                <a16:creationId xmlns:a16="http://schemas.microsoft.com/office/drawing/2014/main" id="{D4F3A823-8725-10DE-EC45-7EE590866A5C}"/>
               </a:ext>
             </a:extLst>
           </p:cNvPr>
@@ -4244,8 +4451,29 @@
           <a:p>
             <a:r>
               <a:rPr lang="sk-SK" dirty="0"/>
-              <a:t>Zmazanie súborov z disku</a:t>
-            </a:r>
+              <a:t>NTFS – New </a:t>
+            </a:r>
+            <a:r>
+              <a:rPr lang="sk-SK" dirty="0" err="1"/>
+              <a:t>Technology</a:t>
+            </a:r>
+            <a:r>
+              <a:rPr lang="sk-SK" dirty="0"/>
+              <a:t> </a:t>
+            </a:r>
+            <a:r>
+              <a:rPr lang="sk-SK" dirty="0" err="1"/>
+              <a:t>File</a:t>
+            </a:r>
+            <a:r>
+              <a:rPr lang="sk-SK" dirty="0"/>
+              <a:t> </a:t>
+            </a:r>
+            <a:r>
+              <a:rPr lang="sk-SK" dirty="0" err="1"/>
+              <a:t>System</a:t>
+            </a:r>
+            <a:endParaRPr lang="sk-SK" dirty="0"/>
           </a:p>
         </p:txBody>
       </p:sp>
@@ -4254,7 +4482,7 @@
           <p:cNvPr id="3" name="Zástupný objekt pre obsah 2">
             <a:extLst>
               <a:ext uri="{FF2B5EF4-FFF2-40B4-BE49-F238E27FC236}">
-                <a16:creationId xmlns:a16="http://schemas.microsoft.com/office/drawing/2014/main" id="{E28D8AE3-F452-7D80-CC1D-99733A033606}"/>
+                <a16:creationId xmlns:a16="http://schemas.microsoft.com/office/drawing/2014/main" id="{74203224-C5A5-CB0E-DF65-FCAF04E9E139}"/>
               </a:ext>
             </a:extLst>
           </p:cNvPr>
@@ -4270,14 +4498,25 @@
           <a:bodyPr/>
           <a:lstStyle/>
           <a:p>
-            <a:endParaRPr lang="sk-SK"/>
+            <a:r>
+              <a:rPr lang="sk-SK" dirty="0"/>
+              <a:t>Pre operačný </a:t>
+            </a:r>
+            <a:r>
+              <a:rPr lang="sk-SK" dirty="0" err="1"/>
+              <a:t>sytém</a:t>
+            </a:r>
+            <a:r>
+              <a:rPr lang="sk-SK" dirty="0"/>
+              <a:t> Windows</a:t>
+            </a:r>
           </a:p>
         </p:txBody>
       </p:sp>
     </p:spTree>
     <p:extLst>
       <p:ext uri="{BB962C8B-B14F-4D97-AF65-F5344CB8AC3E}">
-        <p14:creationId xmlns:p14="http://schemas.microsoft.com/office/powerpoint/2010/main" val="3805809406"/>
+        <p14:creationId xmlns:p14="http://schemas.microsoft.com/office/powerpoint/2010/main" val="2831258130"/>
       </p:ext>
     </p:extLst>
   </p:cSld>
@@ -4309,7 +4548,7 @@
           <p:cNvPr id="2" name="Nadpis 1">
             <a:extLst>
               <a:ext uri="{FF2B5EF4-FFF2-40B4-BE49-F238E27FC236}">
-                <a16:creationId xmlns:a16="http://schemas.microsoft.com/office/drawing/2014/main" id="{0496704C-91A8-9B8C-84F6-78A1C267A7AA}"/>
+                <a16:creationId xmlns:a16="http://schemas.microsoft.com/office/drawing/2014/main" id="{A89903CB-35AC-4150-EBCC-B79DF2B8C885}"/>
               </a:ext>
             </a:extLst>
           </p:cNvPr>
@@ -4326,42 +4565,63 @@
           <a:lstStyle/>
           <a:p>
             <a:r>
-              <a:rPr lang="sk-SK" dirty="0" err="1"/>
-              <a:t>Testdisk</a:t>
-            </a:r>
-            <a:endParaRPr lang="sk-SK" dirty="0"/>
-          </a:p>
-        </p:txBody>
-      </p:sp>
-      <p:sp>
-        <p:nvSpPr>
-          <p:cNvPr id="3" name="Zástupný objekt pre obsah 2">
-            <a:extLst>
-              <a:ext uri="{FF2B5EF4-FFF2-40B4-BE49-F238E27FC236}">
-                <a16:creationId xmlns:a16="http://schemas.microsoft.com/office/drawing/2014/main" id="{AA38D73D-833E-6718-A032-BAABDD222514}"/>
-              </a:ext>
-            </a:extLst>
-          </p:cNvPr>
-          <p:cNvSpPr>
-            <a:spLocks noGrp="1"/>
-          </p:cNvSpPr>
-          <p:nvPr>
-            <p:ph idx="1"/>
-          </p:nvPr>
-        </p:nvSpPr>
-        <p:spPr/>
-        <p:txBody>
-          <a:bodyPr/>
-          <a:lstStyle/>
-          <a:p>
-            <a:endParaRPr lang="sk-SK"/>
-          </a:p>
-        </p:txBody>
-      </p:sp>
+              <a:rPr lang="sk-SK" dirty="0"/>
+              <a:t>Štruktúra NTFS</a:t>
+            </a:r>
+          </a:p>
+        </p:txBody>
+      </p:sp>
+      <p:pic>
+        <p:nvPicPr>
+          <p:cNvPr id="1026" name="Picture 2" descr="Structure of NTFS file system">
+            <a:extLst>
+              <a:ext uri="{FF2B5EF4-FFF2-40B4-BE49-F238E27FC236}">
+                <a16:creationId xmlns:a16="http://schemas.microsoft.com/office/drawing/2014/main" id="{B01B4BEB-D59A-1B9A-350A-9717C1EA8909}"/>
+              </a:ext>
+            </a:extLst>
+          </p:cNvPr>
+          <p:cNvPicPr>
+            <a:picLocks noChangeAspect="1" noChangeArrowheads="1"/>
+          </p:cNvPicPr>
+          <p:nvPr/>
+        </p:nvPicPr>
+        <p:blipFill>
+          <a:blip r:embed="rId2">
+            <a:extLst>
+              <a:ext uri="{28A0092B-C50C-407E-A947-70E740481C1C}">
+                <a14:useLocalDpi xmlns:a14="http://schemas.microsoft.com/office/drawing/2010/main" val="0"/>
+              </a:ext>
+            </a:extLst>
+          </a:blip>
+          <a:srcRect/>
+          <a:stretch>
+            <a:fillRect/>
+          </a:stretch>
+        </p:blipFill>
+        <p:spPr bwMode="auto">
+          <a:xfrm>
+            <a:off x="2762250" y="1652587"/>
+            <a:ext cx="6667500" cy="3552825"/>
+          </a:xfrm>
+          <a:prstGeom prst="rect">
+            <a:avLst/>
+          </a:prstGeom>
+          <a:noFill/>
+          <a:extLst>
+            <a:ext uri="{909E8E84-426E-40DD-AFC4-6F175D3DCCD1}">
+              <a14:hiddenFill xmlns:a14="http://schemas.microsoft.com/office/drawing/2010/main">
+                <a:solidFill>
+                  <a:srgbClr val="FFFFFF"/>
+                </a:solidFill>
+              </a14:hiddenFill>
+            </a:ext>
+          </a:extLst>
+        </p:spPr>
+      </p:pic>
     </p:spTree>
     <p:extLst>
       <p:ext uri="{BB962C8B-B14F-4D97-AF65-F5344CB8AC3E}">
-        <p14:creationId xmlns:p14="http://schemas.microsoft.com/office/powerpoint/2010/main" val="3855801372"/>
+        <p14:creationId xmlns:p14="http://schemas.microsoft.com/office/powerpoint/2010/main" val="4245393544"/>
       </p:ext>
     </p:extLst>
   </p:cSld>

</xml_diff>

<commit_message>
images moved to ./images
</commit_message>
<xml_diff>
--- a/ProgressReport1-Cederle-Marek.pptx
+++ b/ProgressReport1-Cederle-Marek.pptx
@@ -514,252 +514,10 @@
           <a:bodyPr/>
           <a:lstStyle/>
           <a:p>
-            <a:pPr marL="171450" marR="0" lvl="0" indent="-171450" algn="l" defTabSz="914400" rtl="0" eaLnBrk="1" fontAlgn="auto" latinLnBrk="0" hangingPunct="1">
-              <a:lnSpc>
-                <a:spcPct val="100000"/>
-              </a:lnSpc>
-              <a:spcBef>
-                <a:spcPts val="0"/>
-              </a:spcBef>
-              <a:spcAft>
-                <a:spcPts val="0"/>
-              </a:spcAft>
-              <a:buClrTx/>
-              <a:buSzTx/>
-              <a:buFontTx/>
-              <a:buChar char="-"/>
-              <a:tabLst/>
-              <a:defRPr/>
-            </a:pPr>
-            <a:r>
-              <a:rPr lang="sk-SK" b="0" dirty="0">
-                <a:solidFill>
-                  <a:srgbClr val="F8F8F2"/>
-                </a:solidFill>
-                <a:effectLst/>
-                <a:latin typeface="Consolas" panose="020B0609020204030204" pitchFamily="49" charset="0"/>
-              </a:rPr>
-              <a:t>Obsahuje </a:t>
-            </a:r>
-            <a:r>
-              <a:rPr lang="sk-SK" b="0" dirty="0" err="1">
-                <a:solidFill>
-                  <a:srgbClr val="F8F8F2"/>
-                </a:solidFill>
-                <a:effectLst/>
-                <a:latin typeface="Consolas" panose="020B0609020204030204" pitchFamily="49" charset="0"/>
-              </a:rPr>
-              <a:t>boot</a:t>
-            </a:r>
-            <a:r>
-              <a:rPr lang="sk-SK" b="0" dirty="0">
-                <a:solidFill>
-                  <a:srgbClr val="F8F8F2"/>
-                </a:solidFill>
-                <a:effectLst/>
-                <a:latin typeface="Consolas" panose="020B0609020204030204" pitchFamily="49" charset="0"/>
-              </a:rPr>
-              <a:t> </a:t>
-            </a:r>
-            <a:r>
-              <a:rPr lang="sk-SK" b="0" dirty="0" err="1">
-                <a:solidFill>
-                  <a:srgbClr val="F8F8F2"/>
-                </a:solidFill>
-                <a:effectLst/>
-                <a:latin typeface="Consolas" panose="020B0609020204030204" pitchFamily="49" charset="0"/>
-              </a:rPr>
-              <a:t>sector</a:t>
-            </a:r>
-            <a:r>
-              <a:rPr lang="sk-SK" b="0" dirty="0">
-                <a:solidFill>
-                  <a:srgbClr val="F8F8F2"/>
-                </a:solidFill>
-                <a:effectLst/>
-                <a:latin typeface="Consolas" panose="020B0609020204030204" pitchFamily="49" charset="0"/>
-              </a:rPr>
-              <a:t>, BPB (BIOS Parameter </a:t>
-            </a:r>
-            <a:r>
-              <a:rPr lang="sk-SK" b="0" dirty="0" err="1">
-                <a:solidFill>
-                  <a:srgbClr val="F8F8F2"/>
-                </a:solidFill>
-                <a:effectLst/>
-                <a:latin typeface="Consolas" panose="020B0609020204030204" pitchFamily="49" charset="0"/>
-              </a:rPr>
-              <a:t>Block</a:t>
-            </a:r>
-            <a:r>
-              <a:rPr lang="sk-SK" b="0" dirty="0">
-                <a:solidFill>
-                  <a:srgbClr val="F8F8F2"/>
-                </a:solidFill>
-                <a:effectLst/>
-                <a:latin typeface="Consolas" panose="020B0609020204030204" pitchFamily="49" charset="0"/>
-              </a:rPr>
-              <a:t>) a celkovo informácie potrebné pre bootovanie a súborový systém.</a:t>
-            </a:r>
-          </a:p>
-          <a:p>
-            <a:pPr marL="171450" marR="0" lvl="0" indent="-171450" algn="l" defTabSz="914400" rtl="0" eaLnBrk="1" fontAlgn="auto" latinLnBrk="0" hangingPunct="1">
-              <a:lnSpc>
-                <a:spcPct val="100000"/>
-              </a:lnSpc>
-              <a:spcBef>
-                <a:spcPts val="0"/>
-              </a:spcBef>
-              <a:spcAft>
-                <a:spcPts val="0"/>
-              </a:spcAft>
-              <a:buClrTx/>
-              <a:buSzTx/>
-              <a:buFontTx/>
-              <a:buChar char="-"/>
-              <a:tabLst/>
-              <a:defRPr/>
-            </a:pPr>
-            <a:r>
-              <a:rPr lang="pl-PL" b="0" dirty="0">
-                <a:solidFill>
-                  <a:srgbClr val="F8F8F2"/>
-                </a:solidFill>
-                <a:effectLst/>
-                <a:latin typeface="Consolas" panose="020B0609020204030204" pitchFamily="49" charset="0"/>
-              </a:rPr>
-              <a:t>FAT tabuľka obsahujúca informácie o súboroch a ich umiestnení na disku.</a:t>
-            </a:r>
-          </a:p>
-          <a:p>
-            <a:pPr marL="171450" marR="0" lvl="0" indent="-171450" algn="l" defTabSz="914400" rtl="0" eaLnBrk="1" fontAlgn="auto" latinLnBrk="0" hangingPunct="1">
-              <a:lnSpc>
-                <a:spcPct val="100000"/>
-              </a:lnSpc>
-              <a:spcBef>
-                <a:spcPts val="0"/>
-              </a:spcBef>
-              <a:spcAft>
-                <a:spcPts val="0"/>
-              </a:spcAft>
-              <a:buClrTx/>
-              <a:buSzTx/>
-              <a:buFontTx/>
-              <a:buChar char="-"/>
-              <a:tabLst/>
-              <a:defRPr/>
-            </a:pPr>
-            <a:r>
-              <a:rPr lang="sk-SK" b="0" dirty="0">
-                <a:solidFill>
-                  <a:srgbClr val="F8F8F2"/>
-                </a:solidFill>
-                <a:effectLst/>
-                <a:latin typeface="Consolas" panose="020B0609020204030204" pitchFamily="49" charset="0"/>
-              </a:rPr>
-              <a:t>Obsahuje kópiu FAT tabuľky.</a:t>
-            </a:r>
-          </a:p>
-          <a:p>
-            <a:pPr marL="171450" marR="0" lvl="0" indent="-171450" algn="l" defTabSz="914400" rtl="0" eaLnBrk="1" fontAlgn="auto" latinLnBrk="0" hangingPunct="1">
-              <a:lnSpc>
-                <a:spcPct val="100000"/>
-              </a:lnSpc>
-              <a:spcBef>
-                <a:spcPts val="0"/>
-              </a:spcBef>
-              <a:spcAft>
-                <a:spcPts val="0"/>
-              </a:spcAft>
-              <a:buClrTx/>
-              <a:buSzTx/>
-              <a:buFontTx/>
-              <a:buChar char="-"/>
-              <a:tabLst/>
-              <a:defRPr/>
-            </a:pPr>
-            <a:r>
-              <a:rPr lang="sk-SK" b="0" dirty="0">
-                <a:solidFill>
-                  <a:srgbClr val="F8F8F2"/>
-                </a:solidFill>
-                <a:effectLst/>
-                <a:latin typeface="Consolas" panose="020B0609020204030204" pitchFamily="49" charset="0"/>
-              </a:rPr>
-              <a:t>Niekedy sa nazýva aj </a:t>
-            </a:r>
-            <a:r>
-              <a:rPr lang="sk-SK" b="0" dirty="0" err="1">
-                <a:solidFill>
-                  <a:srgbClr val="F8F8F2"/>
-                </a:solidFill>
-                <a:effectLst/>
-                <a:latin typeface="Consolas" panose="020B0609020204030204" pitchFamily="49" charset="0"/>
-              </a:rPr>
-              <a:t>Root</a:t>
-            </a:r>
-            <a:r>
-              <a:rPr lang="sk-SK" b="0" dirty="0">
-                <a:solidFill>
-                  <a:srgbClr val="F8F8F2"/>
-                </a:solidFill>
-                <a:effectLst/>
-                <a:latin typeface="Consolas" panose="020B0609020204030204" pitchFamily="49" charset="0"/>
-              </a:rPr>
-              <a:t> </a:t>
-            </a:r>
-            <a:r>
-              <a:rPr lang="sk-SK" b="0" dirty="0" err="1">
-                <a:solidFill>
-                  <a:srgbClr val="F8F8F2"/>
-                </a:solidFill>
-                <a:effectLst/>
-                <a:latin typeface="Consolas" panose="020B0609020204030204" pitchFamily="49" charset="0"/>
-              </a:rPr>
-              <a:t>Directory</a:t>
-            </a:r>
-            <a:r>
-              <a:rPr lang="sk-SK" b="0" dirty="0">
-                <a:solidFill>
-                  <a:srgbClr val="F8F8F2"/>
-                </a:solidFill>
-                <a:effectLst/>
-                <a:latin typeface="Consolas" panose="020B0609020204030204" pitchFamily="49" charset="0"/>
-              </a:rPr>
-              <a:t>. Používa sa iba v derivátoch FAT12 a FAT16. Obsahuje informácie o súboroch, ktoré sa nachádzajú priamo v koreňovom adresári.</a:t>
-            </a:r>
-          </a:p>
-          <a:p>
-            <a:pPr marL="171450" marR="0" lvl="0" indent="-171450" algn="l" defTabSz="914400" rtl="0" eaLnBrk="1" fontAlgn="auto" latinLnBrk="0" hangingPunct="1">
-              <a:lnSpc>
-                <a:spcPct val="100000"/>
-              </a:lnSpc>
-              <a:spcBef>
-                <a:spcPts val="0"/>
-              </a:spcBef>
-              <a:spcAft>
-                <a:spcPts val="0"/>
-              </a:spcAft>
-              <a:buClrTx/>
-              <a:buSzTx/>
-              <a:buFontTx/>
-              <a:buChar char="-"/>
-              <a:tabLst/>
-              <a:defRPr/>
-            </a:pPr>
-            <a:r>
-              <a:rPr lang="sk-SK" b="0" dirty="0">
-                <a:solidFill>
-                  <a:srgbClr val="F8F8F2"/>
-                </a:solidFill>
-                <a:effectLst/>
-                <a:latin typeface="Consolas" panose="020B0609020204030204" pitchFamily="49" charset="0"/>
-              </a:rPr>
-              <a:t>Obsahuje samotné dáta súborov.</a:t>
-            </a:r>
-          </a:p>
-          <a:p>
-            <a:endParaRPr lang="sk-SK" dirty="0"/>
+            <a:r>
+              <a:rPr lang="sk-SK" dirty="0"/>
+              <a:t>Posledný bod: z čoho vyplývajú následne maximálne veľkosti súborov a oddielov</a:t>
+            </a:r>
           </a:p>
         </p:txBody>
       </p:sp>
@@ -780,7 +538,7 @@
           <a:p>
             <a:fld id="{5C718C61-028C-4B62-904D-AF06C416AFC9}" type="slidenum">
               <a:rPr lang="sk-SK" smtClean="0"/>
-              <a:t>5</a:t>
+              <a:t>3</a:t>
             </a:fld>
             <a:endParaRPr lang="sk-SK"/>
           </a:p>
@@ -789,7 +547,7 @@
     </p:spTree>
     <p:extLst>
       <p:ext uri="{BB962C8B-B14F-4D97-AF65-F5344CB8AC3E}">
-        <p14:creationId xmlns:p14="http://schemas.microsoft.com/office/powerpoint/2010/main" val="3763518644"/>
+        <p14:creationId xmlns:p14="http://schemas.microsoft.com/office/powerpoint/2010/main" val="3028971719"/>
       </p:ext>
     </p:extLst>
   </p:cSld>
@@ -843,6 +601,335 @@
           <a:bodyPr/>
           <a:lstStyle/>
           <a:p>
+            <a:pPr marL="171450" marR="0" lvl="0" indent="-171450" algn="l" defTabSz="914400" rtl="0" eaLnBrk="1" fontAlgn="auto" latinLnBrk="0" hangingPunct="1">
+              <a:lnSpc>
+                <a:spcPct val="100000"/>
+              </a:lnSpc>
+              <a:spcBef>
+                <a:spcPts val="0"/>
+              </a:spcBef>
+              <a:spcAft>
+                <a:spcPts val="0"/>
+              </a:spcAft>
+              <a:buClrTx/>
+              <a:buSzTx/>
+              <a:buFontTx/>
+              <a:buChar char="-"/>
+              <a:tabLst/>
+              <a:defRPr/>
+            </a:pPr>
+            <a:r>
+              <a:rPr lang="sk-SK" b="0" dirty="0">
+                <a:solidFill>
+                  <a:srgbClr val="F8F8F2"/>
+                </a:solidFill>
+                <a:effectLst/>
+                <a:latin typeface="Consolas" panose="020B0609020204030204" pitchFamily="49" charset="0"/>
+              </a:rPr>
+              <a:t>Obsahuje </a:t>
+            </a:r>
+            <a:r>
+              <a:rPr lang="sk-SK" b="0" dirty="0" err="1">
+                <a:solidFill>
+                  <a:srgbClr val="F8F8F2"/>
+                </a:solidFill>
+                <a:effectLst/>
+                <a:latin typeface="Consolas" panose="020B0609020204030204" pitchFamily="49" charset="0"/>
+              </a:rPr>
+              <a:t>boot</a:t>
+            </a:r>
+            <a:r>
+              <a:rPr lang="sk-SK" b="0" dirty="0">
+                <a:solidFill>
+                  <a:srgbClr val="F8F8F2"/>
+                </a:solidFill>
+                <a:effectLst/>
+                <a:latin typeface="Consolas" panose="020B0609020204030204" pitchFamily="49" charset="0"/>
+              </a:rPr>
+              <a:t> </a:t>
+            </a:r>
+            <a:r>
+              <a:rPr lang="sk-SK" b="0" dirty="0" err="1">
+                <a:solidFill>
+                  <a:srgbClr val="F8F8F2"/>
+                </a:solidFill>
+                <a:effectLst/>
+                <a:latin typeface="Consolas" panose="020B0609020204030204" pitchFamily="49" charset="0"/>
+              </a:rPr>
+              <a:t>sector</a:t>
+            </a:r>
+            <a:r>
+              <a:rPr lang="sk-SK" b="0" dirty="0">
+                <a:solidFill>
+                  <a:srgbClr val="F8F8F2"/>
+                </a:solidFill>
+                <a:effectLst/>
+                <a:latin typeface="Consolas" panose="020B0609020204030204" pitchFamily="49" charset="0"/>
+              </a:rPr>
+              <a:t>, BPB (BIOS Parameter </a:t>
+            </a:r>
+            <a:r>
+              <a:rPr lang="sk-SK" b="0" dirty="0" err="1">
+                <a:solidFill>
+                  <a:srgbClr val="F8F8F2"/>
+                </a:solidFill>
+                <a:effectLst/>
+                <a:latin typeface="Consolas" panose="020B0609020204030204" pitchFamily="49" charset="0"/>
+              </a:rPr>
+              <a:t>Block</a:t>
+            </a:r>
+            <a:r>
+              <a:rPr lang="sk-SK" b="0" dirty="0">
+                <a:solidFill>
+                  <a:srgbClr val="F8F8F2"/>
+                </a:solidFill>
+                <a:effectLst/>
+                <a:latin typeface="Consolas" panose="020B0609020204030204" pitchFamily="49" charset="0"/>
+              </a:rPr>
+              <a:t>) a celkovo informácie potrebné pre bootovanie a súborový systém.</a:t>
+            </a:r>
+          </a:p>
+          <a:p>
+            <a:pPr marL="171450" marR="0" lvl="0" indent="-171450" algn="l" defTabSz="914400" rtl="0" eaLnBrk="1" fontAlgn="auto" latinLnBrk="0" hangingPunct="1">
+              <a:lnSpc>
+                <a:spcPct val="100000"/>
+              </a:lnSpc>
+              <a:spcBef>
+                <a:spcPts val="0"/>
+              </a:spcBef>
+              <a:spcAft>
+                <a:spcPts val="0"/>
+              </a:spcAft>
+              <a:buClrTx/>
+              <a:buSzTx/>
+              <a:buFontTx/>
+              <a:buChar char="-"/>
+              <a:tabLst/>
+              <a:defRPr/>
+            </a:pPr>
+            <a:r>
+              <a:rPr lang="pl-PL" b="0" dirty="0">
+                <a:solidFill>
+                  <a:srgbClr val="F8F8F2"/>
+                </a:solidFill>
+                <a:effectLst/>
+                <a:latin typeface="Consolas" panose="020B0609020204030204" pitchFamily="49" charset="0"/>
+              </a:rPr>
+              <a:t>FAT tabuľka obsahujúca informácie o súboroch a ich umiestnení na disku.</a:t>
+            </a:r>
+          </a:p>
+          <a:p>
+            <a:pPr marL="171450" marR="0" lvl="0" indent="-171450" algn="l" defTabSz="914400" rtl="0" eaLnBrk="1" fontAlgn="auto" latinLnBrk="0" hangingPunct="1">
+              <a:lnSpc>
+                <a:spcPct val="100000"/>
+              </a:lnSpc>
+              <a:spcBef>
+                <a:spcPts val="0"/>
+              </a:spcBef>
+              <a:spcAft>
+                <a:spcPts val="0"/>
+              </a:spcAft>
+              <a:buClrTx/>
+              <a:buSzTx/>
+              <a:buFontTx/>
+              <a:buChar char="-"/>
+              <a:tabLst/>
+              <a:defRPr/>
+            </a:pPr>
+            <a:r>
+              <a:rPr lang="sk-SK" b="0" dirty="0">
+                <a:solidFill>
+                  <a:srgbClr val="F8F8F2"/>
+                </a:solidFill>
+                <a:effectLst/>
+                <a:latin typeface="Consolas" panose="020B0609020204030204" pitchFamily="49" charset="0"/>
+              </a:rPr>
+              <a:t>Obsahuje kópiu FAT tabuľky.</a:t>
+            </a:r>
+          </a:p>
+          <a:p>
+            <a:pPr marL="171450" marR="0" lvl="0" indent="-171450" algn="l" defTabSz="914400" rtl="0" eaLnBrk="1" fontAlgn="auto" latinLnBrk="0" hangingPunct="1">
+              <a:lnSpc>
+                <a:spcPct val="100000"/>
+              </a:lnSpc>
+              <a:spcBef>
+                <a:spcPts val="0"/>
+              </a:spcBef>
+              <a:spcAft>
+                <a:spcPts val="0"/>
+              </a:spcAft>
+              <a:buClrTx/>
+              <a:buSzTx/>
+              <a:buFontTx/>
+              <a:buChar char="-"/>
+              <a:tabLst/>
+              <a:defRPr/>
+            </a:pPr>
+            <a:r>
+              <a:rPr lang="sk-SK" b="0" dirty="0">
+                <a:solidFill>
+                  <a:srgbClr val="F8F8F2"/>
+                </a:solidFill>
+                <a:effectLst/>
+                <a:latin typeface="Consolas" panose="020B0609020204030204" pitchFamily="49" charset="0"/>
+              </a:rPr>
+              <a:t>Niekedy sa nazýva aj </a:t>
+            </a:r>
+            <a:r>
+              <a:rPr lang="sk-SK" b="0" dirty="0" err="1">
+                <a:solidFill>
+                  <a:srgbClr val="F8F8F2"/>
+                </a:solidFill>
+                <a:effectLst/>
+                <a:latin typeface="Consolas" panose="020B0609020204030204" pitchFamily="49" charset="0"/>
+              </a:rPr>
+              <a:t>Root</a:t>
+            </a:r>
+            <a:r>
+              <a:rPr lang="sk-SK" b="0" dirty="0">
+                <a:solidFill>
+                  <a:srgbClr val="F8F8F2"/>
+                </a:solidFill>
+                <a:effectLst/>
+                <a:latin typeface="Consolas" panose="020B0609020204030204" pitchFamily="49" charset="0"/>
+              </a:rPr>
+              <a:t> </a:t>
+            </a:r>
+            <a:r>
+              <a:rPr lang="sk-SK" b="0" dirty="0" err="1">
+                <a:solidFill>
+                  <a:srgbClr val="F8F8F2"/>
+                </a:solidFill>
+                <a:effectLst/>
+                <a:latin typeface="Consolas" panose="020B0609020204030204" pitchFamily="49" charset="0"/>
+              </a:rPr>
+              <a:t>Directory</a:t>
+            </a:r>
+            <a:r>
+              <a:rPr lang="sk-SK" b="0" dirty="0">
+                <a:solidFill>
+                  <a:srgbClr val="F8F8F2"/>
+                </a:solidFill>
+                <a:effectLst/>
+                <a:latin typeface="Consolas" panose="020B0609020204030204" pitchFamily="49" charset="0"/>
+              </a:rPr>
+              <a:t>. Používa sa iba v derivátoch FAT12 a FAT16. Obsahuje informácie o súboroch, ktoré sa nachádzajú priamo v koreňovom adresári.</a:t>
+            </a:r>
+          </a:p>
+          <a:p>
+            <a:pPr marL="171450" marR="0" lvl="0" indent="-171450" algn="l" defTabSz="914400" rtl="0" eaLnBrk="1" fontAlgn="auto" latinLnBrk="0" hangingPunct="1">
+              <a:lnSpc>
+                <a:spcPct val="100000"/>
+              </a:lnSpc>
+              <a:spcBef>
+                <a:spcPts val="0"/>
+              </a:spcBef>
+              <a:spcAft>
+                <a:spcPts val="0"/>
+              </a:spcAft>
+              <a:buClrTx/>
+              <a:buSzTx/>
+              <a:buFontTx/>
+              <a:buChar char="-"/>
+              <a:tabLst/>
+              <a:defRPr/>
+            </a:pPr>
+            <a:r>
+              <a:rPr lang="sk-SK" b="0" dirty="0">
+                <a:solidFill>
+                  <a:srgbClr val="F8F8F2"/>
+                </a:solidFill>
+                <a:effectLst/>
+                <a:latin typeface="Consolas" panose="020B0609020204030204" pitchFamily="49" charset="0"/>
+              </a:rPr>
+              <a:t>Obsahuje samotné dáta súborov.</a:t>
+            </a:r>
+          </a:p>
+          <a:p>
+            <a:endParaRPr lang="sk-SK" dirty="0"/>
+          </a:p>
+        </p:txBody>
+      </p:sp>
+      <p:sp>
+        <p:nvSpPr>
+          <p:cNvPr id="4" name="Zástupný objekt pre číslo snímky 3"/>
+          <p:cNvSpPr>
+            <a:spLocks noGrp="1"/>
+          </p:cNvSpPr>
+          <p:nvPr>
+            <p:ph type="sldNum" sz="quarter" idx="5"/>
+          </p:nvPr>
+        </p:nvSpPr>
+        <p:spPr/>
+        <p:txBody>
+          <a:bodyPr/>
+          <a:lstStyle/>
+          <a:p>
+            <a:fld id="{5C718C61-028C-4B62-904D-AF06C416AFC9}" type="slidenum">
+              <a:rPr lang="sk-SK" smtClean="0"/>
+              <a:t>5</a:t>
+            </a:fld>
+            <a:endParaRPr lang="sk-SK"/>
+          </a:p>
+        </p:txBody>
+      </p:sp>
+    </p:spTree>
+    <p:extLst>
+      <p:ext uri="{BB962C8B-B14F-4D97-AF65-F5344CB8AC3E}">
+        <p14:creationId xmlns:p14="http://schemas.microsoft.com/office/powerpoint/2010/main" val="3763518644"/>
+      </p:ext>
+    </p:extLst>
+  </p:cSld>
+  <p:clrMapOvr>
+    <a:masterClrMapping/>
+  </p:clrMapOvr>
+</p:notes>
+</file>
+
+<file path=ppt/notesSlides/notesSlide3.xml><?xml version="1.0" encoding="utf-8"?>
+<p:notes xmlns:a="http://schemas.openxmlformats.org/drawingml/2006/main" xmlns:r="http://schemas.openxmlformats.org/officeDocument/2006/relationships" xmlns:p="http://schemas.openxmlformats.org/presentationml/2006/main">
+  <p:cSld>
+    <p:spTree>
+      <p:nvGrpSpPr>
+        <p:cNvPr id="1" name=""/>
+        <p:cNvGrpSpPr/>
+        <p:nvPr/>
+      </p:nvGrpSpPr>
+      <p:grpSpPr>
+        <a:xfrm>
+          <a:off x="0" y="0"/>
+          <a:ext cx="0" cy="0"/>
+          <a:chOff x="0" y="0"/>
+          <a:chExt cx="0" cy="0"/>
+        </a:xfrm>
+      </p:grpSpPr>
+      <p:sp>
+        <p:nvSpPr>
+          <p:cNvPr id="2" name="Zástupný objekt pre obrázok snímky 1"/>
+          <p:cNvSpPr>
+            <a:spLocks noGrp="1" noRot="1" noChangeAspect="1"/>
+          </p:cNvSpPr>
+          <p:nvPr>
+            <p:ph type="sldImg"/>
+          </p:nvPr>
+        </p:nvSpPr>
+        <p:spPr/>
+      </p:sp>
+      <p:sp>
+        <p:nvSpPr>
+          <p:cNvPr id="3" name="Zástupný objekt pre poznámky 2"/>
+          <p:cNvSpPr>
+            <a:spLocks noGrp="1"/>
+          </p:cNvSpPr>
+          <p:nvPr>
+            <p:ph type="body" idx="1"/>
+          </p:nvPr>
+        </p:nvSpPr>
+        <p:spPr/>
+        <p:txBody>
+          <a:bodyPr/>
+          <a:lstStyle/>
+          <a:p>
             <a:endParaRPr lang="sk-SK"/>
           </a:p>
         </p:txBody>
@@ -883,7 +970,469 @@
 </p:notes>
 </file>
 
-<file path=ppt/notesSlides/notesSlide3.xml><?xml version="1.0" encoding="utf-8"?>
+<file path=ppt/notesSlides/notesSlide4.xml><?xml version="1.0" encoding="utf-8"?>
+<p:notes xmlns:a="http://schemas.openxmlformats.org/drawingml/2006/main" xmlns:r="http://schemas.openxmlformats.org/officeDocument/2006/relationships" xmlns:p="http://schemas.openxmlformats.org/presentationml/2006/main">
+  <p:cSld>
+    <p:spTree>
+      <p:nvGrpSpPr>
+        <p:cNvPr id="1" name=""/>
+        <p:cNvGrpSpPr/>
+        <p:nvPr/>
+      </p:nvGrpSpPr>
+      <p:grpSpPr>
+        <a:xfrm>
+          <a:off x="0" y="0"/>
+          <a:ext cx="0" cy="0"/>
+          <a:chOff x="0" y="0"/>
+          <a:chExt cx="0" cy="0"/>
+        </a:xfrm>
+      </p:grpSpPr>
+      <p:sp>
+        <p:nvSpPr>
+          <p:cNvPr id="2" name="Zástupný objekt pre obrázok snímky 1"/>
+          <p:cNvSpPr>
+            <a:spLocks noGrp="1" noRot="1" noChangeAspect="1"/>
+          </p:cNvSpPr>
+          <p:nvPr>
+            <p:ph type="sldImg"/>
+          </p:nvPr>
+        </p:nvSpPr>
+        <p:spPr/>
+      </p:sp>
+      <p:sp>
+        <p:nvSpPr>
+          <p:cNvPr id="3" name="Zástupný objekt pre poznámky 2"/>
+          <p:cNvSpPr>
+            <a:spLocks noGrp="1"/>
+          </p:cNvSpPr>
+          <p:nvPr>
+            <p:ph type="body" idx="1"/>
+          </p:nvPr>
+        </p:nvSpPr>
+        <p:spPr/>
+        <p:txBody>
+          <a:bodyPr/>
+          <a:lstStyle/>
+          <a:p>
+            <a:pPr marL="171450" marR="0" lvl="0" indent="-171450" algn="l" defTabSz="914400" rtl="0" eaLnBrk="1" fontAlgn="auto" latinLnBrk="0" hangingPunct="1">
+              <a:lnSpc>
+                <a:spcPct val="100000"/>
+              </a:lnSpc>
+              <a:spcBef>
+                <a:spcPts val="0"/>
+              </a:spcBef>
+              <a:spcAft>
+                <a:spcPts val="0"/>
+              </a:spcAft>
+              <a:buClrTx/>
+              <a:buSzTx/>
+              <a:buFontTx/>
+              <a:buChar char="-"/>
+              <a:tabLst/>
+              <a:defRPr/>
+            </a:pPr>
+            <a:r>
+              <a:rPr lang="sk-SK" b="0" dirty="0">
+                <a:solidFill>
+                  <a:srgbClr val="F8F8F2"/>
+                </a:solidFill>
+                <a:effectLst/>
+                <a:latin typeface="Consolas" panose="020B0609020204030204" pitchFamily="49" charset="0"/>
+              </a:rPr>
+              <a:t>Informácie potrebné pre bootovanie.</a:t>
+            </a:r>
+          </a:p>
+          <a:p>
+            <a:pPr marL="171450" marR="0" lvl="0" indent="-171450" algn="l" defTabSz="914400" rtl="0" eaLnBrk="1" fontAlgn="auto" latinLnBrk="0" hangingPunct="1">
+              <a:lnSpc>
+                <a:spcPct val="100000"/>
+              </a:lnSpc>
+              <a:spcBef>
+                <a:spcPts val="0"/>
+              </a:spcBef>
+              <a:spcAft>
+                <a:spcPts val="0"/>
+              </a:spcAft>
+              <a:buClrTx/>
+              <a:buSzTx/>
+              <a:buFontTx/>
+              <a:buChar char="-"/>
+              <a:tabLst/>
+              <a:defRPr/>
+            </a:pPr>
+            <a:r>
+              <a:rPr lang="sk-SK" b="0" dirty="0">
+                <a:solidFill>
+                  <a:srgbClr val="F8F8F2"/>
+                </a:solidFill>
+                <a:effectLst/>
+                <a:latin typeface="Consolas" panose="020B0609020204030204" pitchFamily="49" charset="0"/>
+              </a:rPr>
+              <a:t>Záloha </a:t>
+            </a:r>
+            <a:r>
+              <a:rPr lang="sk-SK" b="0" dirty="0" err="1">
+                <a:solidFill>
+                  <a:srgbClr val="F8F8F2"/>
+                </a:solidFill>
+                <a:effectLst/>
+                <a:latin typeface="Consolas" panose="020B0609020204030204" pitchFamily="49" charset="0"/>
+              </a:rPr>
+              <a:t>Main</a:t>
+            </a:r>
+            <a:r>
+              <a:rPr lang="sk-SK" b="0" dirty="0">
+                <a:solidFill>
+                  <a:srgbClr val="F8F8F2"/>
+                </a:solidFill>
+                <a:effectLst/>
+                <a:latin typeface="Consolas" panose="020B0609020204030204" pitchFamily="49" charset="0"/>
+              </a:rPr>
+              <a:t> </a:t>
+            </a:r>
+            <a:r>
+              <a:rPr lang="sk-SK" b="0" dirty="0" err="1">
+                <a:solidFill>
+                  <a:srgbClr val="F8F8F2"/>
+                </a:solidFill>
+                <a:effectLst/>
+                <a:latin typeface="Consolas" panose="020B0609020204030204" pitchFamily="49" charset="0"/>
+              </a:rPr>
+              <a:t>Boot</a:t>
+            </a:r>
+            <a:r>
+              <a:rPr lang="sk-SK" b="0" dirty="0">
+                <a:solidFill>
+                  <a:srgbClr val="F8F8F2"/>
+                </a:solidFill>
+                <a:effectLst/>
+                <a:latin typeface="Consolas" panose="020B0609020204030204" pitchFamily="49" charset="0"/>
+              </a:rPr>
+              <a:t> </a:t>
+            </a:r>
+            <a:r>
+              <a:rPr lang="sk-SK" b="0" dirty="0" err="1">
+                <a:solidFill>
+                  <a:srgbClr val="F8F8F2"/>
+                </a:solidFill>
+                <a:effectLst/>
+                <a:latin typeface="Consolas" panose="020B0609020204030204" pitchFamily="49" charset="0"/>
+              </a:rPr>
+              <a:t>Region</a:t>
+            </a:r>
+            <a:r>
+              <a:rPr lang="sk-SK" b="0" dirty="0">
+                <a:solidFill>
+                  <a:srgbClr val="F8F8F2"/>
+                </a:solidFill>
+                <a:effectLst/>
+                <a:latin typeface="Consolas" panose="020B0609020204030204" pitchFamily="49" charset="0"/>
+              </a:rPr>
+              <a:t>.</a:t>
+            </a:r>
+          </a:p>
+          <a:p>
+            <a:pPr marL="171450" marR="0" lvl="0" indent="-171450" algn="l" defTabSz="914400" rtl="0" eaLnBrk="1" fontAlgn="auto" latinLnBrk="0" hangingPunct="1">
+              <a:lnSpc>
+                <a:spcPct val="100000"/>
+              </a:lnSpc>
+              <a:spcBef>
+                <a:spcPts val="0"/>
+              </a:spcBef>
+              <a:spcAft>
+                <a:spcPts val="0"/>
+              </a:spcAft>
+              <a:buClrTx/>
+              <a:buSzTx/>
+              <a:buFontTx/>
+              <a:buChar char="-"/>
+              <a:tabLst/>
+              <a:defRPr/>
+            </a:pPr>
+            <a:endParaRPr lang="sk-SK" b="0" dirty="0">
+              <a:solidFill>
+                <a:srgbClr val="F8F8F2"/>
+              </a:solidFill>
+              <a:effectLst/>
+              <a:latin typeface="Consolas" panose="020B0609020204030204" pitchFamily="49" charset="0"/>
+            </a:endParaRPr>
+          </a:p>
+          <a:p>
+            <a:pPr marL="171450" marR="0" lvl="0" indent="-171450" algn="l" defTabSz="914400" rtl="0" eaLnBrk="1" fontAlgn="auto" latinLnBrk="0" hangingPunct="1">
+              <a:lnSpc>
+                <a:spcPct val="100000"/>
+              </a:lnSpc>
+              <a:spcBef>
+                <a:spcPts val="0"/>
+              </a:spcBef>
+              <a:spcAft>
+                <a:spcPts val="0"/>
+              </a:spcAft>
+              <a:buClrTx/>
+              <a:buSzTx/>
+              <a:buFontTx/>
+              <a:buChar char="-"/>
+              <a:tabLst/>
+              <a:defRPr/>
+            </a:pPr>
+            <a:r>
+              <a:rPr lang="sk-SK" b="0" dirty="0">
+                <a:solidFill>
+                  <a:srgbClr val="F8F8F2"/>
+                </a:solidFill>
+                <a:effectLst/>
+                <a:latin typeface="Consolas" panose="020B0609020204030204" pitchFamily="49" charset="0"/>
+              </a:rPr>
+              <a:t>FAT </a:t>
+            </a:r>
+            <a:r>
+              <a:rPr lang="sk-SK" b="0" dirty="0" err="1">
+                <a:solidFill>
+                  <a:srgbClr val="F8F8F2"/>
+                </a:solidFill>
+                <a:effectLst/>
+                <a:latin typeface="Consolas" panose="020B0609020204030204" pitchFamily="49" charset="0"/>
+              </a:rPr>
+              <a:t>offset</a:t>
+            </a:r>
+            <a:r>
+              <a:rPr lang="sk-SK" b="0" dirty="0">
+                <a:solidFill>
+                  <a:srgbClr val="F8F8F2"/>
+                </a:solidFill>
+                <a:effectLst/>
+                <a:latin typeface="Consolas" panose="020B0609020204030204" pitchFamily="49" charset="0"/>
+              </a:rPr>
+              <a:t> a veľkosť.</a:t>
+            </a:r>
+          </a:p>
+          <a:p>
+            <a:pPr marL="171450" marR="0" lvl="0" indent="-171450" algn="l" defTabSz="914400" rtl="0" eaLnBrk="1" fontAlgn="auto" latinLnBrk="0" hangingPunct="1">
+              <a:lnSpc>
+                <a:spcPct val="100000"/>
+              </a:lnSpc>
+              <a:spcBef>
+                <a:spcPts val="0"/>
+              </a:spcBef>
+              <a:spcAft>
+                <a:spcPts val="0"/>
+              </a:spcAft>
+              <a:buClrTx/>
+              <a:buSzTx/>
+              <a:buFontTx/>
+              <a:buChar char="-"/>
+              <a:tabLst/>
+              <a:defRPr/>
+            </a:pPr>
+            <a:r>
+              <a:rPr lang="pl-PL" b="0" dirty="0">
+                <a:solidFill>
+                  <a:srgbClr val="F8F8F2"/>
+                </a:solidFill>
+                <a:effectLst/>
+                <a:latin typeface="Consolas" panose="020B0609020204030204" pitchFamily="49" charset="0"/>
+              </a:rPr>
+              <a:t>FAT tabuľka obsahujúca informácie o súboroch a ich umiestnení na </a:t>
+            </a:r>
+          </a:p>
+          <a:p>
+            <a:pPr marL="171450" marR="0" lvl="0" indent="-171450" algn="l" defTabSz="914400" rtl="0" eaLnBrk="1" fontAlgn="auto" latinLnBrk="0" hangingPunct="1">
+              <a:lnSpc>
+                <a:spcPct val="100000"/>
+              </a:lnSpc>
+              <a:spcBef>
+                <a:spcPts val="0"/>
+              </a:spcBef>
+              <a:spcAft>
+                <a:spcPts val="0"/>
+              </a:spcAft>
+              <a:buClrTx/>
+              <a:buSzTx/>
+              <a:buFontTx/>
+              <a:buChar char="-"/>
+              <a:tabLst/>
+              <a:defRPr/>
+            </a:pPr>
+            <a:r>
+              <a:rPr lang="sk-SK" b="0" dirty="0">
+                <a:solidFill>
+                  <a:srgbClr val="F8F8F2"/>
+                </a:solidFill>
+                <a:effectLst/>
+                <a:latin typeface="Consolas" panose="020B0609020204030204" pitchFamily="49" charset="0"/>
+              </a:rPr>
+              <a:t>Záloha FAT tabuľky.</a:t>
+            </a:r>
+          </a:p>
+          <a:p>
+            <a:pPr marL="171450" marR="0" lvl="0" indent="-171450" algn="l" defTabSz="914400" rtl="0" eaLnBrk="1" fontAlgn="auto" latinLnBrk="0" hangingPunct="1">
+              <a:lnSpc>
+                <a:spcPct val="100000"/>
+              </a:lnSpc>
+              <a:spcBef>
+                <a:spcPts val="0"/>
+              </a:spcBef>
+              <a:spcAft>
+                <a:spcPts val="0"/>
+              </a:spcAft>
+              <a:buClrTx/>
+              <a:buSzTx/>
+              <a:buFontTx/>
+              <a:buChar char="-"/>
+              <a:tabLst/>
+              <a:defRPr/>
+            </a:pPr>
+            <a:endParaRPr lang="sk-SK" b="0" dirty="0">
+              <a:solidFill>
+                <a:srgbClr val="F8F8F2"/>
+              </a:solidFill>
+              <a:effectLst/>
+              <a:latin typeface="Consolas" panose="020B0609020204030204" pitchFamily="49" charset="0"/>
+            </a:endParaRPr>
+          </a:p>
+          <a:p>
+            <a:pPr marL="171450" marR="0" lvl="0" indent="-171450" algn="l" defTabSz="914400" rtl="0" eaLnBrk="1" fontAlgn="auto" latinLnBrk="0" hangingPunct="1">
+              <a:lnSpc>
+                <a:spcPct val="100000"/>
+              </a:lnSpc>
+              <a:spcBef>
+                <a:spcPts val="0"/>
+              </a:spcBef>
+              <a:spcAft>
+                <a:spcPts val="0"/>
+              </a:spcAft>
+              <a:buClrTx/>
+              <a:buSzTx/>
+              <a:buFontTx/>
+              <a:buChar char="-"/>
+              <a:tabLst/>
+              <a:defRPr/>
+            </a:pPr>
+            <a:r>
+              <a:rPr lang="en-US" b="0" dirty="0">
+                <a:solidFill>
+                  <a:srgbClr val="F8F8F2"/>
+                </a:solidFill>
+                <a:effectLst/>
+                <a:latin typeface="Consolas" panose="020B0609020204030204" pitchFamily="49" charset="0"/>
+              </a:rPr>
+              <a:t>Cluster heap offset a </a:t>
+            </a:r>
+            <a:r>
+              <a:rPr lang="en-US" b="0" dirty="0" err="1">
+                <a:solidFill>
+                  <a:srgbClr val="F8F8F2"/>
+                </a:solidFill>
+                <a:effectLst/>
+                <a:latin typeface="Consolas" panose="020B0609020204030204" pitchFamily="49" charset="0"/>
+              </a:rPr>
+              <a:t>veľkosť</a:t>
+            </a:r>
+            <a:r>
+              <a:rPr lang="en-US" b="0" dirty="0">
+                <a:solidFill>
+                  <a:srgbClr val="F8F8F2"/>
+                </a:solidFill>
+                <a:effectLst/>
+                <a:latin typeface="Consolas" panose="020B0609020204030204" pitchFamily="49" charset="0"/>
+              </a:rPr>
+              <a:t>.</a:t>
+            </a:r>
+          </a:p>
+          <a:p>
+            <a:pPr marL="171450" marR="0" lvl="0" indent="-171450" algn="l" defTabSz="914400" rtl="0" eaLnBrk="1" fontAlgn="auto" latinLnBrk="0" hangingPunct="1">
+              <a:lnSpc>
+                <a:spcPct val="100000"/>
+              </a:lnSpc>
+              <a:spcBef>
+                <a:spcPts val="0"/>
+              </a:spcBef>
+              <a:spcAft>
+                <a:spcPts val="0"/>
+              </a:spcAft>
+              <a:buClrTx/>
+              <a:buSzTx/>
+              <a:buFontTx/>
+              <a:buChar char="-"/>
+              <a:tabLst/>
+              <a:defRPr/>
+            </a:pPr>
+            <a:r>
+              <a:rPr lang="sk-SK" b="0" dirty="0">
+                <a:solidFill>
+                  <a:srgbClr val="F8F8F2"/>
+                </a:solidFill>
+                <a:effectLst/>
+                <a:latin typeface="Consolas" panose="020B0609020204030204" pitchFamily="49" charset="0"/>
+              </a:rPr>
+              <a:t>Obsahuje samotné dáta súborov.</a:t>
+            </a:r>
+          </a:p>
+          <a:p>
+            <a:pPr marL="171450" marR="0" lvl="0" indent="-171450" algn="l" defTabSz="914400" rtl="0" eaLnBrk="1" fontAlgn="auto" latinLnBrk="0" hangingPunct="1">
+              <a:lnSpc>
+                <a:spcPct val="100000"/>
+              </a:lnSpc>
+              <a:spcBef>
+                <a:spcPts val="0"/>
+              </a:spcBef>
+              <a:spcAft>
+                <a:spcPts val="0"/>
+              </a:spcAft>
+              <a:buClrTx/>
+              <a:buSzTx/>
+              <a:buFontTx/>
+              <a:buChar char="-"/>
+              <a:tabLst/>
+              <a:defRPr/>
+            </a:pPr>
+            <a:endParaRPr lang="sk-SK" b="0" dirty="0">
+              <a:solidFill>
+                <a:srgbClr val="F8F8F2"/>
+              </a:solidFill>
+              <a:effectLst/>
+              <a:latin typeface="Consolas" panose="020B0609020204030204" pitchFamily="49" charset="0"/>
+            </a:endParaRPr>
+          </a:p>
+        </p:txBody>
+      </p:sp>
+      <p:sp>
+        <p:nvSpPr>
+          <p:cNvPr id="4" name="Zástupný objekt pre číslo snímky 3"/>
+          <p:cNvSpPr>
+            <a:spLocks noGrp="1"/>
+          </p:cNvSpPr>
+          <p:nvPr>
+            <p:ph type="sldNum" sz="quarter" idx="5"/>
+          </p:nvPr>
+        </p:nvSpPr>
+        <p:spPr/>
+        <p:txBody>
+          <a:bodyPr/>
+          <a:lstStyle/>
+          <a:p>
+            <a:fld id="{5C718C61-028C-4B62-904D-AF06C416AFC9}" type="slidenum">
+              <a:rPr lang="sk-SK" smtClean="0"/>
+              <a:t>7</a:t>
+            </a:fld>
+            <a:endParaRPr lang="sk-SK"/>
+          </a:p>
+        </p:txBody>
+      </p:sp>
+    </p:spTree>
+    <p:extLst>
+      <p:ext uri="{BB962C8B-B14F-4D97-AF65-F5344CB8AC3E}">
+        <p14:creationId xmlns:p14="http://schemas.microsoft.com/office/powerpoint/2010/main" val="4043696083"/>
+      </p:ext>
+    </p:extLst>
+  </p:cSld>
+  <p:clrMapOvr>
+    <a:masterClrMapping/>
+  </p:clrMapOvr>
+</p:notes>
+</file>
+
+<file path=ppt/notesSlides/notesSlide5.xml><?xml version="1.0" encoding="utf-8"?>
 <p:notes xmlns:a="http://schemas.openxmlformats.org/drawingml/2006/main" xmlns:r="http://schemas.openxmlformats.org/officeDocument/2006/relationships" xmlns:p="http://schemas.openxmlformats.org/presentationml/2006/main">
   <p:cSld>
     <p:spTree>
@@ -4431,7 +4980,7 @@
             </a:r>
             <a:r>
               <a:rPr lang="sk-SK" dirty="0"/>
-              <a:t> report č.1)</a:t>
+              <a:t> report č.1 – Teoretická časť – Súborové systémy)</a:t>
             </a:r>
           </a:p>
           <a:p>
@@ -4867,7 +5416,7 @@
           <a:p>
             <a:r>
               <a:rPr lang="sk-SK" dirty="0"/>
-              <a:t>Súborové systémy</a:t>
+              <a:t>Súborový systém</a:t>
             </a:r>
           </a:p>
         </p:txBody>
@@ -4900,109 +5449,27 @@
           </a:p>
           <a:p>
             <a:r>
-              <a:rPr lang="sk-SK" dirty="0" err="1"/>
-              <a:t>Napisat</a:t>
-            </a:r>
-            <a:r>
               <a:rPr lang="sk-SK" dirty="0"/>
-              <a:t> čo to je </a:t>
-            </a:r>
-            <a:r>
-              <a:rPr lang="sk-SK" dirty="0" err="1"/>
-              <a:t>atd</a:t>
-            </a:r>
+              <a:t>Slúži na správu a organizáciu súborov</a:t>
+            </a:r>
+          </a:p>
+          <a:p>
             <a:r>
               <a:rPr lang="sk-SK" dirty="0"/>
-              <a:t> iba v bodoch</a:t>
-            </a:r>
-          </a:p>
-          <a:p>
-            <a:r>
-              <a:rPr lang="sk-SK" dirty="0" err="1"/>
-              <a:t>Sluzia</a:t>
-            </a:r>
+              <a:t>Zachováva integritu údajov</a:t>
+            </a:r>
+          </a:p>
+          <a:p>
             <a:r>
               <a:rPr lang="sk-SK" dirty="0"/>
-              <a:t> na </a:t>
-            </a:r>
-            <a:r>
-              <a:rPr lang="sk-SK" dirty="0" err="1"/>
-              <a:t>spravu</a:t>
-            </a:r>
+              <a:t>Je škálovateľný</a:t>
+            </a:r>
+          </a:p>
+          <a:p>
             <a:r>
               <a:rPr lang="sk-SK" dirty="0"/>
-              <a:t> </a:t>
-            </a:r>
-            <a:r>
-              <a:rPr lang="sk-SK" dirty="0" err="1"/>
-              <a:t>suborov</a:t>
-            </a:r>
-            <a:endParaRPr lang="sk-SK" dirty="0"/>
-          </a:p>
-          <a:p>
-            <a:r>
-              <a:rPr lang="sk-SK" dirty="0" err="1"/>
-              <a:t>Su</a:t>
-            </a:r>
-            <a:r>
-              <a:rPr lang="sk-SK" dirty="0"/>
-              <a:t> </a:t>
-            </a:r>
-            <a:r>
-              <a:rPr lang="sk-SK" dirty="0" err="1"/>
-              <a:t>sucastou</a:t>
-            </a:r>
-            <a:r>
-              <a:rPr lang="sk-SK" dirty="0"/>
-              <a:t> OS ?</a:t>
-            </a:r>
-          </a:p>
-          <a:p>
-            <a:r>
-              <a:rPr lang="sk-SK" dirty="0" err="1"/>
-              <a:t>Napr</a:t>
-            </a:r>
-            <a:r>
-              <a:rPr lang="sk-SK" dirty="0"/>
-              <a:t> </a:t>
-            </a:r>
-            <a:r>
-              <a:rPr lang="sk-SK" dirty="0" err="1"/>
-              <a:t>windows</a:t>
-            </a:r>
-            <a:r>
-              <a:rPr lang="sk-SK" dirty="0"/>
-              <a:t> </a:t>
-            </a:r>
-            <a:r>
-              <a:rPr lang="sk-SK" dirty="0" err="1"/>
-              <a:t>pouziva</a:t>
-            </a:r>
-            <a:r>
-              <a:rPr lang="sk-SK" dirty="0"/>
-              <a:t> B* </a:t>
-            </a:r>
-            <a:r>
-              <a:rPr lang="sk-SK" dirty="0" err="1"/>
-              <a:t>Trees</a:t>
-            </a:r>
-            <a:r>
-              <a:rPr lang="sk-SK" dirty="0"/>
-              <a:t> ako </a:t>
-            </a:r>
-            <a:r>
-              <a:rPr lang="sk-SK" dirty="0" err="1"/>
-              <a:t>data</a:t>
-            </a:r>
-            <a:r>
-              <a:rPr lang="sk-SK" dirty="0"/>
-              <a:t> </a:t>
-            </a:r>
-            <a:r>
-              <a:rPr lang="sk-SK" dirty="0" err="1"/>
-              <a:t>structure</a:t>
-            </a:r>
-            <a:endParaRPr lang="sk-SK" dirty="0"/>
+              <a:t>Môže podporovať šifrovanie a kompresiu (napr. NTFS)</a:t>
+            </a:r>
           </a:p>
         </p:txBody>
       </p:sp>
@@ -5101,7 +5568,45 @@
           <a:bodyPr/>
           <a:lstStyle/>
           <a:p>
+            <a:r>
+              <a:rPr lang="sk-SK" dirty="0"/>
+              <a:t>Má veľmi jednoduchú štruktúru</a:t>
+            </a:r>
+          </a:p>
+          <a:p>
+            <a:r>
+              <a:rPr lang="sk-SK" dirty="0"/>
+              <a:t>Zároveň je však limitovaný</a:t>
+            </a:r>
+          </a:p>
+          <a:p>
+            <a:r>
+              <a:rPr lang="sk-SK" dirty="0"/>
+              <a:t>Používa tabuľku na uloženie informácií o súboroch</a:t>
+            </a:r>
+          </a:p>
+          <a:p>
+            <a:r>
+              <a:rPr lang="sk-SK" dirty="0"/>
+              <a:t>Spätná kompatibilita</a:t>
+            </a:r>
+          </a:p>
+          <a:p>
+            <a:r>
+              <a:rPr lang="sk-SK" dirty="0"/>
+              <a:t>Viacej verzií: FAT12, FAT16, FAT32, </a:t>
+            </a:r>
+            <a:r>
+              <a:rPr lang="sk-SK" dirty="0" err="1"/>
+              <a:t>exFAT</a:t>
+            </a:r>
             <a:endParaRPr lang="sk-SK" dirty="0"/>
+          </a:p>
+          <a:p>
+            <a:r>
+              <a:rPr lang="sk-SK" dirty="0"/>
+              <a:t>Číslo verzie predstavuje počet bitov určených na uloženie adresy súboru</a:t>
+            </a:r>
           </a:p>
         </p:txBody>
       </p:sp>
@@ -5184,7 +5689,28 @@
           <a:bodyPr/>
           <a:lstStyle/>
           <a:p>
-            <a:endParaRPr lang="sk-SK" dirty="0"/>
+            <a:r>
+              <a:rPr lang="sk-SK" dirty="0"/>
+              <a:t>Podporuje súbory do veľkosti 4GB</a:t>
+            </a:r>
+          </a:p>
+          <a:p>
+            <a:r>
+              <a:rPr lang="sk-SK" dirty="0"/>
+              <a:t>Efektívnejšie využitie miesta na disku oproti FAT16</a:t>
+            </a:r>
+          </a:p>
+          <a:p>
+            <a:r>
+              <a:rPr lang="sk-SK" dirty="0"/>
+              <a:t>Maximálna veľkosť oddielu je 2TB </a:t>
+            </a:r>
+          </a:p>
+          <a:p>
+            <a:r>
+              <a:rPr lang="sk-SK" dirty="0"/>
+              <a:t>Používaný na prenosných médiách (do 32GB)</a:t>
+            </a:r>
           </a:p>
         </p:txBody>
       </p:sp>
@@ -5416,7 +5942,48 @@
           <a:bodyPr/>
           <a:lstStyle/>
           <a:p>
-            <a:endParaRPr lang="sk-SK"/>
+            <a:r>
+              <a:rPr lang="sk-SK" dirty="0"/>
+              <a:t>Optimalizovaný pre média s „</a:t>
+            </a:r>
+            <a:r>
+              <a:rPr lang="sk-SK" dirty="0" err="1"/>
+              <a:t>flash</a:t>
+            </a:r>
+            <a:r>
+              <a:rPr lang="sk-SK" dirty="0"/>
+              <a:t>“ pamäťou</a:t>
+            </a:r>
+          </a:p>
+          <a:p>
+            <a:r>
+              <a:rPr lang="sk-SK" dirty="0"/>
+              <a:t>Podporuje rádovo väčšiu veľkosť súborov ako FAT32 (</a:t>
+            </a:r>
+            <a:r>
+              <a:rPr lang="sk-SK" dirty="0" err="1"/>
+              <a:t>ExaByty</a:t>
+            </a:r>
+            <a:r>
+              <a:rPr lang="sk-SK" dirty="0"/>
+              <a:t>)</a:t>
+            </a:r>
+          </a:p>
+          <a:p>
+            <a:r>
+              <a:rPr lang="sk-SK" dirty="0"/>
+              <a:t>Vhodný prenosové média s veľkosťou nad 32GB</a:t>
+            </a:r>
+          </a:p>
+          <a:p>
+            <a:r>
+              <a:rPr lang="sk-SK" dirty="0" err="1"/>
+              <a:t>Interoperabilita</a:t>
+            </a:r>
+            <a:r>
+              <a:rPr lang="sk-SK" dirty="0"/>
+              <a:t> medzi viacerými OS</a:t>
+            </a:r>
           </a:p>
         </p:txBody>
       </p:sp>
@@ -5498,7 +6065,7 @@
           <p:nvPr/>
         </p:nvPicPr>
         <p:blipFill>
-          <a:blip r:embed="rId2">
+          <a:blip r:embed="rId3">
             <a:extLst>
               <a:ext uri="{28A0092B-C50C-407E-A947-70E740481C1C}">
                 <a14:useLocalDpi xmlns:a14="http://schemas.microsoft.com/office/drawing/2010/main" val="0"/>
@@ -5683,11 +6250,23 @@
             </a:r>
             <a:r>
               <a:rPr lang="sk-SK" dirty="0" err="1"/>
-              <a:t>sytém</a:t>
+              <a:t>sytsém</a:t>
             </a:r>
             <a:r>
               <a:rPr lang="sk-SK" dirty="0"/>
               <a:t> Windows</a:t>
+            </a:r>
+          </a:p>
+          <a:p>
+            <a:r>
+              <a:rPr lang="sk-SK" dirty="0"/>
+              <a:t>Podporuje šifrovanie a kompresiu</a:t>
+            </a:r>
+          </a:p>
+          <a:p>
+            <a:r>
+              <a:rPr lang="sk-SK" dirty="0"/>
+              <a:t>Správa prístupu ku súborom</a:t>
             </a:r>
           </a:p>
         </p:txBody>

</xml_diff>

<commit_message>
progress report preyentácia done
</commit_message>
<xml_diff>
--- a/ProgressReport1-Cederle-Marek.pptx
+++ b/ProgressReport1-Cederle-Marek.pptx
@@ -1476,6 +1476,117 @@
           <a:bodyPr/>
           <a:lstStyle/>
           <a:p>
+            <a:r>
+              <a:rPr lang="sk-SK" dirty="0"/>
+              <a:t>Žurnálový znamená, že má uložený tzv. </a:t>
+            </a:r>
+            <a:r>
+              <a:rPr lang="sk-SK" dirty="0" err="1"/>
+              <a:t>journal</a:t>
+            </a:r>
+            <a:r>
+              <a:rPr lang="sk-SK" dirty="0"/>
+              <a:t> a tam si ukladá informácie čo sa na disku má vykonať alebo sa vykonalo a </a:t>
+            </a:r>
+            <a:r>
+              <a:rPr lang="sk-SK" dirty="0" err="1"/>
+              <a:t>ked</a:t>
+            </a:r>
+            <a:r>
+              <a:rPr lang="sk-SK" dirty="0"/>
+              <a:t> </a:t>
+            </a:r>
+            <a:r>
+              <a:rPr lang="sk-SK" dirty="0" err="1"/>
+              <a:t>pride</a:t>
+            </a:r>
+            <a:r>
+              <a:rPr lang="sk-SK" dirty="0"/>
+              <a:t> ku strate napájania tak pri naštartovaní vie opraviť poškodené dáta prípadne sa dostať do stavu kedy bol FS funkčný</a:t>
+            </a:r>
+          </a:p>
+        </p:txBody>
+      </p:sp>
+      <p:sp>
+        <p:nvSpPr>
+          <p:cNvPr id="4" name="Zástupný objekt pre číslo snímky 3"/>
+          <p:cNvSpPr>
+            <a:spLocks noGrp="1"/>
+          </p:cNvSpPr>
+          <p:nvPr>
+            <p:ph type="sldNum" sz="quarter" idx="5"/>
+          </p:nvPr>
+        </p:nvSpPr>
+        <p:spPr/>
+        <p:txBody>
+          <a:bodyPr/>
+          <a:lstStyle/>
+          <a:p>
+            <a:fld id="{5C718C61-028C-4B62-904D-AF06C416AFC9}" type="slidenum">
+              <a:rPr lang="sk-SK" smtClean="0"/>
+              <a:t>8</a:t>
+            </a:fld>
+            <a:endParaRPr lang="sk-SK"/>
+          </a:p>
+        </p:txBody>
+      </p:sp>
+    </p:spTree>
+    <p:extLst>
+      <p:ext uri="{BB962C8B-B14F-4D97-AF65-F5344CB8AC3E}">
+        <p14:creationId xmlns:p14="http://schemas.microsoft.com/office/powerpoint/2010/main" val="2406025225"/>
+      </p:ext>
+    </p:extLst>
+  </p:cSld>
+  <p:clrMapOvr>
+    <a:masterClrMapping/>
+  </p:clrMapOvr>
+</p:notes>
+</file>
+
+<file path=ppt/notesSlides/notesSlide6.xml><?xml version="1.0" encoding="utf-8"?>
+<p:notes xmlns:a="http://schemas.openxmlformats.org/drawingml/2006/main" xmlns:r="http://schemas.openxmlformats.org/officeDocument/2006/relationships" xmlns:p="http://schemas.openxmlformats.org/presentationml/2006/main">
+  <p:cSld>
+    <p:spTree>
+      <p:nvGrpSpPr>
+        <p:cNvPr id="1" name=""/>
+        <p:cNvGrpSpPr/>
+        <p:nvPr/>
+      </p:nvGrpSpPr>
+      <p:grpSpPr>
+        <a:xfrm>
+          <a:off x="0" y="0"/>
+          <a:ext cx="0" cy="0"/>
+          <a:chOff x="0" y="0"/>
+          <a:chExt cx="0" cy="0"/>
+        </a:xfrm>
+      </p:grpSpPr>
+      <p:sp>
+        <p:nvSpPr>
+          <p:cNvPr id="2" name="Zástupný objekt pre obrázok snímky 1"/>
+          <p:cNvSpPr>
+            <a:spLocks noGrp="1" noRot="1" noChangeAspect="1"/>
+          </p:cNvSpPr>
+          <p:nvPr>
+            <p:ph type="sldImg"/>
+          </p:nvPr>
+        </p:nvSpPr>
+        <p:spPr/>
+      </p:sp>
+      <p:sp>
+        <p:nvSpPr>
+          <p:cNvPr id="3" name="Zástupný objekt pre poznámky 2"/>
+          <p:cNvSpPr>
+            <a:spLocks noGrp="1"/>
+          </p:cNvSpPr>
+          <p:nvPr>
+            <p:ph type="body" idx="1"/>
+          </p:nvPr>
+        </p:nvSpPr>
+        <p:spPr/>
+        <p:txBody>
+          <a:bodyPr/>
+          <a:lstStyle/>
+          <a:p>
             <a:pPr marL="171450" marR="0" lvl="0" indent="-171450" algn="l" defTabSz="914400" rtl="0" eaLnBrk="1" fontAlgn="auto" latinLnBrk="0" hangingPunct="1">
               <a:lnSpc>
                 <a:spcPct val="100000"/>
@@ -1698,6 +1809,388 @@
     <p:extLst>
       <p:ext uri="{BB962C8B-B14F-4D97-AF65-F5344CB8AC3E}">
         <p14:creationId xmlns:p14="http://schemas.microsoft.com/office/powerpoint/2010/main" val="206427873"/>
+      </p:ext>
+    </p:extLst>
+  </p:cSld>
+  <p:clrMapOvr>
+    <a:masterClrMapping/>
+  </p:clrMapOvr>
+</p:notes>
+</file>
+
+<file path=ppt/notesSlides/notesSlide7.xml><?xml version="1.0" encoding="utf-8"?>
+<p:notes xmlns:a="http://schemas.openxmlformats.org/drawingml/2006/main" xmlns:r="http://schemas.openxmlformats.org/officeDocument/2006/relationships" xmlns:p="http://schemas.openxmlformats.org/presentationml/2006/main">
+  <p:cSld>
+    <p:spTree>
+      <p:nvGrpSpPr>
+        <p:cNvPr id="1" name=""/>
+        <p:cNvGrpSpPr/>
+        <p:nvPr/>
+      </p:nvGrpSpPr>
+      <p:grpSpPr>
+        <a:xfrm>
+          <a:off x="0" y="0"/>
+          <a:ext cx="0" cy="0"/>
+          <a:chOff x="0" y="0"/>
+          <a:chExt cx="0" cy="0"/>
+        </a:xfrm>
+      </p:grpSpPr>
+      <p:sp>
+        <p:nvSpPr>
+          <p:cNvPr id="2" name="Zástupný objekt pre obrázok snímky 1"/>
+          <p:cNvSpPr>
+            <a:spLocks noGrp="1" noRot="1" noChangeAspect="1"/>
+          </p:cNvSpPr>
+          <p:nvPr>
+            <p:ph type="sldImg"/>
+          </p:nvPr>
+        </p:nvSpPr>
+        <p:spPr/>
+      </p:sp>
+      <p:sp>
+        <p:nvSpPr>
+          <p:cNvPr id="3" name="Zástupný objekt pre poznámky 2"/>
+          <p:cNvSpPr>
+            <a:spLocks noGrp="1"/>
+          </p:cNvSpPr>
+          <p:nvPr>
+            <p:ph type="body" idx="1"/>
+          </p:nvPr>
+        </p:nvSpPr>
+        <p:spPr/>
+        <p:txBody>
+          <a:bodyPr/>
+          <a:lstStyle/>
+          <a:p>
+            <a:pPr marL="171450" indent="-171450">
+              <a:buFontTx/>
+              <a:buChar char="-"/>
+            </a:pPr>
+            <a:r>
+              <a:rPr lang="sk-SK" dirty="0"/>
+              <a:t>Informácie o bootovaní</a:t>
+            </a:r>
+          </a:p>
+          <a:p>
+            <a:pPr marL="171450" indent="-171450">
+              <a:buFontTx/>
+              <a:buChar char="-"/>
+            </a:pPr>
+            <a:r>
+              <a:rPr lang="sk-SK" dirty="0"/>
+              <a:t>Následne má skupiny blokov:</a:t>
+            </a:r>
+          </a:p>
+          <a:p>
+            <a:pPr marL="628650" lvl="1" indent="-171450">
+              <a:buFontTx/>
+              <a:buChar char="-"/>
+            </a:pPr>
+            <a:r>
+              <a:rPr lang="sk-SK" b="0" i="0" dirty="0" err="1">
+                <a:solidFill>
+                  <a:srgbClr val="E6E6E6"/>
+                </a:solidFill>
+                <a:effectLst/>
+                <a:latin typeface="Segoe UI" panose="020B0502040204020203" pitchFamily="34" charset="0"/>
+              </a:rPr>
+              <a:t>Superblok</a:t>
+            </a:r>
+            <a:r>
+              <a:rPr lang="sk-SK" b="0" i="0" dirty="0">
+                <a:solidFill>
+                  <a:srgbClr val="E6E6E6"/>
+                </a:solidFill>
+                <a:effectLst/>
+                <a:latin typeface="Segoe UI" panose="020B0502040204020203" pitchFamily="34" charset="0"/>
+              </a:rPr>
+              <a:t> sa nachádza na začiatku súborového systému a obsahuje metadáta o súborovom systéme vrátane jeho veľkosti, veľkosti bloku, počtu </a:t>
+            </a:r>
+            <a:r>
+              <a:rPr lang="sk-SK" b="0" i="0" dirty="0" err="1">
+                <a:solidFill>
+                  <a:srgbClr val="E6E6E6"/>
+                </a:solidFill>
+                <a:effectLst/>
+                <a:latin typeface="Segoe UI" panose="020B0502040204020203" pitchFamily="34" charset="0"/>
+              </a:rPr>
+              <a:t>inódov</a:t>
+            </a:r>
+            <a:r>
+              <a:rPr lang="sk-SK" b="0" i="0" dirty="0">
+                <a:solidFill>
+                  <a:srgbClr val="E6E6E6"/>
+                </a:solidFill>
+                <a:effectLst/>
+                <a:latin typeface="Segoe UI" panose="020B0502040204020203" pitchFamily="34" charset="0"/>
+              </a:rPr>
+              <a:t> a ďalších parametrov. Slúži ako hlavný riadiaci blok pre súborový systém.</a:t>
+            </a:r>
+          </a:p>
+          <a:p>
+            <a:pPr marL="628650" lvl="1" indent="-171450">
+              <a:buFontTx/>
+              <a:buChar char="-"/>
+            </a:pPr>
+            <a:r>
+              <a:rPr lang="sk-SK" b="0" i="0" dirty="0">
+                <a:solidFill>
+                  <a:srgbClr val="E6E6E6"/>
+                </a:solidFill>
+                <a:effectLst/>
+                <a:latin typeface="Segoe UI" panose="020B0502040204020203" pitchFamily="34" charset="0"/>
+              </a:rPr>
+              <a:t>Group </a:t>
+            </a:r>
+            <a:r>
+              <a:rPr lang="sk-SK" b="0" i="0" dirty="0" err="1">
+                <a:solidFill>
+                  <a:srgbClr val="E6E6E6"/>
+                </a:solidFill>
+                <a:effectLst/>
+                <a:latin typeface="Segoe UI" panose="020B0502040204020203" pitchFamily="34" charset="0"/>
+              </a:rPr>
+              <a:t>descriptors</a:t>
+            </a:r>
+            <a:r>
+              <a:rPr lang="sk-SK" b="0" i="0" dirty="0">
+                <a:solidFill>
+                  <a:srgbClr val="E6E6E6"/>
+                </a:solidFill>
+                <a:effectLst/>
+                <a:latin typeface="Segoe UI" panose="020B0502040204020203" pitchFamily="34" charset="0"/>
+              </a:rPr>
+              <a:t> obsahujú metadáta pre danú skupinu</a:t>
+            </a:r>
+          </a:p>
+          <a:p>
+            <a:pPr marL="628650" lvl="1" indent="-171450">
+              <a:buFontTx/>
+              <a:buChar char="-"/>
+            </a:pPr>
+            <a:r>
+              <a:rPr lang="sk-SK" b="0" i="0" dirty="0" err="1">
+                <a:solidFill>
+                  <a:srgbClr val="E6E6E6"/>
+                </a:solidFill>
+                <a:effectLst/>
+                <a:latin typeface="Segoe UI" panose="020B0502040204020203" pitchFamily="34" charset="0"/>
+              </a:rPr>
+              <a:t>Data</a:t>
+            </a:r>
+            <a:r>
+              <a:rPr lang="sk-SK" b="0" i="0" dirty="0">
+                <a:solidFill>
+                  <a:srgbClr val="E6E6E6"/>
+                </a:solidFill>
+                <a:effectLst/>
+                <a:latin typeface="Segoe UI" panose="020B0502040204020203" pitchFamily="34" charset="0"/>
+              </a:rPr>
+              <a:t> </a:t>
+            </a:r>
+            <a:r>
+              <a:rPr lang="sk-SK" b="0" i="0" dirty="0" err="1">
+                <a:solidFill>
+                  <a:srgbClr val="E6E6E6"/>
+                </a:solidFill>
+                <a:effectLst/>
+                <a:latin typeface="Segoe UI" panose="020B0502040204020203" pitchFamily="34" charset="0"/>
+              </a:rPr>
+              <a:t>block</a:t>
+            </a:r>
+            <a:r>
+              <a:rPr lang="sk-SK" b="0" i="0" dirty="0">
+                <a:solidFill>
+                  <a:srgbClr val="E6E6E6"/>
+                </a:solidFill>
+                <a:effectLst/>
+                <a:latin typeface="Segoe UI" panose="020B0502040204020203" pitchFamily="34" charset="0"/>
+              </a:rPr>
+              <a:t> </a:t>
+            </a:r>
+            <a:r>
+              <a:rPr lang="sk-SK" b="0" i="0" dirty="0" err="1">
+                <a:solidFill>
+                  <a:srgbClr val="E6E6E6"/>
+                </a:solidFill>
+                <a:effectLst/>
+                <a:latin typeface="Segoe UI" panose="020B0502040204020203" pitchFamily="34" charset="0"/>
+              </a:rPr>
+              <a:t>bitmap</a:t>
+            </a:r>
+            <a:r>
+              <a:rPr lang="sk-SK" b="0" i="0" dirty="0">
+                <a:solidFill>
+                  <a:srgbClr val="E6E6E6"/>
+                </a:solidFill>
+                <a:effectLst/>
+                <a:latin typeface="Segoe UI" panose="020B0502040204020203" pitchFamily="34" charset="0"/>
+              </a:rPr>
+              <a:t> sleduje status blokov pre danú skupinu</a:t>
+            </a:r>
+          </a:p>
+          <a:p>
+            <a:pPr marL="628650" lvl="1" indent="-171450">
+              <a:buFontTx/>
+              <a:buChar char="-"/>
+            </a:pPr>
+            <a:r>
+              <a:rPr lang="sk-SK" b="0" i="0" dirty="0" err="1">
+                <a:solidFill>
+                  <a:srgbClr val="E6E6E6"/>
+                </a:solidFill>
+                <a:effectLst/>
+                <a:latin typeface="Segoe UI" panose="020B0502040204020203" pitchFamily="34" charset="0"/>
+              </a:rPr>
+              <a:t>Inode</a:t>
+            </a:r>
+            <a:r>
+              <a:rPr lang="sk-SK" b="0" i="0" dirty="0">
+                <a:solidFill>
+                  <a:srgbClr val="E6E6E6"/>
+                </a:solidFill>
+                <a:effectLst/>
+                <a:latin typeface="Segoe UI" panose="020B0502040204020203" pitchFamily="34" charset="0"/>
+              </a:rPr>
+              <a:t> table </a:t>
+            </a:r>
+            <a:r>
+              <a:rPr lang="sk-SK" b="0" i="0" dirty="0" err="1">
+                <a:solidFill>
+                  <a:srgbClr val="E6E6E6"/>
+                </a:solidFill>
+                <a:effectLst/>
+                <a:latin typeface="Segoe UI" panose="020B0502040204020203" pitchFamily="34" charset="0"/>
+              </a:rPr>
+              <a:t>obsahuju</a:t>
+            </a:r>
+            <a:r>
+              <a:rPr lang="sk-SK" b="0" i="0" dirty="0">
+                <a:solidFill>
+                  <a:srgbClr val="E6E6E6"/>
+                </a:solidFill>
+                <a:effectLst/>
+                <a:latin typeface="Segoe UI" panose="020B0502040204020203" pitchFamily="34" charset="0"/>
+              </a:rPr>
+              <a:t> </a:t>
+            </a:r>
+            <a:r>
+              <a:rPr lang="sk-SK" b="0" i="0" dirty="0" err="1">
+                <a:solidFill>
+                  <a:srgbClr val="E6E6E6"/>
+                </a:solidFill>
+                <a:effectLst/>
+                <a:latin typeface="Segoe UI" panose="020B0502040204020203" pitchFamily="34" charset="0"/>
+              </a:rPr>
+              <a:t>metadata</a:t>
+            </a:r>
+            <a:r>
+              <a:rPr lang="sk-SK" b="0" i="0" dirty="0">
+                <a:solidFill>
+                  <a:srgbClr val="E6E6E6"/>
+                </a:solidFill>
+                <a:effectLst/>
+                <a:latin typeface="Segoe UI" panose="020B0502040204020203" pitchFamily="34" charset="0"/>
+              </a:rPr>
+              <a:t> a atribúty čo sa týka oprávnení a </a:t>
+            </a:r>
+            <a:r>
+              <a:rPr lang="sk-SK" b="0" i="0" dirty="0" err="1">
+                <a:solidFill>
+                  <a:srgbClr val="E6E6E6"/>
+                </a:solidFill>
+                <a:effectLst/>
+                <a:latin typeface="Segoe UI" panose="020B0502040204020203" pitchFamily="34" charset="0"/>
+              </a:rPr>
+              <a:t>ďaľších</a:t>
+            </a:r>
+            <a:r>
+              <a:rPr lang="sk-SK" b="0" i="0" dirty="0">
+                <a:solidFill>
+                  <a:srgbClr val="E6E6E6"/>
+                </a:solidFill>
+                <a:effectLst/>
+                <a:latin typeface="Segoe UI" panose="020B0502040204020203" pitchFamily="34" charset="0"/>
+              </a:rPr>
+              <a:t> informácií pre každý súbor a adresár v danej skupine</a:t>
+            </a:r>
+          </a:p>
+          <a:p>
+            <a:pPr marL="628650" lvl="1" indent="-171450">
+              <a:buFontTx/>
+              <a:buChar char="-"/>
+            </a:pPr>
+            <a:r>
+              <a:rPr lang="sk-SK" b="0" i="0" dirty="0" err="1">
+                <a:solidFill>
+                  <a:srgbClr val="E6E6E6"/>
+                </a:solidFill>
+                <a:effectLst/>
+                <a:latin typeface="Segoe UI" panose="020B0502040204020203" pitchFamily="34" charset="0"/>
+              </a:rPr>
+              <a:t>Data</a:t>
+            </a:r>
+            <a:r>
+              <a:rPr lang="sk-SK" b="0" i="0" dirty="0">
+                <a:solidFill>
+                  <a:srgbClr val="E6E6E6"/>
+                </a:solidFill>
+                <a:effectLst/>
+                <a:latin typeface="Segoe UI" panose="020B0502040204020203" pitchFamily="34" charset="0"/>
+              </a:rPr>
+              <a:t> </a:t>
+            </a:r>
+            <a:r>
+              <a:rPr lang="sk-SK" b="0" i="0" dirty="0" err="1">
+                <a:solidFill>
+                  <a:srgbClr val="E6E6E6"/>
+                </a:solidFill>
+                <a:effectLst/>
+                <a:latin typeface="Segoe UI" panose="020B0502040204020203" pitchFamily="34" charset="0"/>
+              </a:rPr>
+              <a:t>blocks</a:t>
+            </a:r>
+            <a:r>
+              <a:rPr lang="sk-SK" b="0" i="0" dirty="0">
+                <a:solidFill>
+                  <a:srgbClr val="E6E6E6"/>
+                </a:solidFill>
+                <a:effectLst/>
+                <a:latin typeface="Segoe UI" panose="020B0502040204020203" pitchFamily="34" charset="0"/>
+              </a:rPr>
+              <a:t> obsahujú dané dáta</a:t>
+            </a:r>
+            <a:endParaRPr lang="sk-SK" dirty="0"/>
+          </a:p>
+        </p:txBody>
+      </p:sp>
+      <p:sp>
+        <p:nvSpPr>
+          <p:cNvPr id="4" name="Zástupný objekt pre číslo snímky 3"/>
+          <p:cNvSpPr>
+            <a:spLocks noGrp="1"/>
+          </p:cNvSpPr>
+          <p:nvPr>
+            <p:ph type="sldNum" sz="quarter" idx="5"/>
+          </p:nvPr>
+        </p:nvSpPr>
+        <p:spPr/>
+        <p:txBody>
+          <a:bodyPr/>
+          <a:lstStyle/>
+          <a:p>
+            <a:fld id="{5C718C61-028C-4B62-904D-AF06C416AFC9}" type="slidenum">
+              <a:rPr lang="sk-SK" smtClean="0"/>
+              <a:t>11</a:t>
+            </a:fld>
+            <a:endParaRPr lang="sk-SK"/>
+          </a:p>
+        </p:txBody>
+      </p:sp>
+    </p:spTree>
+    <p:extLst>
+      <p:ext uri="{BB962C8B-B14F-4D97-AF65-F5344CB8AC3E}">
+        <p14:creationId xmlns:p14="http://schemas.microsoft.com/office/powerpoint/2010/main" val="4077551127"/>
       </p:ext>
     </p:extLst>
   </p:cSld>
@@ -5149,6 +5642,33 @@
             </a:r>
             <a:endParaRPr lang="sk-SK" dirty="0"/>
           </a:p>
+          <a:p>
+            <a:r>
+              <a:rPr lang="sk-SK" dirty="0"/>
+              <a:t>Veľmi dobre škálovateľný</a:t>
+            </a:r>
+          </a:p>
+          <a:p>
+            <a:r>
+              <a:rPr lang="sk-SK" dirty="0"/>
+              <a:t>Podpora veľkých súborov a oddielov</a:t>
+            </a:r>
+          </a:p>
+          <a:p>
+            <a:r>
+              <a:rPr lang="sk-SK" dirty="0"/>
+              <a:t>Žurnálový súborový systém</a:t>
+            </a:r>
+          </a:p>
+          <a:p>
+            <a:r>
+              <a:rPr lang="sk-SK" dirty="0"/>
+              <a:t>Veľmi dobrá spätná kompatibilita (staršie verzie ext2, ext3)</a:t>
+            </a:r>
+          </a:p>
+          <a:p>
+            <a:endParaRPr lang="sk-SK" dirty="0"/>
+          </a:p>
         </p:txBody>
       </p:sp>
     </p:spTree>
@@ -5224,7 +5744,7 @@
           <p:nvPr/>
         </p:nvPicPr>
         <p:blipFill>
-          <a:blip r:embed="rId2">
+          <a:blip r:embed="rId3">
             <a:extLst>
               <a:ext uri="{28A0092B-C50C-407E-A947-70E740481C1C}">
                 <a14:useLocalDpi xmlns:a14="http://schemas.microsoft.com/office/drawing/2010/main" val="0"/>
@@ -6260,6 +6780,12 @@
           <a:p>
             <a:r>
               <a:rPr lang="sk-SK" dirty="0"/>
+              <a:t>Žurnálový súborový systém</a:t>
+            </a:r>
+          </a:p>
+          <a:p>
+            <a:r>
+              <a:rPr lang="sk-SK" dirty="0"/>
               <a:t>Podporuje šifrovanie a kompresiu</a:t>
             </a:r>
           </a:p>
@@ -6267,6 +6793,12 @@
             <a:r>
               <a:rPr lang="sk-SK" dirty="0"/>
               <a:t>Správa prístupu ku súborom</a:t>
+            </a:r>
+          </a:p>
+          <a:p>
+            <a:r>
+              <a:rPr lang="sk-SK" dirty="0"/>
+              <a:t>Podporuje veľké súbory aj oddiely</a:t>
             </a:r>
           </a:p>
         </p:txBody>

</xml_diff>

<commit_message>
final prezentacia progress report 1
</commit_message>
<xml_diff>
--- a/ProgressReport1-Cederle-Marek.pptx
+++ b/ProgressReport1-Cederle-Marek.pptx
@@ -5,21 +5,23 @@
     <p:sldMasterId id="2147483648" r:id="rId1"/>
   </p:sldMasterIdLst>
   <p:notesMasterIdLst>
-    <p:notesMasterId r:id="rId14"/>
+    <p:notesMasterId r:id="rId16"/>
   </p:notesMasterIdLst>
   <p:sldIdLst>
     <p:sldId id="256" r:id="rId2"/>
-    <p:sldId id="257" r:id="rId3"/>
-    <p:sldId id="259" r:id="rId4"/>
-    <p:sldId id="261" r:id="rId5"/>
-    <p:sldId id="265" r:id="rId6"/>
-    <p:sldId id="260" r:id="rId7"/>
-    <p:sldId id="266" r:id="rId8"/>
-    <p:sldId id="258" r:id="rId9"/>
-    <p:sldId id="267" r:id="rId10"/>
-    <p:sldId id="262" r:id="rId11"/>
-    <p:sldId id="268" r:id="rId12"/>
-    <p:sldId id="264" r:id="rId13"/>
+    <p:sldId id="270" r:id="rId3"/>
+    <p:sldId id="257" r:id="rId4"/>
+    <p:sldId id="259" r:id="rId5"/>
+    <p:sldId id="261" r:id="rId6"/>
+    <p:sldId id="265" r:id="rId7"/>
+    <p:sldId id="260" r:id="rId8"/>
+    <p:sldId id="266" r:id="rId9"/>
+    <p:sldId id="258" r:id="rId10"/>
+    <p:sldId id="267" r:id="rId11"/>
+    <p:sldId id="262" r:id="rId12"/>
+    <p:sldId id="268" r:id="rId13"/>
+    <p:sldId id="264" r:id="rId14"/>
+    <p:sldId id="269" r:id="rId15"/>
   </p:sldIdLst>
   <p:sldSz cx="12192000" cy="6858000"/>
   <p:notesSz cx="6858000" cy="9144000"/>
@@ -118,6 +120,14 @@
       </a:defRPr>
     </a:lvl9pPr>
   </p:defaultTextStyle>
+  <p:extLst>
+    <p:ext uri="{EFAFB233-063F-42B5-8137-9DF3F51BA10A}">
+      <p15:sldGuideLst xmlns:p15="http://schemas.microsoft.com/office/powerpoint/2012/main"/>
+    </p:ext>
+    <p:ext uri="{2D200454-40CA-4A62-9FC3-DE9A4176ACB9}">
+      <p15:notesGuideLst xmlns:p15="http://schemas.microsoft.com/office/powerpoint/2012/main"/>
+    </p:ext>
+  </p:extLst>
 </p:presentation>
 </file>
 
@@ -538,7 +548,7 @@
           <a:p>
             <a:fld id="{5C718C61-028C-4B62-904D-AF06C416AFC9}" type="slidenum">
               <a:rPr lang="sk-SK" smtClean="0"/>
-              <a:t>3</a:t>
+              <a:t>4</a:t>
             </a:fld>
             <a:endParaRPr lang="sk-SK"/>
           </a:p>
@@ -867,7 +877,7 @@
           <a:p>
             <a:fld id="{5C718C61-028C-4B62-904D-AF06C416AFC9}" type="slidenum">
               <a:rPr lang="sk-SK" smtClean="0"/>
-              <a:t>5</a:t>
+              <a:t>6</a:t>
             </a:fld>
             <a:endParaRPr lang="sk-SK"/>
           </a:p>
@@ -951,7 +961,7 @@
           <a:p>
             <a:fld id="{5C718C61-028C-4B62-904D-AF06C416AFC9}" type="slidenum">
               <a:rPr lang="sk-SK" smtClean="0"/>
-              <a:t>6</a:t>
+              <a:t>7</a:t>
             </a:fld>
             <a:endParaRPr lang="sk-SK"/>
           </a:p>
@@ -1413,7 +1423,7 @@
           <a:p>
             <a:fld id="{5C718C61-028C-4B62-904D-AF06C416AFC9}" type="slidenum">
               <a:rPr lang="sk-SK" smtClean="0"/>
-              <a:t>7</a:t>
+              <a:t>8</a:t>
             </a:fld>
             <a:endParaRPr lang="sk-SK"/>
           </a:p>
@@ -1524,7 +1534,7 @@
           <a:p>
             <a:fld id="{5C718C61-028C-4B62-904D-AF06C416AFC9}" type="slidenum">
               <a:rPr lang="sk-SK" smtClean="0"/>
-              <a:t>8</a:t>
+              <a:t>9</a:t>
             </a:fld>
             <a:endParaRPr lang="sk-SK"/>
           </a:p>
@@ -1799,7 +1809,7 @@
           <a:p>
             <a:fld id="{5C718C61-028C-4B62-904D-AF06C416AFC9}" type="slidenum">
               <a:rPr lang="sk-SK" smtClean="0"/>
-              <a:t>9</a:t>
+              <a:t>10</a:t>
             </a:fld>
             <a:endParaRPr lang="sk-SK"/>
           </a:p>
@@ -2181,7 +2191,7 @@
           <a:p>
             <a:fld id="{5C718C61-028C-4B62-904D-AF06C416AFC9}" type="slidenum">
               <a:rPr lang="sk-SK" smtClean="0"/>
-              <a:t>11</a:t>
+              <a:t>12</a:t>
             </a:fld>
             <a:endParaRPr lang="sk-SK"/>
           </a:p>
@@ -2347,7 +2357,7 @@
           <a:p>
             <a:fld id="{9BADB805-EF45-4459-B069-FB73EDBF81D3}" type="datetimeFigureOut">
               <a:rPr lang="sk-SK" smtClean="0"/>
-              <a:t>13. 3. 2024</a:t>
+              <a:t>14. 3. 2024</a:t>
             </a:fld>
             <a:endParaRPr lang="sk-SK"/>
           </a:p>
@@ -2545,7 +2555,7 @@
           <a:p>
             <a:fld id="{9BADB805-EF45-4459-B069-FB73EDBF81D3}" type="datetimeFigureOut">
               <a:rPr lang="sk-SK" smtClean="0"/>
-              <a:t>13. 3. 2024</a:t>
+              <a:t>14. 3. 2024</a:t>
             </a:fld>
             <a:endParaRPr lang="sk-SK"/>
           </a:p>
@@ -2753,7 +2763,7 @@
           <a:p>
             <a:fld id="{9BADB805-EF45-4459-B069-FB73EDBF81D3}" type="datetimeFigureOut">
               <a:rPr lang="sk-SK" smtClean="0"/>
-              <a:t>13. 3. 2024</a:t>
+              <a:t>14. 3. 2024</a:t>
             </a:fld>
             <a:endParaRPr lang="sk-SK"/>
           </a:p>
@@ -2951,7 +2961,7 @@
           <a:p>
             <a:fld id="{9BADB805-EF45-4459-B069-FB73EDBF81D3}" type="datetimeFigureOut">
               <a:rPr lang="sk-SK" smtClean="0"/>
-              <a:t>13. 3. 2024</a:t>
+              <a:t>14. 3. 2024</a:t>
             </a:fld>
             <a:endParaRPr lang="sk-SK"/>
           </a:p>
@@ -3226,7 +3236,7 @@
           <a:p>
             <a:fld id="{9BADB805-EF45-4459-B069-FB73EDBF81D3}" type="datetimeFigureOut">
               <a:rPr lang="sk-SK" smtClean="0"/>
-              <a:t>13. 3. 2024</a:t>
+              <a:t>14. 3. 2024</a:t>
             </a:fld>
             <a:endParaRPr lang="sk-SK"/>
           </a:p>
@@ -3491,7 +3501,7 @@
           <a:p>
             <a:fld id="{9BADB805-EF45-4459-B069-FB73EDBF81D3}" type="datetimeFigureOut">
               <a:rPr lang="sk-SK" smtClean="0"/>
-              <a:t>13. 3. 2024</a:t>
+              <a:t>14. 3. 2024</a:t>
             </a:fld>
             <a:endParaRPr lang="sk-SK"/>
           </a:p>
@@ -3903,7 +3913,7 @@
           <a:p>
             <a:fld id="{9BADB805-EF45-4459-B069-FB73EDBF81D3}" type="datetimeFigureOut">
               <a:rPr lang="sk-SK" smtClean="0"/>
-              <a:t>13. 3. 2024</a:t>
+              <a:t>14. 3. 2024</a:t>
             </a:fld>
             <a:endParaRPr lang="sk-SK"/>
           </a:p>
@@ -4044,7 +4054,7 @@
           <a:p>
             <a:fld id="{9BADB805-EF45-4459-B069-FB73EDBF81D3}" type="datetimeFigureOut">
               <a:rPr lang="sk-SK" smtClean="0"/>
-              <a:t>13. 3. 2024</a:t>
+              <a:t>14. 3. 2024</a:t>
             </a:fld>
             <a:endParaRPr lang="sk-SK"/>
           </a:p>
@@ -4157,7 +4167,7 @@
           <a:p>
             <a:fld id="{9BADB805-EF45-4459-B069-FB73EDBF81D3}" type="datetimeFigureOut">
               <a:rPr lang="sk-SK" smtClean="0"/>
-              <a:t>13. 3. 2024</a:t>
+              <a:t>14. 3. 2024</a:t>
             </a:fld>
             <a:endParaRPr lang="sk-SK"/>
           </a:p>
@@ -4468,7 +4478,7 @@
           <a:p>
             <a:fld id="{9BADB805-EF45-4459-B069-FB73EDBF81D3}" type="datetimeFigureOut">
               <a:rPr lang="sk-SK" smtClean="0"/>
-              <a:t>13. 3. 2024</a:t>
+              <a:t>14. 3. 2024</a:t>
             </a:fld>
             <a:endParaRPr lang="sk-SK"/>
           </a:p>
@@ -4756,7 +4766,7 @@
           <a:p>
             <a:fld id="{9BADB805-EF45-4459-B069-FB73EDBF81D3}" type="datetimeFigureOut">
               <a:rPr lang="sk-SK" smtClean="0"/>
-              <a:t>13. 3. 2024</a:t>
+              <a:t>14. 3. 2024</a:t>
             </a:fld>
             <a:endParaRPr lang="sk-SK"/>
           </a:p>
@@ -4997,7 +5007,7 @@
           <a:p>
             <a:fld id="{9BADB805-EF45-4459-B069-FB73EDBF81D3}" type="datetimeFigureOut">
               <a:rPr lang="sk-SK" smtClean="0"/>
-              <a:t>13. 3. 2024</a:t>
+              <a:t>14. 3. 2024</a:t>
             </a:fld>
             <a:endParaRPr lang="sk-SK"/>
           </a:p>
@@ -5567,7 +5577,7 @@
           <p:cNvPr id="2" name="Nadpis 1">
             <a:extLst>
               <a:ext uri="{FF2B5EF4-FFF2-40B4-BE49-F238E27FC236}">
-                <a16:creationId xmlns:a16="http://schemas.microsoft.com/office/drawing/2014/main" id="{3D7695E3-0189-6313-9200-9D4923195670}"/>
+                <a16:creationId xmlns:a16="http://schemas.microsoft.com/office/drawing/2014/main" id="{A89903CB-35AC-4150-EBCC-B79DF2B8C885}"/>
               </a:ext>
             </a:extLst>
           </p:cNvPr>
@@ -5585,96 +5595,105 @@
           <a:p>
             <a:r>
               <a:rPr lang="sk-SK" dirty="0"/>
-              <a:t>ext4 – </a:t>
-            </a:r>
-            <a:r>
-              <a:rPr lang="sk-SK" dirty="0" err="1"/>
-              <a:t>Extended</a:t>
-            </a:r>
-            <a:r>
-              <a:rPr lang="sk-SK" dirty="0"/>
-              <a:t> </a:t>
-            </a:r>
-            <a:r>
-              <a:rPr lang="sk-SK" dirty="0" err="1"/>
-              <a:t>File</a:t>
-            </a:r>
-            <a:r>
-              <a:rPr lang="sk-SK" dirty="0"/>
-              <a:t> </a:t>
-            </a:r>
-            <a:r>
-              <a:rPr lang="sk-SK" dirty="0" err="1"/>
-              <a:t>System</a:t>
-            </a:r>
-            <a:endParaRPr lang="sk-SK" dirty="0"/>
-          </a:p>
-        </p:txBody>
-      </p:sp>
-      <p:sp>
-        <p:nvSpPr>
-          <p:cNvPr id="3" name="Zástupný objekt pre obsah 2">
-            <a:extLst>
-              <a:ext uri="{FF2B5EF4-FFF2-40B4-BE49-F238E27FC236}">
-                <a16:creationId xmlns:a16="http://schemas.microsoft.com/office/drawing/2014/main" id="{7A1C5B8D-7595-1C6B-38C4-806D67EB6A4B}"/>
-              </a:ext>
-            </a:extLst>
-          </p:cNvPr>
-          <p:cNvSpPr>
-            <a:spLocks noGrp="1"/>
-          </p:cNvSpPr>
-          <p:nvPr>
-            <p:ph idx="1"/>
-          </p:nvPr>
-        </p:nvSpPr>
-        <p:spPr/>
-        <p:txBody>
-          <a:bodyPr/>
-          <a:lstStyle/>
-          <a:p>
-            <a:r>
-              <a:rPr lang="sk-SK" dirty="0"/>
-              <a:t>Pre operačné systému založené na </a:t>
-            </a:r>
-            <a:r>
-              <a:rPr lang="sk-SK" dirty="0" err="1"/>
-              <a:t>GNU+Linux</a:t>
-            </a:r>
-            <a:endParaRPr lang="sk-SK" dirty="0"/>
-          </a:p>
-          <a:p>
-            <a:r>
-              <a:rPr lang="sk-SK" dirty="0"/>
-              <a:t>Veľmi dobre škálovateľný</a:t>
-            </a:r>
-          </a:p>
-          <a:p>
-            <a:r>
-              <a:rPr lang="sk-SK" dirty="0"/>
-              <a:t>Podpora veľkých súborov a oddielov</a:t>
-            </a:r>
-          </a:p>
-          <a:p>
-            <a:r>
-              <a:rPr lang="sk-SK" dirty="0"/>
-              <a:t>Žurnálový súborový systém</a:t>
-            </a:r>
-          </a:p>
-          <a:p>
-            <a:r>
-              <a:rPr lang="sk-SK" dirty="0"/>
-              <a:t>Veľmi dobrá spätná kompatibilita (staršie verzie ext2, ext3)</a:t>
-            </a:r>
-          </a:p>
-          <a:p>
-            <a:endParaRPr lang="sk-SK" dirty="0"/>
+              <a:t>Štruktúra NTFS</a:t>
+            </a:r>
+          </a:p>
+        </p:txBody>
+      </p:sp>
+      <p:pic>
+        <p:nvPicPr>
+          <p:cNvPr id="1026" name="Picture 2" descr="Structure of NTFS file system">
+            <a:extLst>
+              <a:ext uri="{FF2B5EF4-FFF2-40B4-BE49-F238E27FC236}">
+                <a16:creationId xmlns:a16="http://schemas.microsoft.com/office/drawing/2014/main" id="{B01B4BEB-D59A-1B9A-350A-9717C1EA8909}"/>
+              </a:ext>
+            </a:extLst>
+          </p:cNvPr>
+          <p:cNvPicPr>
+            <a:picLocks noChangeAspect="1" noChangeArrowheads="1"/>
+          </p:cNvPicPr>
+          <p:nvPr/>
+        </p:nvPicPr>
+        <p:blipFill>
+          <a:blip r:embed="rId3">
+            <a:extLst>
+              <a:ext uri="{28A0092B-C50C-407E-A947-70E740481C1C}">
+                <a14:useLocalDpi xmlns:a14="http://schemas.microsoft.com/office/drawing/2010/main" val="0"/>
+              </a:ext>
+            </a:extLst>
+          </a:blip>
+          <a:srcRect/>
+          <a:stretch>
+            <a:fillRect/>
+          </a:stretch>
+        </p:blipFill>
+        <p:spPr bwMode="auto">
+          <a:xfrm>
+            <a:off x="2762250" y="1652587"/>
+            <a:ext cx="6667500" cy="3552825"/>
+          </a:xfrm>
+          <a:prstGeom prst="rect">
+            <a:avLst/>
+          </a:prstGeom>
+          <a:noFill/>
+          <a:extLst>
+            <a:ext uri="{909E8E84-426E-40DD-AFC4-6F175D3DCCD1}">
+              <a14:hiddenFill xmlns:a14="http://schemas.microsoft.com/office/drawing/2010/main">
+                <a:solidFill>
+                  <a:srgbClr val="FFFFFF"/>
+                </a:solidFill>
+              </a14:hiddenFill>
+            </a:ext>
+          </a:extLst>
+        </p:spPr>
+      </p:pic>
+      <p:sp>
+        <p:nvSpPr>
+          <p:cNvPr id="4" name="BlokTextu 3">
+            <a:extLst>
+              <a:ext uri="{FF2B5EF4-FFF2-40B4-BE49-F238E27FC236}">
+                <a16:creationId xmlns:a16="http://schemas.microsoft.com/office/drawing/2014/main" id="{C10C8EF9-AEE1-0820-C294-3D1CCD0F4A6E}"/>
+              </a:ext>
+            </a:extLst>
+          </p:cNvPr>
+          <p:cNvSpPr txBox="1"/>
+          <p:nvPr/>
+        </p:nvSpPr>
+        <p:spPr>
+          <a:xfrm>
+            <a:off x="2938984" y="5388817"/>
+            <a:ext cx="6314032" cy="430887"/>
+          </a:xfrm>
+          <a:prstGeom prst="rect">
+            <a:avLst/>
+          </a:prstGeom>
+          <a:noFill/>
+        </p:spPr>
+        <p:txBody>
+          <a:bodyPr wrap="square" rtlCol="0">
+            <a:spAutoFit/>
+          </a:bodyPr>
+          <a:lstStyle/>
+          <a:p>
+            <a:pPr algn="ctr"/>
+            <a:r>
+              <a:rPr lang="sk-SK" sz="1100" dirty="0"/>
+              <a:t>Obr. 3: Štruktúra súborového systému NTFS</a:t>
+            </a:r>
+            <a:br>
+              <a:rPr lang="sk-SK" sz="1100" dirty="0"/>
+            </a:br>
+            <a:r>
+              <a:rPr lang="sk-SK" sz="1100" dirty="0"/>
+              <a:t>Zdroj: https://www.easeus.com/diskmanager/file-system.html</a:t>
+            </a:r>
           </a:p>
         </p:txBody>
       </p:sp>
     </p:spTree>
     <p:extLst>
       <p:ext uri="{BB962C8B-B14F-4D97-AF65-F5344CB8AC3E}">
-        <p14:creationId xmlns:p14="http://schemas.microsoft.com/office/powerpoint/2010/main" val="4092469905"/>
+        <p14:creationId xmlns:p14="http://schemas.microsoft.com/office/powerpoint/2010/main" val="4245393544"/>
       </p:ext>
     </p:extLst>
   </p:cSld>
@@ -5706,7 +5725,7 @@
           <p:cNvPr id="2" name="Nadpis 1">
             <a:extLst>
               <a:ext uri="{FF2B5EF4-FFF2-40B4-BE49-F238E27FC236}">
-                <a16:creationId xmlns:a16="http://schemas.microsoft.com/office/drawing/2014/main" id="{F7AF72E6-7DCD-74CC-B85B-7DA703C95E45}"/>
+                <a16:creationId xmlns:a16="http://schemas.microsoft.com/office/drawing/2014/main" id="{3D7695E3-0189-6313-9200-9D4923195670}"/>
               </a:ext>
             </a:extLst>
           </p:cNvPr>
@@ -5724,105 +5743,96 @@
           <a:p>
             <a:r>
               <a:rPr lang="sk-SK" dirty="0"/>
-              <a:t>Štruktúra ext4</a:t>
-            </a:r>
-          </a:p>
-        </p:txBody>
-      </p:sp>
-      <p:pic>
-        <p:nvPicPr>
-          <p:cNvPr id="4098" name="Picture 2" descr="ext file system structure">
-            <a:extLst>
-              <a:ext uri="{FF2B5EF4-FFF2-40B4-BE49-F238E27FC236}">
-                <a16:creationId xmlns:a16="http://schemas.microsoft.com/office/drawing/2014/main" id="{83831C78-BA8C-89F8-D9EA-D1C942BAE7FE}"/>
-              </a:ext>
-            </a:extLst>
-          </p:cNvPr>
-          <p:cNvPicPr>
-            <a:picLocks noChangeAspect="1" noChangeArrowheads="1"/>
-          </p:cNvPicPr>
-          <p:nvPr/>
-        </p:nvPicPr>
-        <p:blipFill>
-          <a:blip r:embed="rId3">
-            <a:extLst>
-              <a:ext uri="{28A0092B-C50C-407E-A947-70E740481C1C}">
-                <a14:useLocalDpi xmlns:a14="http://schemas.microsoft.com/office/drawing/2010/main" val="0"/>
-              </a:ext>
-            </a:extLst>
-          </a:blip>
-          <a:srcRect/>
-          <a:stretch>
-            <a:fillRect/>
-          </a:stretch>
-        </p:blipFill>
-        <p:spPr bwMode="auto">
-          <a:xfrm>
-            <a:off x="2762250" y="1225483"/>
-            <a:ext cx="6667500" cy="4705350"/>
-          </a:xfrm>
-          <a:prstGeom prst="rect">
-            <a:avLst/>
-          </a:prstGeom>
-          <a:noFill/>
-          <a:extLst>
-            <a:ext uri="{909E8E84-426E-40DD-AFC4-6F175D3DCCD1}">
-              <a14:hiddenFill xmlns:a14="http://schemas.microsoft.com/office/drawing/2010/main">
-                <a:solidFill>
-                  <a:srgbClr val="FFFFFF"/>
-                </a:solidFill>
-              </a14:hiddenFill>
-            </a:ext>
-          </a:extLst>
-        </p:spPr>
-      </p:pic>
-      <p:sp>
-        <p:nvSpPr>
-          <p:cNvPr id="4" name="BlokTextu 3">
-            <a:extLst>
-              <a:ext uri="{FF2B5EF4-FFF2-40B4-BE49-F238E27FC236}">
-                <a16:creationId xmlns:a16="http://schemas.microsoft.com/office/drawing/2014/main" id="{2632745B-63EA-748E-299D-0D8944A8B4C1}"/>
-              </a:ext>
-            </a:extLst>
-          </p:cNvPr>
-          <p:cNvSpPr txBox="1"/>
-          <p:nvPr/>
-        </p:nvSpPr>
-        <p:spPr>
-          <a:xfrm>
-            <a:off x="2938984" y="5930833"/>
-            <a:ext cx="6314032" cy="430887"/>
-          </a:xfrm>
-          <a:prstGeom prst="rect">
-            <a:avLst/>
-          </a:prstGeom>
-          <a:noFill/>
-        </p:spPr>
-        <p:txBody>
-          <a:bodyPr wrap="square" rtlCol="0">
-            <a:spAutoFit/>
-          </a:bodyPr>
-          <a:lstStyle/>
-          <a:p>
-            <a:pPr algn="ctr"/>
-            <a:r>
-              <a:rPr lang="sk-SK" sz="1100" dirty="0"/>
-              <a:t>Obr. 4: Štruktúra súborového systému ext4</a:t>
-            </a:r>
-            <a:br>
-              <a:rPr lang="sk-SK" sz="1100" dirty="0"/>
-            </a:br>
-            <a:r>
-              <a:rPr lang="sk-SK" sz="1100" dirty="0"/>
-              <a:t>Zdroj: https://www.easeus.com/diskmanager/file-system.html</a:t>
-            </a:r>
+              <a:t>ext4 – </a:t>
+            </a:r>
+            <a:r>
+              <a:rPr lang="sk-SK" dirty="0" err="1"/>
+              <a:t>Extended</a:t>
+            </a:r>
+            <a:r>
+              <a:rPr lang="sk-SK" dirty="0"/>
+              <a:t> </a:t>
+            </a:r>
+            <a:r>
+              <a:rPr lang="sk-SK" dirty="0" err="1"/>
+              <a:t>File</a:t>
+            </a:r>
+            <a:r>
+              <a:rPr lang="sk-SK" dirty="0"/>
+              <a:t> </a:t>
+            </a:r>
+            <a:r>
+              <a:rPr lang="sk-SK" dirty="0" err="1"/>
+              <a:t>System</a:t>
+            </a:r>
+            <a:endParaRPr lang="sk-SK" dirty="0"/>
+          </a:p>
+        </p:txBody>
+      </p:sp>
+      <p:sp>
+        <p:nvSpPr>
+          <p:cNvPr id="3" name="Zástupný objekt pre obsah 2">
+            <a:extLst>
+              <a:ext uri="{FF2B5EF4-FFF2-40B4-BE49-F238E27FC236}">
+                <a16:creationId xmlns:a16="http://schemas.microsoft.com/office/drawing/2014/main" id="{7A1C5B8D-7595-1C6B-38C4-806D67EB6A4B}"/>
+              </a:ext>
+            </a:extLst>
+          </p:cNvPr>
+          <p:cNvSpPr>
+            <a:spLocks noGrp="1"/>
+          </p:cNvSpPr>
+          <p:nvPr>
+            <p:ph idx="1"/>
+          </p:nvPr>
+        </p:nvSpPr>
+        <p:spPr/>
+        <p:txBody>
+          <a:bodyPr/>
+          <a:lstStyle/>
+          <a:p>
+            <a:r>
+              <a:rPr lang="sk-SK" dirty="0"/>
+              <a:t>Pre operačné systému založené na </a:t>
+            </a:r>
+            <a:r>
+              <a:rPr lang="sk-SK" dirty="0" err="1"/>
+              <a:t>GNU+Linux</a:t>
+            </a:r>
+            <a:endParaRPr lang="sk-SK" dirty="0"/>
+          </a:p>
+          <a:p>
+            <a:r>
+              <a:rPr lang="sk-SK" dirty="0"/>
+              <a:t>Veľmi dobre škálovateľný</a:t>
+            </a:r>
+          </a:p>
+          <a:p>
+            <a:r>
+              <a:rPr lang="sk-SK" dirty="0"/>
+              <a:t>Podpora veľkých súborov a oddielov</a:t>
+            </a:r>
+          </a:p>
+          <a:p>
+            <a:r>
+              <a:rPr lang="sk-SK" dirty="0"/>
+              <a:t>Žurnálový súborový systém</a:t>
+            </a:r>
+          </a:p>
+          <a:p>
+            <a:r>
+              <a:rPr lang="sk-SK" dirty="0"/>
+              <a:t>Veľmi dobrá spätná kompatibilita (staršie verzie ext2, ext3)</a:t>
+            </a:r>
+          </a:p>
+          <a:p>
+            <a:endParaRPr lang="sk-SK" dirty="0"/>
           </a:p>
         </p:txBody>
       </p:sp>
     </p:spTree>
     <p:extLst>
       <p:ext uri="{BB962C8B-B14F-4D97-AF65-F5344CB8AC3E}">
-        <p14:creationId xmlns:p14="http://schemas.microsoft.com/office/powerpoint/2010/main" val="3686483182"/>
+        <p14:creationId xmlns:p14="http://schemas.microsoft.com/office/powerpoint/2010/main" val="4092469905"/>
       </p:ext>
     </p:extLst>
   </p:cSld>
@@ -5854,6 +5864,154 @@
           <p:cNvPr id="2" name="Nadpis 1">
             <a:extLst>
               <a:ext uri="{FF2B5EF4-FFF2-40B4-BE49-F238E27FC236}">
+                <a16:creationId xmlns:a16="http://schemas.microsoft.com/office/drawing/2014/main" id="{F7AF72E6-7DCD-74CC-B85B-7DA703C95E45}"/>
+              </a:ext>
+            </a:extLst>
+          </p:cNvPr>
+          <p:cNvSpPr>
+            <a:spLocks noGrp="1"/>
+          </p:cNvSpPr>
+          <p:nvPr>
+            <p:ph type="title"/>
+          </p:nvPr>
+        </p:nvSpPr>
+        <p:spPr/>
+        <p:txBody>
+          <a:bodyPr/>
+          <a:lstStyle/>
+          <a:p>
+            <a:r>
+              <a:rPr lang="sk-SK" dirty="0"/>
+              <a:t>Štruktúra ext4</a:t>
+            </a:r>
+          </a:p>
+        </p:txBody>
+      </p:sp>
+      <p:pic>
+        <p:nvPicPr>
+          <p:cNvPr id="4098" name="Picture 2" descr="ext file system structure">
+            <a:extLst>
+              <a:ext uri="{FF2B5EF4-FFF2-40B4-BE49-F238E27FC236}">
+                <a16:creationId xmlns:a16="http://schemas.microsoft.com/office/drawing/2014/main" id="{83831C78-BA8C-89F8-D9EA-D1C942BAE7FE}"/>
+              </a:ext>
+            </a:extLst>
+          </p:cNvPr>
+          <p:cNvPicPr>
+            <a:picLocks noChangeAspect="1" noChangeArrowheads="1"/>
+          </p:cNvPicPr>
+          <p:nvPr/>
+        </p:nvPicPr>
+        <p:blipFill>
+          <a:blip r:embed="rId3">
+            <a:extLst>
+              <a:ext uri="{28A0092B-C50C-407E-A947-70E740481C1C}">
+                <a14:useLocalDpi xmlns:a14="http://schemas.microsoft.com/office/drawing/2010/main" val="0"/>
+              </a:ext>
+            </a:extLst>
+          </a:blip>
+          <a:srcRect/>
+          <a:stretch>
+            <a:fillRect/>
+          </a:stretch>
+        </p:blipFill>
+        <p:spPr bwMode="auto">
+          <a:xfrm>
+            <a:off x="2762250" y="1225483"/>
+            <a:ext cx="6667500" cy="4705350"/>
+          </a:xfrm>
+          <a:prstGeom prst="rect">
+            <a:avLst/>
+          </a:prstGeom>
+          <a:noFill/>
+          <a:extLst>
+            <a:ext uri="{909E8E84-426E-40DD-AFC4-6F175D3DCCD1}">
+              <a14:hiddenFill xmlns:a14="http://schemas.microsoft.com/office/drawing/2010/main">
+                <a:solidFill>
+                  <a:srgbClr val="FFFFFF"/>
+                </a:solidFill>
+              </a14:hiddenFill>
+            </a:ext>
+          </a:extLst>
+        </p:spPr>
+      </p:pic>
+      <p:sp>
+        <p:nvSpPr>
+          <p:cNvPr id="4" name="BlokTextu 3">
+            <a:extLst>
+              <a:ext uri="{FF2B5EF4-FFF2-40B4-BE49-F238E27FC236}">
+                <a16:creationId xmlns:a16="http://schemas.microsoft.com/office/drawing/2014/main" id="{2632745B-63EA-748E-299D-0D8944A8B4C1}"/>
+              </a:ext>
+            </a:extLst>
+          </p:cNvPr>
+          <p:cNvSpPr txBox="1"/>
+          <p:nvPr/>
+        </p:nvSpPr>
+        <p:spPr>
+          <a:xfrm>
+            <a:off x="2938984" y="5930833"/>
+            <a:ext cx="6314032" cy="430887"/>
+          </a:xfrm>
+          <a:prstGeom prst="rect">
+            <a:avLst/>
+          </a:prstGeom>
+          <a:noFill/>
+        </p:spPr>
+        <p:txBody>
+          <a:bodyPr wrap="square" rtlCol="0">
+            <a:spAutoFit/>
+          </a:bodyPr>
+          <a:lstStyle/>
+          <a:p>
+            <a:pPr algn="ctr"/>
+            <a:r>
+              <a:rPr lang="sk-SK" sz="1100" dirty="0"/>
+              <a:t>Obr. 4: Štruktúra súborového systému ext4</a:t>
+            </a:r>
+            <a:br>
+              <a:rPr lang="sk-SK" sz="1100" dirty="0"/>
+            </a:br>
+            <a:r>
+              <a:rPr lang="sk-SK" sz="1100" dirty="0"/>
+              <a:t>Zdroj: https://www.easeus.com/diskmanager/file-system.html</a:t>
+            </a:r>
+          </a:p>
+        </p:txBody>
+      </p:sp>
+    </p:spTree>
+    <p:extLst>
+      <p:ext uri="{BB962C8B-B14F-4D97-AF65-F5344CB8AC3E}">
+        <p14:creationId xmlns:p14="http://schemas.microsoft.com/office/powerpoint/2010/main" val="3686483182"/>
+      </p:ext>
+    </p:extLst>
+  </p:cSld>
+  <p:clrMapOvr>
+    <a:masterClrMapping/>
+  </p:clrMapOvr>
+</p:sld>
+</file>
+
+<file path=ppt/slides/slide13.xml><?xml version="1.0" encoding="utf-8"?>
+<p:sld xmlns:a="http://schemas.openxmlformats.org/drawingml/2006/main" xmlns:r="http://schemas.openxmlformats.org/officeDocument/2006/relationships" xmlns:p="http://schemas.openxmlformats.org/presentationml/2006/main">
+  <p:cSld>
+    <p:spTree>
+      <p:nvGrpSpPr>
+        <p:cNvPr id="1" name=""/>
+        <p:cNvGrpSpPr/>
+        <p:nvPr/>
+      </p:nvGrpSpPr>
+      <p:grpSpPr>
+        <a:xfrm>
+          <a:off x="0" y="0"/>
+          <a:ext cx="0" cy="0"/>
+          <a:chOff x="0" y="0"/>
+          <a:chExt cx="0" cy="0"/>
+        </a:xfrm>
+      </p:grpSpPr>
+      <p:sp>
+        <p:nvSpPr>
+          <p:cNvPr id="2" name="Nadpis 1">
+            <a:extLst>
+              <a:ext uri="{FF2B5EF4-FFF2-40B4-BE49-F238E27FC236}">
                 <a16:creationId xmlns:a16="http://schemas.microsoft.com/office/drawing/2014/main" id="{0965500D-97DA-EB75-72A6-A40F11547EFC}"/>
               </a:ext>
             </a:extLst>
@@ -5887,6 +6045,164 @@
     <p:extLst>
       <p:ext uri="{BB962C8B-B14F-4D97-AF65-F5344CB8AC3E}">
         <p14:creationId xmlns:p14="http://schemas.microsoft.com/office/powerpoint/2010/main" val="3032414417"/>
+      </p:ext>
+    </p:extLst>
+  </p:cSld>
+  <p:clrMapOvr>
+    <a:masterClrMapping/>
+  </p:clrMapOvr>
+</p:sld>
+</file>
+
+<file path=ppt/slides/slide14.xml><?xml version="1.0" encoding="utf-8"?>
+<p:sld xmlns:a="http://schemas.openxmlformats.org/drawingml/2006/main" xmlns:r="http://schemas.openxmlformats.org/officeDocument/2006/relationships" xmlns:p="http://schemas.openxmlformats.org/presentationml/2006/main">
+  <p:cSld>
+    <p:spTree>
+      <p:nvGrpSpPr>
+        <p:cNvPr id="1" name=""/>
+        <p:cNvGrpSpPr/>
+        <p:nvPr/>
+      </p:nvGrpSpPr>
+      <p:grpSpPr>
+        <a:xfrm>
+          <a:off x="0" y="0"/>
+          <a:ext cx="0" cy="0"/>
+          <a:chOff x="0" y="0"/>
+          <a:chExt cx="0" cy="0"/>
+        </a:xfrm>
+      </p:grpSpPr>
+      <p:sp>
+        <p:nvSpPr>
+          <p:cNvPr id="2" name="Nadpis 1">
+            <a:extLst>
+              <a:ext uri="{FF2B5EF4-FFF2-40B4-BE49-F238E27FC236}">
+                <a16:creationId xmlns:a16="http://schemas.microsoft.com/office/drawing/2014/main" id="{0B0994D1-F6E4-8B53-BD59-AE2839E32BDC}"/>
+              </a:ext>
+            </a:extLst>
+          </p:cNvPr>
+          <p:cNvSpPr>
+            <a:spLocks noGrp="1"/>
+          </p:cNvSpPr>
+          <p:nvPr>
+            <p:ph type="title"/>
+          </p:nvPr>
+        </p:nvSpPr>
+        <p:spPr/>
+        <p:txBody>
+          <a:bodyPr/>
+          <a:lstStyle/>
+          <a:p>
+            <a:r>
+              <a:rPr lang="en-US" dirty="0" err="1"/>
+              <a:t>Zdroje</a:t>
+            </a:r>
+            <a:endParaRPr lang="sk-SK" dirty="0"/>
+          </a:p>
+        </p:txBody>
+      </p:sp>
+      <p:sp>
+        <p:nvSpPr>
+          <p:cNvPr id="3" name="Zástupný objekt pre obsah 2">
+            <a:extLst>
+              <a:ext uri="{FF2B5EF4-FFF2-40B4-BE49-F238E27FC236}">
+                <a16:creationId xmlns:a16="http://schemas.microsoft.com/office/drawing/2014/main" id="{85D7D00F-7B6E-211E-59A7-C1AD88F5177F}"/>
+              </a:ext>
+            </a:extLst>
+          </p:cNvPr>
+          <p:cNvSpPr>
+            <a:spLocks noGrp="1"/>
+          </p:cNvSpPr>
+          <p:nvPr>
+            <p:ph idx="1"/>
+          </p:nvPr>
+        </p:nvSpPr>
+        <p:spPr/>
+        <p:txBody>
+          <a:bodyPr>
+            <a:normAutofit/>
+          </a:bodyPr>
+          <a:lstStyle/>
+          <a:p>
+            <a:r>
+              <a:rPr lang="sk-SK" sz="1400" dirty="0">
+                <a:hlinkClick r:id="rId2"/>
+              </a:rPr>
+              <a:t>https://www.easeus.com/diskmanager/file-system.html</a:t>
+            </a:r>
+            <a:endParaRPr lang="en-US" sz="1400" dirty="0"/>
+          </a:p>
+          <a:p>
+            <a:r>
+              <a:rPr lang="sk-SK" sz="1400" dirty="0">
+                <a:hlinkClick r:id="rId3"/>
+              </a:rPr>
+              <a:t>https://www.easeus.com/partition-master/ext2-ext3-ext4-file-system-format-and-difference.html</a:t>
+            </a:r>
+            <a:endParaRPr lang="en-US" sz="1400" dirty="0"/>
+          </a:p>
+          <a:p>
+            <a:r>
+              <a:rPr lang="sk-SK" sz="1600" dirty="0">
+                <a:hlinkClick r:id="rId4"/>
+              </a:rPr>
+              <a:t>https://www.kernel.org/doc/html/v4.19/filesystems/ext4/index.html</a:t>
+            </a:r>
+            <a:endParaRPr lang="en-US" sz="1600" dirty="0"/>
+          </a:p>
+          <a:p>
+            <a:r>
+              <a:rPr lang="sk-SK" sz="1600" dirty="0">
+                <a:hlinkClick r:id="rId5"/>
+              </a:rPr>
+              <a:t>https://superops.com/ntfs-vs-fat32</a:t>
+            </a:r>
+            <a:endParaRPr lang="en-US" sz="1600" dirty="0"/>
+          </a:p>
+          <a:p>
+            <a:r>
+              <a:rPr lang="sk-SK" sz="1600" dirty="0">
+                <a:hlinkClick r:id="rId6"/>
+              </a:rPr>
+              <a:t>https://www.easeus.com/partition-manager-software/fat-file-system-format.html</a:t>
+            </a:r>
+            <a:endParaRPr lang="en-US" sz="1600" dirty="0"/>
+          </a:p>
+          <a:p>
+            <a:r>
+              <a:rPr lang="sk-SK" sz="1600" dirty="0">
+                <a:hlinkClick r:id="rId2"/>
+              </a:rPr>
+              <a:t>https://www.easeus.com/diskmanager/file-system.html</a:t>
+            </a:r>
+            <a:endParaRPr lang="en-US" sz="1600" dirty="0"/>
+          </a:p>
+          <a:p>
+            <a:r>
+              <a:rPr lang="sk-SK" sz="1600" dirty="0">
+                <a:hlinkClick r:id="rId7"/>
+              </a:rPr>
+              <a:t>https://www.ntfs.com/data-integrity.htm</a:t>
+            </a:r>
+            <a:endParaRPr lang="en-US" sz="1600" dirty="0"/>
+          </a:p>
+          <a:p>
+            <a:r>
+              <a:rPr lang="sk-SK" sz="1600" dirty="0">
+                <a:hlinkClick r:id="rId8"/>
+              </a:rPr>
+              <a:t>https://dubeyko.com/development/FileSystems/NTFS/ntfsdoc.pdf</a:t>
+            </a:r>
+            <a:endParaRPr lang="en-US" sz="1600" dirty="0"/>
+          </a:p>
+          <a:p>
+            <a:endParaRPr lang="sk-SK" sz="1600" dirty="0"/>
+          </a:p>
+        </p:txBody>
+      </p:sp>
+    </p:spTree>
+    <p:extLst>
+      <p:ext uri="{BB962C8B-B14F-4D97-AF65-F5344CB8AC3E}">
+        <p14:creationId xmlns:p14="http://schemas.microsoft.com/office/powerpoint/2010/main" val="1907482850"/>
       </p:ext>
     </p:extLst>
   </p:cSld>
@@ -5918,7 +6234,7 @@
           <p:cNvPr id="2" name="Nadpis 1">
             <a:extLst>
               <a:ext uri="{FF2B5EF4-FFF2-40B4-BE49-F238E27FC236}">
-                <a16:creationId xmlns:a16="http://schemas.microsoft.com/office/drawing/2014/main" id="{2FE7598E-6DAD-AD42-DC61-D8CD5A56FD58}"/>
+                <a16:creationId xmlns:a16="http://schemas.microsoft.com/office/drawing/2014/main" id="{064E1AE7-8029-0AF9-4149-346DABCFE4C8}"/>
               </a:ext>
             </a:extLst>
           </p:cNvPr>
@@ -5935,60 +6251,78 @@
           <a:lstStyle/>
           <a:p>
             <a:r>
+              <a:rPr lang="en-US" dirty="0" err="1"/>
+              <a:t>Obsah</a:t>
+            </a:r>
+            <a:endParaRPr lang="sk-SK" dirty="0"/>
+          </a:p>
+        </p:txBody>
+      </p:sp>
+      <p:sp>
+        <p:nvSpPr>
+          <p:cNvPr id="3" name="Zástupný objekt pre obsah 2">
+            <a:extLst>
+              <a:ext uri="{FF2B5EF4-FFF2-40B4-BE49-F238E27FC236}">
+                <a16:creationId xmlns:a16="http://schemas.microsoft.com/office/drawing/2014/main" id="{E634F2EF-70BA-8E3D-F1EF-C5A5809A7D5E}"/>
+              </a:ext>
+            </a:extLst>
+          </p:cNvPr>
+          <p:cNvSpPr>
+            <a:spLocks noGrp="1"/>
+          </p:cNvSpPr>
+          <p:nvPr>
+            <p:ph idx="1"/>
+          </p:nvPr>
+        </p:nvSpPr>
+        <p:spPr/>
+        <p:txBody>
+          <a:bodyPr/>
+          <a:lstStyle/>
+          <a:p>
+            <a:r>
+              <a:rPr lang="en-US" dirty="0"/>
+              <a:t>S</a:t>
+            </a:r>
+            <a:r>
+              <a:rPr lang="sk-SK" dirty="0" err="1"/>
+              <a:t>úborové</a:t>
+            </a:r>
+            <a:r>
               <a:rPr lang="sk-SK" dirty="0"/>
-              <a:t>Súborový systém</a:t>
-            </a:r>
-          </a:p>
-        </p:txBody>
-      </p:sp>
-      <p:sp>
-        <p:nvSpPr>
-          <p:cNvPr id="3" name="Zástupný objekt pre obsah 2">
-            <a:extLst>
-              <a:ext uri="{FF2B5EF4-FFF2-40B4-BE49-F238E27FC236}">
-                <a16:creationId xmlns:a16="http://schemas.microsoft.com/office/drawing/2014/main" id="{C7DB9D94-A7DA-BB22-134F-9A9E18E3C1D0}"/>
-              </a:ext>
-            </a:extLst>
-          </p:cNvPr>
-          <p:cNvSpPr>
-            <a:spLocks noGrp="1"/>
-          </p:cNvSpPr>
-          <p:nvPr>
-            <p:ph idx="1"/>
-          </p:nvPr>
-        </p:nvSpPr>
-        <p:spPr/>
-        <p:txBody>
-          <a:bodyPr/>
-          <a:lstStyle/>
+              <a:t> systémy</a:t>
+            </a:r>
+          </a:p>
           <a:p>
             <a:r>
               <a:rPr lang="sk-SK" dirty="0"/>
-              <a:t>Veľmi úzko prepojený s OS</a:t>
-            </a:r>
-          </a:p>
-          <a:p>
+              <a:t>FAT</a:t>
+            </a:r>
+          </a:p>
+          <a:p>
+            <a:pPr lvl="1"/>
             <a:r>
               <a:rPr lang="sk-SK" dirty="0"/>
-              <a:t>Slúži na správu a organizáciu súborov</a:t>
-            </a:r>
+              <a:t>FAT32</a:t>
+            </a:r>
+          </a:p>
+          <a:p>
+            <a:pPr lvl="1"/>
+            <a:r>
+              <a:rPr lang="sk-SK" dirty="0" err="1"/>
+              <a:t>exFAT</a:t>
+            </a:r>
+            <a:endParaRPr lang="sk-SK" dirty="0"/>
           </a:p>
           <a:p>
             <a:r>
               <a:rPr lang="sk-SK" dirty="0"/>
-              <a:t>Zachováva integritu údajov</a:t>
+              <a:t>NTFS</a:t>
             </a:r>
           </a:p>
           <a:p>
             <a:r>
               <a:rPr lang="sk-SK" dirty="0"/>
-              <a:t>Je škálovateľný</a:t>
-            </a:r>
-          </a:p>
-          <a:p>
-            <a:r>
-              <a:rPr lang="sk-SK" dirty="0"/>
-              <a:t>Môže podporovať šifrovanie a kompresiu (napr. NTFS)</a:t>
+              <a:t>ext4</a:t>
             </a:r>
           </a:p>
         </p:txBody>
@@ -5996,7 +6330,7 @@
     </p:spTree>
     <p:extLst>
       <p:ext uri="{BB962C8B-B14F-4D97-AF65-F5344CB8AC3E}">
-        <p14:creationId xmlns:p14="http://schemas.microsoft.com/office/powerpoint/2010/main" val="3124871773"/>
+        <p14:creationId xmlns:p14="http://schemas.microsoft.com/office/powerpoint/2010/main" val="1559395158"/>
       </p:ext>
     </p:extLst>
   </p:cSld>
@@ -6028,7 +6362,7 @@
           <p:cNvPr id="2" name="Nadpis 1">
             <a:extLst>
               <a:ext uri="{FF2B5EF4-FFF2-40B4-BE49-F238E27FC236}">
-                <a16:creationId xmlns:a16="http://schemas.microsoft.com/office/drawing/2014/main" id="{C123E4BB-20E0-8ED3-D90E-A999C0608408}"/>
+                <a16:creationId xmlns:a16="http://schemas.microsoft.com/office/drawing/2014/main" id="{2FE7598E-6DAD-AD42-DC61-D8CD5A56FD58}"/>
               </a:ext>
             </a:extLst>
           </p:cNvPr>
@@ -6046,86 +6380,59 @@
           <a:p>
             <a:r>
               <a:rPr lang="sk-SK" dirty="0"/>
-              <a:t>FAT – </a:t>
-            </a:r>
-            <a:r>
-              <a:rPr lang="sk-SK" dirty="0" err="1"/>
-              <a:t>File</a:t>
-            </a:r>
+              <a:t>Súborový systém</a:t>
+            </a:r>
+          </a:p>
+        </p:txBody>
+      </p:sp>
+      <p:sp>
+        <p:nvSpPr>
+          <p:cNvPr id="3" name="Zástupný objekt pre obsah 2">
+            <a:extLst>
+              <a:ext uri="{FF2B5EF4-FFF2-40B4-BE49-F238E27FC236}">
+                <a16:creationId xmlns:a16="http://schemas.microsoft.com/office/drawing/2014/main" id="{C7DB9D94-A7DA-BB22-134F-9A9E18E3C1D0}"/>
+              </a:ext>
+            </a:extLst>
+          </p:cNvPr>
+          <p:cNvSpPr>
+            <a:spLocks noGrp="1"/>
+          </p:cNvSpPr>
+          <p:nvPr>
+            <p:ph idx="1"/>
+          </p:nvPr>
+        </p:nvSpPr>
+        <p:spPr/>
+        <p:txBody>
+          <a:bodyPr/>
+          <a:lstStyle/>
+          <a:p>
             <a:r>
               <a:rPr lang="sk-SK" dirty="0"/>
-              <a:t> </a:t>
-            </a:r>
-            <a:r>
-              <a:rPr lang="sk-SK" dirty="0" err="1"/>
-              <a:t>Allocation</a:t>
-            </a:r>
+              <a:t>Veľmi úzko prepojený s OS</a:t>
+            </a:r>
+          </a:p>
+          <a:p>
             <a:r>
               <a:rPr lang="sk-SK" dirty="0"/>
-              <a:t> Table</a:t>
-            </a:r>
-          </a:p>
-        </p:txBody>
-      </p:sp>
-      <p:sp>
-        <p:nvSpPr>
-          <p:cNvPr id="3" name="Zástupný objekt pre obsah 2">
-            <a:extLst>
-              <a:ext uri="{FF2B5EF4-FFF2-40B4-BE49-F238E27FC236}">
-                <a16:creationId xmlns:a16="http://schemas.microsoft.com/office/drawing/2014/main" id="{311E6955-D1C1-11BE-6CB1-6252300822FA}"/>
-              </a:ext>
-            </a:extLst>
-          </p:cNvPr>
-          <p:cNvSpPr>
-            <a:spLocks noGrp="1"/>
-          </p:cNvSpPr>
-          <p:nvPr>
-            <p:ph idx="1"/>
-          </p:nvPr>
-        </p:nvSpPr>
-        <p:spPr/>
-        <p:txBody>
-          <a:bodyPr/>
-          <a:lstStyle/>
+              <a:t>Slúži na správu a organizáciu súborov</a:t>
+            </a:r>
+          </a:p>
           <a:p>
             <a:r>
               <a:rPr lang="sk-SK" dirty="0"/>
-              <a:t>Má veľmi jednoduchú štruktúru</a:t>
+              <a:t>Zachováva integritu údajov</a:t>
             </a:r>
           </a:p>
           <a:p>
             <a:r>
               <a:rPr lang="sk-SK" dirty="0"/>
-              <a:t>Zároveň je však limitovaný</a:t>
+              <a:t>Je škálovateľný</a:t>
             </a:r>
           </a:p>
           <a:p>
             <a:r>
               <a:rPr lang="sk-SK" dirty="0"/>
-              <a:t>Používa tabuľku na uloženie informácií o súboroch</a:t>
-            </a:r>
-          </a:p>
-          <a:p>
-            <a:r>
-              <a:rPr lang="sk-SK" dirty="0"/>
-              <a:t>Spätná kompatibilita</a:t>
-            </a:r>
-          </a:p>
-          <a:p>
-            <a:r>
-              <a:rPr lang="sk-SK" dirty="0"/>
-              <a:t>Viacej verzií: FAT12, FAT16, FAT32, </a:t>
-            </a:r>
-            <a:r>
-              <a:rPr lang="sk-SK" dirty="0" err="1"/>
-              <a:t>exFAT</a:t>
-            </a:r>
-            <a:endParaRPr lang="sk-SK" dirty="0"/>
-          </a:p>
-          <a:p>
-            <a:r>
-              <a:rPr lang="sk-SK" dirty="0"/>
-              <a:t>Číslo verzie predstavuje počet bitov určených na uloženie adresy súboru</a:t>
+              <a:t>Môže podporovať šifrovanie a kompresiu (napr. NTFS)</a:t>
             </a:r>
           </a:p>
         </p:txBody>
@@ -6133,7 +6440,7 @@
     </p:spTree>
     <p:extLst>
       <p:ext uri="{BB962C8B-B14F-4D97-AF65-F5344CB8AC3E}">
-        <p14:creationId xmlns:p14="http://schemas.microsoft.com/office/powerpoint/2010/main" val="3400973894"/>
+        <p14:creationId xmlns:p14="http://schemas.microsoft.com/office/powerpoint/2010/main" val="3124871773"/>
       </p:ext>
     </p:extLst>
   </p:cSld>
@@ -6165,7 +6472,7 @@
           <p:cNvPr id="2" name="Nadpis 1">
             <a:extLst>
               <a:ext uri="{FF2B5EF4-FFF2-40B4-BE49-F238E27FC236}">
-                <a16:creationId xmlns:a16="http://schemas.microsoft.com/office/drawing/2014/main" id="{DCF2C3C6-2D1B-CF60-DCC3-29B55600E95D}"/>
+                <a16:creationId xmlns:a16="http://schemas.microsoft.com/office/drawing/2014/main" id="{C123E4BB-20E0-8ED3-D90E-A999C0608408}"/>
               </a:ext>
             </a:extLst>
           </p:cNvPr>
@@ -6183,7 +6490,23 @@
           <a:p>
             <a:r>
               <a:rPr lang="sk-SK" dirty="0"/>
-              <a:t>FAT32</a:t>
+              <a:t>FAT – </a:t>
+            </a:r>
+            <a:r>
+              <a:rPr lang="sk-SK" dirty="0" err="1"/>
+              <a:t>File</a:t>
+            </a:r>
+            <a:r>
+              <a:rPr lang="sk-SK" dirty="0"/>
+              <a:t> </a:t>
+            </a:r>
+            <a:r>
+              <a:rPr lang="sk-SK" dirty="0" err="1"/>
+              <a:t>Allocation</a:t>
+            </a:r>
+            <a:r>
+              <a:rPr lang="sk-SK" dirty="0"/>
+              <a:t> Table</a:t>
             </a:r>
           </a:p>
         </p:txBody>
@@ -6193,7 +6516,7 @@
           <p:cNvPr id="3" name="Zástupný objekt pre obsah 2">
             <a:extLst>
               <a:ext uri="{FF2B5EF4-FFF2-40B4-BE49-F238E27FC236}">
-                <a16:creationId xmlns:a16="http://schemas.microsoft.com/office/drawing/2014/main" id="{01688284-92B7-B40D-F78F-B368533ECEF1}"/>
+                <a16:creationId xmlns:a16="http://schemas.microsoft.com/office/drawing/2014/main" id="{311E6955-D1C1-11BE-6CB1-6252300822FA}"/>
               </a:ext>
             </a:extLst>
           </p:cNvPr>
@@ -6211,25 +6534,42 @@
           <a:p>
             <a:r>
               <a:rPr lang="sk-SK" dirty="0"/>
-              <a:t>Podporuje súbory do veľkosti 4GB</a:t>
+              <a:t>Má veľmi jednoduchú štruktúru</a:t>
             </a:r>
           </a:p>
           <a:p>
             <a:r>
               <a:rPr lang="sk-SK" dirty="0"/>
-              <a:t>Efektívnejšie využitie miesta na disku oproti FAT16</a:t>
+              <a:t>Zároveň je však limitovaný</a:t>
             </a:r>
           </a:p>
           <a:p>
             <a:r>
               <a:rPr lang="sk-SK" dirty="0"/>
-              <a:t>Maximálna veľkosť oddielu je 2TB </a:t>
+              <a:t>Používa tabuľku na uloženie informácií o súboroch</a:t>
             </a:r>
           </a:p>
           <a:p>
             <a:r>
               <a:rPr lang="sk-SK" dirty="0"/>
-              <a:t>Používaný na prenosných médiách (do 32GB)</a:t>
+              <a:t>Spätná kompatibilita</a:t>
+            </a:r>
+          </a:p>
+          <a:p>
+            <a:r>
+              <a:rPr lang="sk-SK" dirty="0"/>
+              <a:t>Viacej verzií: FAT12, FAT16, FAT32, </a:t>
+            </a:r>
+            <a:r>
+              <a:rPr lang="sk-SK" dirty="0" err="1"/>
+              <a:t>exFAT</a:t>
+            </a:r>
+            <a:endParaRPr lang="sk-SK" dirty="0"/>
+          </a:p>
+          <a:p>
+            <a:r>
+              <a:rPr lang="sk-SK" dirty="0"/>
+              <a:t>Číslo verzie predstavuje počet bitov určených na uloženie adresy súboru</a:t>
             </a:r>
           </a:p>
         </p:txBody>
@@ -6237,7 +6577,7 @@
     </p:spTree>
     <p:extLst>
       <p:ext uri="{BB962C8B-B14F-4D97-AF65-F5344CB8AC3E}">
-        <p14:creationId xmlns:p14="http://schemas.microsoft.com/office/powerpoint/2010/main" val="2676562170"/>
+        <p14:creationId xmlns:p14="http://schemas.microsoft.com/office/powerpoint/2010/main" val="3400973894"/>
       </p:ext>
     </p:extLst>
   </p:cSld>
@@ -6269,7 +6609,7 @@
           <p:cNvPr id="2" name="Nadpis 1">
             <a:extLst>
               <a:ext uri="{FF2B5EF4-FFF2-40B4-BE49-F238E27FC236}">
-                <a16:creationId xmlns:a16="http://schemas.microsoft.com/office/drawing/2014/main" id="{79A487DC-260B-CC15-A174-5281F32DC450}"/>
+                <a16:creationId xmlns:a16="http://schemas.microsoft.com/office/drawing/2014/main" id="{DCF2C3C6-2D1B-CF60-DCC3-29B55600E95D}"/>
               </a:ext>
             </a:extLst>
           </p:cNvPr>
@@ -6287,97 +6627,53 @@
           <a:p>
             <a:r>
               <a:rPr lang="sk-SK" dirty="0"/>
-              <a:t>Štruktúra FAT a FAT32</a:t>
-            </a:r>
-          </a:p>
-        </p:txBody>
-      </p:sp>
-      <p:pic>
-        <p:nvPicPr>
-          <p:cNvPr id="2050" name="Picture 2" descr="FAT file system structure">
-            <a:extLst>
-              <a:ext uri="{FF2B5EF4-FFF2-40B4-BE49-F238E27FC236}">
-                <a16:creationId xmlns:a16="http://schemas.microsoft.com/office/drawing/2014/main" id="{827E4998-111A-6935-5E02-171BA70296E0}"/>
-              </a:ext>
-            </a:extLst>
-          </p:cNvPr>
-          <p:cNvPicPr>
-            <a:picLocks noChangeAspect="1" noChangeArrowheads="1"/>
-          </p:cNvPicPr>
-          <p:nvPr/>
-        </p:nvPicPr>
-        <p:blipFill>
-          <a:blip r:embed="rId3">
-            <a:extLst>
-              <a:ext uri="{28A0092B-C50C-407E-A947-70E740481C1C}">
-                <a14:useLocalDpi xmlns:a14="http://schemas.microsoft.com/office/drawing/2010/main" val="0"/>
-              </a:ext>
-            </a:extLst>
-          </a:blip>
-          <a:srcRect/>
-          <a:stretch>
-            <a:fillRect/>
-          </a:stretch>
-        </p:blipFill>
-        <p:spPr bwMode="auto">
-          <a:xfrm>
-            <a:off x="3076119" y="1245446"/>
-            <a:ext cx="6039762" cy="4726395"/>
-          </a:xfrm>
-          <a:prstGeom prst="rect">
-            <a:avLst/>
-          </a:prstGeom>
-          <a:noFill/>
-          <a:extLst>
-            <a:ext uri="{909E8E84-426E-40DD-AFC4-6F175D3DCCD1}">
-              <a14:hiddenFill xmlns:a14="http://schemas.microsoft.com/office/drawing/2010/main">
-                <a:solidFill>
-                  <a:srgbClr val="FFFFFF"/>
-                </a:solidFill>
-              </a14:hiddenFill>
-            </a:ext>
-          </a:extLst>
-        </p:spPr>
-      </p:pic>
-      <p:sp>
-        <p:nvSpPr>
-          <p:cNvPr id="4" name="BlokTextu 3">
-            <a:extLst>
-              <a:ext uri="{FF2B5EF4-FFF2-40B4-BE49-F238E27FC236}">
-                <a16:creationId xmlns:a16="http://schemas.microsoft.com/office/drawing/2014/main" id="{585B1115-B724-1A94-7D23-EA6BA1E586BB}"/>
-              </a:ext>
-            </a:extLst>
-          </p:cNvPr>
-          <p:cNvSpPr txBox="1"/>
-          <p:nvPr/>
-        </p:nvSpPr>
-        <p:spPr>
-          <a:xfrm>
-            <a:off x="3179265" y="5939596"/>
-            <a:ext cx="6314032" cy="430887"/>
-          </a:xfrm>
-          <a:prstGeom prst="rect">
-            <a:avLst/>
-          </a:prstGeom>
-          <a:noFill/>
-        </p:spPr>
-        <p:txBody>
-          <a:bodyPr wrap="square" rtlCol="0">
-            <a:spAutoFit/>
-          </a:bodyPr>
-          <a:lstStyle/>
-          <a:p>
-            <a:pPr algn="ctr"/>
-            <a:r>
-              <a:rPr lang="sk-SK" sz="1100" dirty="0"/>
-              <a:t>Obr. 1: Štruktúra súborových systémov FAT a FAT32</a:t>
-            </a:r>
-            <a:br>
-              <a:rPr lang="sk-SK" sz="1100" dirty="0"/>
-            </a:br>
-            <a:r>
-              <a:rPr lang="sk-SK" sz="1100" dirty="0"/>
-              <a:t>Zdroj: https://www.easeus.com/diskmanager/file-system.html</a:t>
+              <a:t>FAT32</a:t>
+            </a:r>
+          </a:p>
+        </p:txBody>
+      </p:sp>
+      <p:sp>
+        <p:nvSpPr>
+          <p:cNvPr id="3" name="Zástupný objekt pre obsah 2">
+            <a:extLst>
+              <a:ext uri="{FF2B5EF4-FFF2-40B4-BE49-F238E27FC236}">
+                <a16:creationId xmlns:a16="http://schemas.microsoft.com/office/drawing/2014/main" id="{01688284-92B7-B40D-F78F-B368533ECEF1}"/>
+              </a:ext>
+            </a:extLst>
+          </p:cNvPr>
+          <p:cNvSpPr>
+            <a:spLocks noGrp="1"/>
+          </p:cNvSpPr>
+          <p:nvPr>
+            <p:ph idx="1"/>
+          </p:nvPr>
+        </p:nvSpPr>
+        <p:spPr/>
+        <p:txBody>
+          <a:bodyPr/>
+          <a:lstStyle/>
+          <a:p>
+            <a:r>
+              <a:rPr lang="sk-SK" dirty="0"/>
+              <a:t>Podporuje súbory do veľkosti 4GB</a:t>
+            </a:r>
+          </a:p>
+          <a:p>
+            <a:r>
+              <a:rPr lang="sk-SK" dirty="0"/>
+              <a:t>Efektívnejšie využitie miesta na disku oproti FAT16</a:t>
+            </a:r>
+          </a:p>
+          <a:p>
+            <a:r>
+              <a:rPr lang="sk-SK" dirty="0"/>
+              <a:t>Maximálna veľkosť oddielu je 2TB </a:t>
+            </a:r>
+          </a:p>
+          <a:p>
+            <a:r>
+              <a:rPr lang="sk-SK" dirty="0"/>
+              <a:t>Používaný na prenosných médiách (do 32GB)</a:t>
             </a:r>
           </a:p>
         </p:txBody>
@@ -6385,7 +6681,7 @@
     </p:spTree>
     <p:extLst>
       <p:ext uri="{BB962C8B-B14F-4D97-AF65-F5344CB8AC3E}">
-        <p14:creationId xmlns:p14="http://schemas.microsoft.com/office/powerpoint/2010/main" val="2566956878"/>
+        <p14:creationId xmlns:p14="http://schemas.microsoft.com/office/powerpoint/2010/main" val="2676562170"/>
       </p:ext>
     </p:extLst>
   </p:cSld>
@@ -6417,7 +6713,7 @@
           <p:cNvPr id="2" name="Nadpis 1">
             <a:extLst>
               <a:ext uri="{FF2B5EF4-FFF2-40B4-BE49-F238E27FC236}">
-                <a16:creationId xmlns:a16="http://schemas.microsoft.com/office/drawing/2014/main" id="{2DD353EA-867B-EAD5-EE64-B8C457EF5D9E}"/>
+                <a16:creationId xmlns:a16="http://schemas.microsoft.com/office/drawing/2014/main" id="{79A487DC-260B-CC15-A174-5281F32DC450}"/>
               </a:ext>
             </a:extLst>
           </p:cNvPr>
@@ -6434,75 +6730,98 @@
           <a:lstStyle/>
           <a:p>
             <a:r>
-              <a:rPr lang="sk-SK" dirty="0" err="1"/>
-              <a:t>exFAT</a:t>
-            </a:r>
-            <a:endParaRPr lang="sk-SK" dirty="0"/>
-          </a:p>
-        </p:txBody>
-      </p:sp>
-      <p:sp>
-        <p:nvSpPr>
-          <p:cNvPr id="3" name="Zástupný objekt pre obsah 2">
-            <a:extLst>
-              <a:ext uri="{FF2B5EF4-FFF2-40B4-BE49-F238E27FC236}">
-                <a16:creationId xmlns:a16="http://schemas.microsoft.com/office/drawing/2014/main" id="{1140D524-240C-7A2E-FC98-1E233B7BBBC5}"/>
-              </a:ext>
-            </a:extLst>
-          </p:cNvPr>
-          <p:cNvSpPr>
-            <a:spLocks noGrp="1"/>
-          </p:cNvSpPr>
-          <p:nvPr>
-            <p:ph idx="1"/>
-          </p:nvPr>
-        </p:nvSpPr>
-        <p:spPr/>
-        <p:txBody>
-          <a:bodyPr/>
-          <a:lstStyle/>
-          <a:p>
-            <a:r>
               <a:rPr lang="sk-SK" dirty="0"/>
-              <a:t>Optimalizovaný pre média s „</a:t>
-            </a:r>
-            <a:r>
-              <a:rPr lang="sk-SK" dirty="0" err="1"/>
-              <a:t>flash</a:t>
-            </a:r>
-            <a:r>
-              <a:rPr lang="sk-SK" dirty="0"/>
-              <a:t>“ pamäťou</a:t>
-            </a:r>
-          </a:p>
-          <a:p>
-            <a:r>
-              <a:rPr lang="sk-SK" dirty="0"/>
-              <a:t>Podporuje rádovo väčšiu veľkosť súborov ako FAT32 (</a:t>
-            </a:r>
-            <a:r>
-              <a:rPr lang="sk-SK" dirty="0" err="1"/>
-              <a:t>ExaByty</a:t>
-            </a:r>
-            <a:r>
-              <a:rPr lang="sk-SK" dirty="0"/>
-              <a:t>)</a:t>
-            </a:r>
-          </a:p>
-          <a:p>
-            <a:r>
-              <a:rPr lang="sk-SK" dirty="0"/>
-              <a:t>Vhodný prenosové média s veľkosťou nad 32GB</a:t>
-            </a:r>
-          </a:p>
-          <a:p>
-            <a:r>
-              <a:rPr lang="sk-SK" dirty="0" err="1"/>
-              <a:t>Interoperabilita</a:t>
-            </a:r>
-            <a:r>
-              <a:rPr lang="sk-SK" dirty="0"/>
-              <a:t> medzi viacerými OS</a:t>
+              <a:t>Štruktúra FAT a FAT32</a:t>
+            </a:r>
+          </a:p>
+        </p:txBody>
+      </p:sp>
+      <p:pic>
+        <p:nvPicPr>
+          <p:cNvPr id="2050" name="Picture 2" descr="FAT file system structure">
+            <a:extLst>
+              <a:ext uri="{FF2B5EF4-FFF2-40B4-BE49-F238E27FC236}">
+                <a16:creationId xmlns:a16="http://schemas.microsoft.com/office/drawing/2014/main" id="{827E4998-111A-6935-5E02-171BA70296E0}"/>
+              </a:ext>
+            </a:extLst>
+          </p:cNvPr>
+          <p:cNvPicPr>
+            <a:picLocks noChangeAspect="1" noChangeArrowheads="1"/>
+          </p:cNvPicPr>
+          <p:nvPr/>
+        </p:nvPicPr>
+        <p:blipFill>
+          <a:blip r:embed="rId3">
+            <a:extLst>
+              <a:ext uri="{28A0092B-C50C-407E-A947-70E740481C1C}">
+                <a14:useLocalDpi xmlns:a14="http://schemas.microsoft.com/office/drawing/2010/main" val="0"/>
+              </a:ext>
+            </a:extLst>
+          </a:blip>
+          <a:srcRect/>
+          <a:stretch>
+            <a:fillRect/>
+          </a:stretch>
+        </p:blipFill>
+        <p:spPr bwMode="auto">
+          <a:xfrm>
+            <a:off x="3076119" y="1245446"/>
+            <a:ext cx="6039762" cy="4726395"/>
+          </a:xfrm>
+          <a:prstGeom prst="rect">
+            <a:avLst/>
+          </a:prstGeom>
+          <a:noFill/>
+          <a:extLst>
+            <a:ext uri="{909E8E84-426E-40DD-AFC4-6F175D3DCCD1}">
+              <a14:hiddenFill xmlns:a14="http://schemas.microsoft.com/office/drawing/2010/main">
+                <a:solidFill>
+                  <a:srgbClr val="FFFFFF"/>
+                </a:solidFill>
+              </a14:hiddenFill>
+            </a:ext>
+          </a:extLst>
+        </p:spPr>
+      </p:pic>
+      <p:sp>
+        <p:nvSpPr>
+          <p:cNvPr id="4" name="BlokTextu 3">
+            <a:extLst>
+              <a:ext uri="{FF2B5EF4-FFF2-40B4-BE49-F238E27FC236}">
+                <a16:creationId xmlns:a16="http://schemas.microsoft.com/office/drawing/2014/main" id="{585B1115-B724-1A94-7D23-EA6BA1E586BB}"/>
+              </a:ext>
+            </a:extLst>
+          </p:cNvPr>
+          <p:cNvSpPr txBox="1"/>
+          <p:nvPr/>
+        </p:nvSpPr>
+        <p:spPr>
+          <a:xfrm>
+            <a:off x="3179265" y="5939596"/>
+            <a:ext cx="6314032" cy="430887"/>
+          </a:xfrm>
+          <a:prstGeom prst="rect">
+            <a:avLst/>
+          </a:prstGeom>
+          <a:noFill/>
+        </p:spPr>
+        <p:txBody>
+          <a:bodyPr wrap="square" rtlCol="0">
+            <a:spAutoFit/>
+          </a:bodyPr>
+          <a:lstStyle/>
+          <a:p>
+            <a:pPr algn="ctr"/>
+            <a:r>
+              <a:rPr lang="sk-SK" sz="1100" dirty="0"/>
+              <a:t>Obr. 1: Štruktúra súborových systémov FAT a FAT32</a:t>
+            </a:r>
+            <a:br>
+              <a:rPr lang="sk-SK" sz="1100" dirty="0"/>
+            </a:br>
+            <a:r>
+              <a:rPr lang="sk-SK" sz="1100" dirty="0"/>
+              <a:t>Zdroj: https://www.easeus.com/diskmanager/file-system.html</a:t>
             </a:r>
           </a:p>
         </p:txBody>
@@ -6510,7 +6829,7 @@
     </p:spTree>
     <p:extLst>
       <p:ext uri="{BB962C8B-B14F-4D97-AF65-F5344CB8AC3E}">
-        <p14:creationId xmlns:p14="http://schemas.microsoft.com/office/powerpoint/2010/main" val="645440768"/>
+        <p14:creationId xmlns:p14="http://schemas.microsoft.com/office/powerpoint/2010/main" val="2566956878"/>
       </p:ext>
     </p:extLst>
   </p:cSld>
@@ -6542,7 +6861,7 @@
           <p:cNvPr id="2" name="Nadpis 1">
             <a:extLst>
               <a:ext uri="{FF2B5EF4-FFF2-40B4-BE49-F238E27FC236}">
-                <a16:creationId xmlns:a16="http://schemas.microsoft.com/office/drawing/2014/main" id="{EC95B1EF-A03C-57D8-83A1-F58DA192925A}"/>
+                <a16:creationId xmlns:a16="http://schemas.microsoft.com/office/drawing/2014/main" id="{2DD353EA-867B-EAD5-EE64-B8C457EF5D9E}"/>
               </a:ext>
             </a:extLst>
           </p:cNvPr>
@@ -6558,10 +6877,6 @@
           <a:bodyPr/>
           <a:lstStyle/>
           <a:p>
-            <a:r>
-              <a:rPr lang="sk-SK" dirty="0"/>
-              <a:t>Štruktúra </a:t>
-            </a:r>
             <a:r>
               <a:rPr lang="sk-SK" dirty="0" err="1"/>
               <a:t>exFAT</a:t>
@@ -6570,96 +6885,68 @@
           </a:p>
         </p:txBody>
       </p:sp>
-      <p:pic>
-        <p:nvPicPr>
-          <p:cNvPr id="3074" name="Picture 2" descr="exFAT file system Structure">
-            <a:extLst>
-              <a:ext uri="{FF2B5EF4-FFF2-40B4-BE49-F238E27FC236}">
-                <a16:creationId xmlns:a16="http://schemas.microsoft.com/office/drawing/2014/main" id="{580E65D7-0A6D-CE68-73FA-6B7E158A0AF8}"/>
-              </a:ext>
-            </a:extLst>
-          </p:cNvPr>
-          <p:cNvPicPr>
-            <a:picLocks noChangeAspect="1" noChangeArrowheads="1"/>
-          </p:cNvPicPr>
-          <p:nvPr/>
-        </p:nvPicPr>
-        <p:blipFill>
-          <a:blip r:embed="rId3">
-            <a:extLst>
-              <a:ext uri="{28A0092B-C50C-407E-A947-70E740481C1C}">
-                <a14:useLocalDpi xmlns:a14="http://schemas.microsoft.com/office/drawing/2010/main" val="0"/>
-              </a:ext>
-            </a:extLst>
-          </a:blip>
-          <a:srcRect/>
-          <a:stretch>
-            <a:fillRect/>
-          </a:stretch>
-        </p:blipFill>
-        <p:spPr bwMode="auto">
-          <a:xfrm>
-            <a:off x="2762250" y="1519237"/>
-            <a:ext cx="6667500" cy="3819525"/>
-          </a:xfrm>
-          <a:prstGeom prst="rect">
-            <a:avLst/>
-          </a:prstGeom>
-          <a:noFill/>
-          <a:extLst>
-            <a:ext uri="{909E8E84-426E-40DD-AFC4-6F175D3DCCD1}">
-              <a14:hiddenFill xmlns:a14="http://schemas.microsoft.com/office/drawing/2010/main">
-                <a:solidFill>
-                  <a:srgbClr val="FFFFFF"/>
-                </a:solidFill>
-              </a14:hiddenFill>
-            </a:ext>
-          </a:extLst>
-        </p:spPr>
-      </p:pic>
-      <p:sp>
-        <p:nvSpPr>
-          <p:cNvPr id="6" name="BlokTextu 5">
-            <a:extLst>
-              <a:ext uri="{FF2B5EF4-FFF2-40B4-BE49-F238E27FC236}">
-                <a16:creationId xmlns:a16="http://schemas.microsoft.com/office/drawing/2014/main" id="{B56A0E1F-FE01-2EB1-85CB-D580A6ECA616}"/>
-              </a:ext>
-            </a:extLst>
-          </p:cNvPr>
-          <p:cNvSpPr txBox="1"/>
-          <p:nvPr/>
-        </p:nvSpPr>
-        <p:spPr>
-          <a:xfrm>
-            <a:off x="2938984" y="5490417"/>
-            <a:ext cx="6314032" cy="430887"/>
-          </a:xfrm>
-          <a:prstGeom prst="rect">
-            <a:avLst/>
-          </a:prstGeom>
-          <a:noFill/>
-        </p:spPr>
-        <p:txBody>
-          <a:bodyPr wrap="square" rtlCol="0">
-            <a:spAutoFit/>
-          </a:bodyPr>
-          <a:lstStyle/>
-          <a:p>
-            <a:pPr algn="ctr"/>
-            <a:r>
-              <a:rPr lang="sk-SK" sz="1100" dirty="0"/>
-              <a:t>Obr. 2: Štruktúra súborového systému </a:t>
-            </a:r>
-            <a:r>
-              <a:rPr lang="sk-SK" sz="1100" dirty="0" err="1"/>
-              <a:t>exFAT</a:t>
-            </a:r>
-            <a:br>
-              <a:rPr lang="sk-SK" sz="1100" dirty="0"/>
-            </a:br>
-            <a:r>
-              <a:rPr lang="sk-SK" sz="1100" dirty="0"/>
-              <a:t>Zdroj: https://www.easeus.com/diskmanager/file-system.html</a:t>
+      <p:sp>
+        <p:nvSpPr>
+          <p:cNvPr id="3" name="Zástupný objekt pre obsah 2">
+            <a:extLst>
+              <a:ext uri="{FF2B5EF4-FFF2-40B4-BE49-F238E27FC236}">
+                <a16:creationId xmlns:a16="http://schemas.microsoft.com/office/drawing/2014/main" id="{1140D524-240C-7A2E-FC98-1E233B7BBBC5}"/>
+              </a:ext>
+            </a:extLst>
+          </p:cNvPr>
+          <p:cNvSpPr>
+            <a:spLocks noGrp="1"/>
+          </p:cNvSpPr>
+          <p:nvPr>
+            <p:ph idx="1"/>
+          </p:nvPr>
+        </p:nvSpPr>
+        <p:spPr/>
+        <p:txBody>
+          <a:bodyPr/>
+          <a:lstStyle/>
+          <a:p>
+            <a:r>
+              <a:rPr lang="sk-SK" dirty="0"/>
+              <a:t>Optimalizovaný pre média s „</a:t>
+            </a:r>
+            <a:r>
+              <a:rPr lang="sk-SK" dirty="0" err="1"/>
+              <a:t>flash</a:t>
+            </a:r>
+            <a:r>
+              <a:rPr lang="sk-SK" dirty="0"/>
+              <a:t>“ pamäťou</a:t>
+            </a:r>
+          </a:p>
+          <a:p>
+            <a:r>
+              <a:rPr lang="sk-SK" dirty="0"/>
+              <a:t>Podporuje rádovo väčšiu veľkosť súborov ako FAT32 (</a:t>
+            </a:r>
+            <a:r>
+              <a:rPr lang="sk-SK" dirty="0" err="1"/>
+              <a:t>ExaByty</a:t>
+            </a:r>
+            <a:r>
+              <a:rPr lang="sk-SK" dirty="0"/>
+              <a:t>)</a:t>
+            </a:r>
+          </a:p>
+          <a:p>
+            <a:r>
+              <a:rPr lang="sk-SK" dirty="0"/>
+              <a:t>Vhodný prenosové média s veľkosťou nad 32GB</a:t>
+            </a:r>
+          </a:p>
+          <a:p>
+            <a:r>
+              <a:rPr lang="sk-SK" dirty="0" err="1"/>
+              <a:t>Interoperabilita</a:t>
+            </a:r>
+            <a:r>
+              <a:rPr lang="sk-SK" dirty="0"/>
+              <a:t> medzi viacerými OS</a:t>
             </a:r>
           </a:p>
         </p:txBody>
@@ -6667,7 +6954,7 @@
     </p:spTree>
     <p:extLst>
       <p:ext uri="{BB962C8B-B14F-4D97-AF65-F5344CB8AC3E}">
-        <p14:creationId xmlns:p14="http://schemas.microsoft.com/office/powerpoint/2010/main" val="175943771"/>
+        <p14:creationId xmlns:p14="http://schemas.microsoft.com/office/powerpoint/2010/main" val="645440768"/>
       </p:ext>
     </p:extLst>
   </p:cSld>
@@ -6699,7 +6986,7 @@
           <p:cNvPr id="2" name="Nadpis 1">
             <a:extLst>
               <a:ext uri="{FF2B5EF4-FFF2-40B4-BE49-F238E27FC236}">
-                <a16:creationId xmlns:a16="http://schemas.microsoft.com/office/drawing/2014/main" id="{D4F3A823-8725-10DE-EC45-7EE590866A5C}"/>
+                <a16:creationId xmlns:a16="http://schemas.microsoft.com/office/drawing/2014/main" id="{EC95B1EF-A03C-57D8-83A1-F58DA192925A}"/>
               </a:ext>
             </a:extLst>
           </p:cNvPr>
@@ -6717,88 +7004,106 @@
           <a:p>
             <a:r>
               <a:rPr lang="sk-SK" dirty="0"/>
-              <a:t>NTFS – New </a:t>
+              <a:t>Štruktúra </a:t>
             </a:r>
             <a:r>
               <a:rPr lang="sk-SK" dirty="0" err="1"/>
-              <a:t>Technology</a:t>
-            </a:r>
-            <a:r>
-              <a:rPr lang="sk-SK" dirty="0"/>
-              <a:t> </a:t>
-            </a:r>
-            <a:r>
-              <a:rPr lang="sk-SK" dirty="0" err="1"/>
-              <a:t>File</a:t>
-            </a:r>
-            <a:r>
-              <a:rPr lang="sk-SK" dirty="0"/>
-              <a:t> </a:t>
-            </a:r>
-            <a:r>
-              <a:rPr lang="sk-SK" dirty="0" err="1"/>
-              <a:t>System</a:t>
+              <a:t>exFAT</a:t>
             </a:r>
             <a:endParaRPr lang="sk-SK" dirty="0"/>
           </a:p>
         </p:txBody>
       </p:sp>
-      <p:sp>
-        <p:nvSpPr>
-          <p:cNvPr id="3" name="Zástupný objekt pre obsah 2">
-            <a:extLst>
-              <a:ext uri="{FF2B5EF4-FFF2-40B4-BE49-F238E27FC236}">
-                <a16:creationId xmlns:a16="http://schemas.microsoft.com/office/drawing/2014/main" id="{74203224-C5A5-CB0E-DF65-FCAF04E9E139}"/>
-              </a:ext>
-            </a:extLst>
-          </p:cNvPr>
-          <p:cNvSpPr>
-            <a:spLocks noGrp="1"/>
-          </p:cNvSpPr>
-          <p:nvPr>
-            <p:ph idx="1"/>
-          </p:nvPr>
-        </p:nvSpPr>
-        <p:spPr/>
-        <p:txBody>
-          <a:bodyPr/>
-          <a:lstStyle/>
-          <a:p>
-            <a:r>
-              <a:rPr lang="sk-SK" dirty="0"/>
-              <a:t>Pre operačný </a:t>
-            </a:r>
-            <a:r>
-              <a:rPr lang="sk-SK" dirty="0" err="1"/>
-              <a:t>sytsém</a:t>
-            </a:r>
-            <a:r>
-              <a:rPr lang="sk-SK" dirty="0"/>
-              <a:t> Windows</a:t>
-            </a:r>
-          </a:p>
-          <a:p>
-            <a:r>
-              <a:rPr lang="sk-SK" dirty="0"/>
-              <a:t>Žurnálový súborový systém</a:t>
-            </a:r>
-          </a:p>
-          <a:p>
-            <a:r>
-              <a:rPr lang="sk-SK" dirty="0"/>
-              <a:t>Podporuje šifrovanie a kompresiu</a:t>
-            </a:r>
-          </a:p>
-          <a:p>
-            <a:r>
-              <a:rPr lang="sk-SK" dirty="0"/>
-              <a:t>Správa prístupu ku súborom</a:t>
-            </a:r>
-          </a:p>
-          <a:p>
-            <a:r>
-              <a:rPr lang="sk-SK" dirty="0"/>
-              <a:t>Podporuje veľké súbory aj oddiely</a:t>
+      <p:pic>
+        <p:nvPicPr>
+          <p:cNvPr id="3074" name="Picture 2" descr="exFAT file system Structure">
+            <a:extLst>
+              <a:ext uri="{FF2B5EF4-FFF2-40B4-BE49-F238E27FC236}">
+                <a16:creationId xmlns:a16="http://schemas.microsoft.com/office/drawing/2014/main" id="{580E65D7-0A6D-CE68-73FA-6B7E158A0AF8}"/>
+              </a:ext>
+            </a:extLst>
+          </p:cNvPr>
+          <p:cNvPicPr>
+            <a:picLocks noChangeAspect="1" noChangeArrowheads="1"/>
+          </p:cNvPicPr>
+          <p:nvPr/>
+        </p:nvPicPr>
+        <p:blipFill>
+          <a:blip r:embed="rId3">
+            <a:extLst>
+              <a:ext uri="{28A0092B-C50C-407E-A947-70E740481C1C}">
+                <a14:useLocalDpi xmlns:a14="http://schemas.microsoft.com/office/drawing/2010/main" val="0"/>
+              </a:ext>
+            </a:extLst>
+          </a:blip>
+          <a:srcRect/>
+          <a:stretch>
+            <a:fillRect/>
+          </a:stretch>
+        </p:blipFill>
+        <p:spPr bwMode="auto">
+          <a:xfrm>
+            <a:off x="2762250" y="1519237"/>
+            <a:ext cx="6667500" cy="3819525"/>
+          </a:xfrm>
+          <a:prstGeom prst="rect">
+            <a:avLst/>
+          </a:prstGeom>
+          <a:noFill/>
+          <a:extLst>
+            <a:ext uri="{909E8E84-426E-40DD-AFC4-6F175D3DCCD1}">
+              <a14:hiddenFill xmlns:a14="http://schemas.microsoft.com/office/drawing/2010/main">
+                <a:solidFill>
+                  <a:srgbClr val="FFFFFF"/>
+                </a:solidFill>
+              </a14:hiddenFill>
+            </a:ext>
+          </a:extLst>
+        </p:spPr>
+      </p:pic>
+      <p:sp>
+        <p:nvSpPr>
+          <p:cNvPr id="6" name="BlokTextu 5">
+            <a:extLst>
+              <a:ext uri="{FF2B5EF4-FFF2-40B4-BE49-F238E27FC236}">
+                <a16:creationId xmlns:a16="http://schemas.microsoft.com/office/drawing/2014/main" id="{B56A0E1F-FE01-2EB1-85CB-D580A6ECA616}"/>
+              </a:ext>
+            </a:extLst>
+          </p:cNvPr>
+          <p:cNvSpPr txBox="1"/>
+          <p:nvPr/>
+        </p:nvSpPr>
+        <p:spPr>
+          <a:xfrm>
+            <a:off x="2938984" y="5490417"/>
+            <a:ext cx="6314032" cy="430887"/>
+          </a:xfrm>
+          <a:prstGeom prst="rect">
+            <a:avLst/>
+          </a:prstGeom>
+          <a:noFill/>
+        </p:spPr>
+        <p:txBody>
+          <a:bodyPr wrap="square" rtlCol="0">
+            <a:spAutoFit/>
+          </a:bodyPr>
+          <a:lstStyle/>
+          <a:p>
+            <a:pPr algn="ctr"/>
+            <a:r>
+              <a:rPr lang="sk-SK" sz="1100" dirty="0"/>
+              <a:t>Obr. 2: Štruktúra súborového systému </a:t>
+            </a:r>
+            <a:r>
+              <a:rPr lang="sk-SK" sz="1100" dirty="0" err="1"/>
+              <a:t>exFAT</a:t>
+            </a:r>
+            <a:br>
+              <a:rPr lang="sk-SK" sz="1100" dirty="0"/>
+            </a:br>
+            <a:r>
+              <a:rPr lang="sk-SK" sz="1100" dirty="0"/>
+              <a:t>Zdroj: https://www.easeus.com/diskmanager/file-system.html</a:t>
             </a:r>
           </a:p>
         </p:txBody>
@@ -6806,7 +7111,7 @@
     </p:spTree>
     <p:extLst>
       <p:ext uri="{BB962C8B-B14F-4D97-AF65-F5344CB8AC3E}">
-        <p14:creationId xmlns:p14="http://schemas.microsoft.com/office/powerpoint/2010/main" val="2831258130"/>
+        <p14:creationId xmlns:p14="http://schemas.microsoft.com/office/powerpoint/2010/main" val="175943771"/>
       </p:ext>
     </p:extLst>
   </p:cSld>
@@ -6838,7 +7143,7 @@
           <p:cNvPr id="2" name="Nadpis 1">
             <a:extLst>
               <a:ext uri="{FF2B5EF4-FFF2-40B4-BE49-F238E27FC236}">
-                <a16:creationId xmlns:a16="http://schemas.microsoft.com/office/drawing/2014/main" id="{A89903CB-35AC-4150-EBCC-B79DF2B8C885}"/>
+                <a16:creationId xmlns:a16="http://schemas.microsoft.com/office/drawing/2014/main" id="{D4F3A823-8725-10DE-EC45-7EE590866A5C}"/>
               </a:ext>
             </a:extLst>
           </p:cNvPr>
@@ -6856,97 +7161,88 @@
           <a:p>
             <a:r>
               <a:rPr lang="sk-SK" dirty="0"/>
-              <a:t>Štruktúra NTFS</a:t>
-            </a:r>
-          </a:p>
-        </p:txBody>
-      </p:sp>
-      <p:pic>
-        <p:nvPicPr>
-          <p:cNvPr id="1026" name="Picture 2" descr="Structure of NTFS file system">
-            <a:extLst>
-              <a:ext uri="{FF2B5EF4-FFF2-40B4-BE49-F238E27FC236}">
-                <a16:creationId xmlns:a16="http://schemas.microsoft.com/office/drawing/2014/main" id="{B01B4BEB-D59A-1B9A-350A-9717C1EA8909}"/>
-              </a:ext>
-            </a:extLst>
-          </p:cNvPr>
-          <p:cNvPicPr>
-            <a:picLocks noChangeAspect="1" noChangeArrowheads="1"/>
-          </p:cNvPicPr>
-          <p:nvPr/>
-        </p:nvPicPr>
-        <p:blipFill>
-          <a:blip r:embed="rId3">
-            <a:extLst>
-              <a:ext uri="{28A0092B-C50C-407E-A947-70E740481C1C}">
-                <a14:useLocalDpi xmlns:a14="http://schemas.microsoft.com/office/drawing/2010/main" val="0"/>
-              </a:ext>
-            </a:extLst>
-          </a:blip>
-          <a:srcRect/>
-          <a:stretch>
-            <a:fillRect/>
-          </a:stretch>
-        </p:blipFill>
-        <p:spPr bwMode="auto">
-          <a:xfrm>
-            <a:off x="2762250" y="1652587"/>
-            <a:ext cx="6667500" cy="3552825"/>
-          </a:xfrm>
-          <a:prstGeom prst="rect">
-            <a:avLst/>
-          </a:prstGeom>
-          <a:noFill/>
-          <a:extLst>
-            <a:ext uri="{909E8E84-426E-40DD-AFC4-6F175D3DCCD1}">
-              <a14:hiddenFill xmlns:a14="http://schemas.microsoft.com/office/drawing/2010/main">
-                <a:solidFill>
-                  <a:srgbClr val="FFFFFF"/>
-                </a:solidFill>
-              </a14:hiddenFill>
-            </a:ext>
-          </a:extLst>
-        </p:spPr>
-      </p:pic>
-      <p:sp>
-        <p:nvSpPr>
-          <p:cNvPr id="4" name="BlokTextu 3">
-            <a:extLst>
-              <a:ext uri="{FF2B5EF4-FFF2-40B4-BE49-F238E27FC236}">
-                <a16:creationId xmlns:a16="http://schemas.microsoft.com/office/drawing/2014/main" id="{C10C8EF9-AEE1-0820-C294-3D1CCD0F4A6E}"/>
-              </a:ext>
-            </a:extLst>
-          </p:cNvPr>
-          <p:cNvSpPr txBox="1"/>
-          <p:nvPr/>
-        </p:nvSpPr>
-        <p:spPr>
-          <a:xfrm>
-            <a:off x="2938984" y="5388817"/>
-            <a:ext cx="6314032" cy="430887"/>
-          </a:xfrm>
-          <a:prstGeom prst="rect">
-            <a:avLst/>
-          </a:prstGeom>
-          <a:noFill/>
-        </p:spPr>
-        <p:txBody>
-          <a:bodyPr wrap="square" rtlCol="0">
-            <a:spAutoFit/>
-          </a:bodyPr>
-          <a:lstStyle/>
-          <a:p>
-            <a:pPr algn="ctr"/>
-            <a:r>
-              <a:rPr lang="sk-SK" sz="1100" dirty="0"/>
-              <a:t>Obr. 3: Štruktúra súborového systému NTFS</a:t>
-            </a:r>
-            <a:br>
-              <a:rPr lang="sk-SK" sz="1100" dirty="0"/>
-            </a:br>
-            <a:r>
-              <a:rPr lang="sk-SK" sz="1100" dirty="0"/>
-              <a:t>Zdroj: https://www.easeus.com/diskmanager/file-system.html</a:t>
+              <a:t>NTFS – New </a:t>
+            </a:r>
+            <a:r>
+              <a:rPr lang="sk-SK" dirty="0" err="1"/>
+              <a:t>Technology</a:t>
+            </a:r>
+            <a:r>
+              <a:rPr lang="sk-SK" dirty="0"/>
+              <a:t> </a:t>
+            </a:r>
+            <a:r>
+              <a:rPr lang="sk-SK" dirty="0" err="1"/>
+              <a:t>File</a:t>
+            </a:r>
+            <a:r>
+              <a:rPr lang="sk-SK" dirty="0"/>
+              <a:t> </a:t>
+            </a:r>
+            <a:r>
+              <a:rPr lang="sk-SK" dirty="0" err="1"/>
+              <a:t>System</a:t>
+            </a:r>
+            <a:endParaRPr lang="sk-SK" dirty="0"/>
+          </a:p>
+        </p:txBody>
+      </p:sp>
+      <p:sp>
+        <p:nvSpPr>
+          <p:cNvPr id="3" name="Zástupný objekt pre obsah 2">
+            <a:extLst>
+              <a:ext uri="{FF2B5EF4-FFF2-40B4-BE49-F238E27FC236}">
+                <a16:creationId xmlns:a16="http://schemas.microsoft.com/office/drawing/2014/main" id="{74203224-C5A5-CB0E-DF65-FCAF04E9E139}"/>
+              </a:ext>
+            </a:extLst>
+          </p:cNvPr>
+          <p:cNvSpPr>
+            <a:spLocks noGrp="1"/>
+          </p:cNvSpPr>
+          <p:nvPr>
+            <p:ph idx="1"/>
+          </p:nvPr>
+        </p:nvSpPr>
+        <p:spPr/>
+        <p:txBody>
+          <a:bodyPr/>
+          <a:lstStyle/>
+          <a:p>
+            <a:r>
+              <a:rPr lang="sk-SK" dirty="0"/>
+              <a:t>Pre operačný </a:t>
+            </a:r>
+            <a:r>
+              <a:rPr lang="sk-SK" dirty="0" err="1"/>
+              <a:t>sytsém</a:t>
+            </a:r>
+            <a:r>
+              <a:rPr lang="sk-SK" dirty="0"/>
+              <a:t> Windows</a:t>
+            </a:r>
+          </a:p>
+          <a:p>
+            <a:r>
+              <a:rPr lang="sk-SK" dirty="0"/>
+              <a:t>Žurnálový súborový systém</a:t>
+            </a:r>
+          </a:p>
+          <a:p>
+            <a:r>
+              <a:rPr lang="sk-SK" dirty="0"/>
+              <a:t>Podporuje šifrovanie a kompresiu</a:t>
+            </a:r>
+          </a:p>
+          <a:p>
+            <a:r>
+              <a:rPr lang="sk-SK" dirty="0"/>
+              <a:t>Správa prístupu ku súborom</a:t>
+            </a:r>
+          </a:p>
+          <a:p>
+            <a:r>
+              <a:rPr lang="sk-SK" dirty="0"/>
+              <a:t>Podporuje veľké súbory aj oddiely</a:t>
             </a:r>
           </a:p>
         </p:txBody>
@@ -6954,7 +7250,7 @@
     </p:spTree>
     <p:extLst>
       <p:ext uri="{BB962C8B-B14F-4D97-AF65-F5344CB8AC3E}">
-        <p14:creationId xmlns:p14="http://schemas.microsoft.com/office/powerpoint/2010/main" val="4245393544"/>
+        <p14:creationId xmlns:p14="http://schemas.microsoft.com/office/powerpoint/2010/main" val="2831258130"/>
       </p:ext>
     </p:extLst>
   </p:cSld>

</xml_diff>